<commit_message>
Supplementary material and text update
</commit_message>
<xml_diff>
--- a/Supplementary_Material/Workflow_WHONDRS_figure_v1.pptx
+++ b/Supplementary_Material/Workflow_WHONDRS_figure_v1.pptx
@@ -7,6 +7,11 @@
   <p:sldIdLst>
     <p:sldId id="256" r:id="rId2"/>
     <p:sldId id="257" r:id="rId3"/>
+    <p:sldId id="258" r:id="rId4"/>
+    <p:sldId id="259" r:id="rId5"/>
+    <p:sldId id="260" r:id="rId6"/>
+    <p:sldId id="262" r:id="rId7"/>
+    <p:sldId id="261" r:id="rId8"/>
   </p:sldIdLst>
   <p:sldSz cx="12192000" cy="6858000"/>
   <p:notesSz cx="6858000" cy="9144000"/>
@@ -156,14 +161,14 @@
           <inkml:channelProperty channel="F" name="resolution" value="0" units="1/dev"/>
         </inkml:channelProperties>
       </inkml:inkSource>
-      <inkml:timestamp xml:id="ts0" timeString="2024-05-17T16:16:32.437"/>
+      <inkml:timestamp xml:id="ts0" timeString="2024-05-20T01:15:39.108"/>
     </inkml:context>
     <inkml:brush xml:id="br0">
       <inkml:brushProperty name="width" value="0.035" units="cm"/>
       <inkml:brushProperty name="height" value="0.035" units="cm"/>
     </inkml:brush>
   </inkml:definitions>
-  <inkml:trace contextRef="#ctx0" brushRef="#br0">1 1 24575,'93'12'0,"1"0"0,0 0 0,-1 0 0,1 0 0,-1 0 0,1 0 0,-1 0 0,1 0 0,0 0 0,-1 0 0,1 0 0,-1 0 0,17 2 0,12 1 0,6 2 0,0-1 0,-4 0 0,-11-2 0,-15-1 0,-22-3 0,-26-3 0,-32-5 0,-19-2 0,-4 0 0,0 0 0</inkml:trace>
+  <inkml:trace contextRef="#ctx0" brushRef="#br0">4 48 24575,'8'0'0,"1"0"0,-1 0 0,1 0 0,6 0 0,-5 0 0,5 0 0,0 0 0,12 0 0,20 0 0,14 8 0,-11-6 0,18 6 0,-30-8 0,47 9 0,-33-6 0,32 6 0,-36-9 0,0 0 0,-15 0 0,0 0 0,-14 0 0,12 0 0,-21 0 0,6 0 0,-8 0 0,1 0 0,-1 0 0,1 0 0,-1 0 0,-7 0 0,-8 0 0,-4 0 0,-20 0 0,12 5 0,-14-3 0,0 3 0,7 0 0,-7-4 0,10 5 0,0-1 0,-1-4 0,1 4 0,6-5 0,-5 5 0,5-3 0,0 3 0,-4-5 0,4 0 0,0 4 0,-5-3 0,12 2 0,-12-3 0,12 4 0,-12-3 0,12 3 0,-5-4 0,0 0 0,5 0 0,-5 4 0,-1-3 0,6 3 0,-5-4 0,7 0 0,-1 0 0,0 0 0,-6 0 0,5 0 0,-12 0 0,6 0 0,-8 0 0,7 0 0,2 3 0,0-2 0,5 3 0,-5-4 0,6 0 0,1 0 0,-1 0 0,1 0 0,-1 0 0,1 0 0,-1-4 0,1 3 0,3-6 0,-3 2 0,7-4 0,-6 5 0,6-4 0,-3 3 0,4-3 0,0-1 0,0 1 0,0-1 0,0 1 0,4 3 0,0-2 0,5 6 0,6-8 0,-5 7 0,22-10 0,-13 11 0,14-6 0,0 0 0,2 6 0,0-11 0,-2 11 0,-9-10 0,-1 10 0,-6-4 0,-2 5 0,-6 0 0,-1 0 0,1 0 0,-1 0 0,1 0 0,-8 0 0,-9 0 0,-18 6 0,-10 3 0,1-1 0,-7 5 0,16-11 0,-7 5 0,9-2 0,8-4 0,1 8 0,6-8 0,8 7 0,9-7 0,18 2 0,-7-3 0,22 7 0,0-5 0,19 4 0,-9-6 0,-6 0 0,-21 0 0,-7 0 0,-2 0 0,-7 0 0,1 0 0,-8 0 0,-9 0 0,-18 7 0,0 0 0,-16 1 0,-6-3 0,10 0 0,-17-4 0,19 11 0,1-10 0,9 5 0,4-2 0,12-4 0,-5 4 0,6-5 0,1 0 0,-1 0 0,1 0 0,23 0 0,-4 0 0,22-5 0,0-3 0,3 1 0,21-7 0,-9 5 0,9-1 0,-22-2 0,-9 11 0,-10-4 0,-12 1 0,-4 3 0,-4-3 0,-5 4 0,4 0 0,1 0 0</inkml:trace>
 </inkml:ink>
 </file>
 
@@ -183,14 +188,230 @@
           <inkml:channelProperty channel="F" name="resolution" value="0" units="1/dev"/>
         </inkml:channelProperties>
       </inkml:inkSource>
-      <inkml:timestamp xml:id="ts0" timeString="2024-05-17T16:16:34.066"/>
+      <inkml:timestamp xml:id="ts0" timeString="2024-05-20T01:15:46.621"/>
     </inkml:context>
     <inkml:brush xml:id="br0">
       <inkml:brushProperty name="width" value="0.035" units="cm"/>
       <inkml:brushProperty name="height" value="0.035" units="cm"/>
     </inkml:brush>
   </inkml:definitions>
-  <inkml:trace contextRef="#ctx0" brushRef="#br0">302 1 24575,'-10'0'0,"0"0"0,1 0 0,-9 5 0,-1 3 0,-8-1 0,1-1 0,7-6 0,1 5 0,9-4 0,-1 3 0,0-4 0,0 0 0,1 0 0,-1 0 0,0 0 0,1 0 0,-1 0 0,0 0 0,0 4 0,1-3 0,-1 4 0,0-5 0,5 4 0,1 1 0,4 5 0,0 0 0,5 7 0,3 2 0,7 19 0,0 2 0,1 0 0,-1-2 0,4-11 0,-4-1 0,-2-7 0,-3-1 0,-4-9 0,-1 1 0,4 0 0,-4 0 0,1-1 0,2-3 0,-7 2 0,8-7 0,-8 4 0,3-5 0</inkml:trace>
+  <inkml:trace contextRef="#ctx0" brushRef="#br0">1 1 24575,'33'0'0,"-7"0"0,36 0 0,9 0 0,15 0-1081,-1 0 1,1 0 1080,6 0 0,-32 0 0,1 0 0,36 0 0,-18 0 0,6 0-1513,4-1 1,3 2 1512,-17 3 0,3 2 0,-5-2 0,6-2 0,1-1-226,5 4 0,8 1 0,-16-3 226,10-3 0,10-1 0,0 2 0,-21 7-7,0-6 7,-7 7 838,-30-9-838,6 0 2739,-28 0-2739,-2 0 2285,-14 0-2285,-2 0 9,-24 6-9,-3-4 0,-1 4 0,-58 5 0,35 0 0,1-4 0,-4-1 0,1 4 0,1-1 0,-43-6 0,27 5 0,-9 2 0,9-2-876,18-6 0,0 0 876,-23 7 0,-10 2 0,11-3 0,-16-5-548,16 3 1,-1 1 547,19-2 0,3-1 0,-27-1 0,6 6 0,29-9 0,8 0 1650,3 0-1650,10 0 1197,-10 7-1197,-15-6 0,10 6 0,-17 0 0,29-6 0,-7 11 0,10-11 0,6 5 0,-14 0 0,12-4 0,-14 10 0,9-6 0,8 1 0,-6 8 0,5-12 0,0 11 0,2-9 0,14 0 0,2 2 0,24-6 0,16 3 0,13-4 0,7 0-471,-11 0 0,1 0 471,22 0 0,1 0 0,-19 0 0,-3 0 0,40 0-106,-4 0 106,-28 0 0,-3 0 0,-28 0 0,-4 0 0,-17 0 936,1 0-936,-1 0 112,1 0-112,-1 0 0,1 0 0,-1 0 0,-7 0 0,-8 5 0,-10-4 0,-16 11 0,7-5 0,-7 6 0,16-6 0,2 2 0,7-8 0,-1 6 0,1-2 0,3 4 0,1-1 0,8-3 0,1-1 0,10 1 0,2-4 0,15 11 0,4-10 0,54 15 0,-33-7 0,17 2 0,-49-5 0,-16-7 0,-9 4 0,-7 2 0,-19-1 0,-22 16 0,0-10 0,-9 7 0,0 5 0,18-19 0,1 16 0,22-20 0,8 4 0,-1-4 0,8 0 0,9-5 0,9-1 0,1-11 0,4-2 0,-9-4 0,4 0 0,-4-10 0,-6 13 0,0-20 0,-7 11 0,0 0 0,-4 5 0,-1 15 0,-3 1 0,-1 3 0,1 1 0,-1 4 0,1 0 0,-1 0 0,-6 5 0,3 7 0,-18 43 0,14-22 0,-4 37 0,15-44 0,10 7 0,7-10 0,-1-6 0,5-2 0,-1-10 0,-5 3 0,5-7 0,-6 2 0,6-3 0,2-5 0,-1 0 0,1-11 0,-12-1 0,0-16 0,-5 7 0,0-16 0,0 16 0,-10-2 0,2 6 0,-9 4 0,0 0 0,-1 1 0,-15 10 0,7-3 0,-16 8 0,6-9 0,1 9 0,2-5 0,10 7 0,6 4 0,-5 2 0,5 10 0,1-5 0,0 4 0,6 1 0,5 0 0,0 1 0,5 5 0,0-12 0,0 5 0,8-2 0,-3-4 0,8 0 0,2-6 0,2-3 0,16 0 0,14 0 0,-8-5 0,-1 0 0,-22-5 0,-12-5 0,0-2 0,-4-6 0,-5-1 0,4 8 0,-10-6 0,-1 10 0,-6-10 0,-5 9 0,-38-8 0,7 5 0,-13 5 0,13 2 0,-9 9 0,20 0 0,-27 0 0,45 6 0,-8 0 0,9 11 0,1 1 0,-4 15 0,-8 48 0,8-12 0,-4 25 0,22-24 0,2-10 0,7 0 0,0-3 0,16 0 0,-5-9 0,13 9 0,-2-12 0,-2-9 0,9 6 0,-5-16 0,25 12 0,-11-16 0,19 2 0,0-8 0,4-7 0,-1-1 0,-8-7 0,-1-2 0,5-6 0,35-1 0,-62 0 0,-5-3 0,-15 7 0,-8-1 0,-9 1 0,-9 15 0,-15-2 0,6 8 0,-7-4 0,9-1 0,8-2 0,0 0 0,1 0 0,5-1 0,-5 1 0,6-5 0,5 2 0,-4-2 0,3 0 0,4-5 0,73-63 0,-21 5-607,3 5 0,2-4 607,-16 15 0,-6-1 0,-4-4 0,-3-1 0,6-1 0,-4 0 0,-5-43 0,-5 17 0,-19 34 0,0 16 0,0 16 0,-4 5 0,-17 0 0,-7 4 1214,-17 13-1214,0 4 0,-4 24 0,10-2 0,-13 14 0,19-7 0,-7 3 0,18-13 0,1 6 0,14-16 0,-5 7 0,11-16 0,-5-2 0,10-14 0,1-2 0,0-8 0,2 1 0,-2-1 0,0 8 0,-1 18 0,-14 40 0,-3 9 0,-4 11-2112,-5 14 0,0 4 2112,6-27 0,0 2 0,2-3 0,-3 23 0,3-5 0,2-18 0,4-8 0,5 11 0,-6 0 0,9-35 0,0-6 0,10-19 0,-2-19 4224,28-28-4224,-1-4 0,12-22 0,5 7 0,-1-20 0,-4 26 0,0 4 0,1-8 0,15-4 0,-68 91 0,-6 26 0,-10-6 0,-2 4-495,10-1 1,-1 0 494,-13 8 0,0-3 0,6 19 0,-16 5 0,20-38 0,-6 1 0,15-36 0,16-24 0,3-36 0,24-27 0,-3-17-323,-10 31 0,1-3 323,-4-1 0,-2 0 0,0 7 0,-1 1-222,-5-5 1,0 3 221,8-18 0,-8 11 0,1 28 0,-11 30 0,-20 57 0,-6 16 0,7-11 0,-1 3-198,3-3 1,1 0 197,3 9 0,1-1 0,-9 34 338,0-2-338,11-37 0,-3-21 0,10-4 0,-3-15 0,1-5 2029,7-12-2029,-6-21 106,23-20-106,1-20 0,18-27 0,-5 24 0,-5-8 0,-10 43 0,-8 8 0,-6 21 0,-1 21 0,-3 33 0,0 33 0,-2 16 0,0-3 0,1-19-2945,0-5 0,0 4 2945,0-6 0,0 20 0,0 11 0,0 5 0,0-3 0,0-12 0,0-18 0,0 17 0,0-9 0,-2-11 0,-1 9 0,0-2 0,1-11-205,1 1 1,0-11 204,-9 28 0,10-37 0,0-12 0,0-32 0,5-14 5724,10-20-5724,0-8 0,29-28 0,-14 1-16,0 16 0,1-1 16,8-30 0,4 11 0,-19 21 0,-2 21 0,-14 7 0,6 6 0,-13 3 607,3 11-607,-8-2 0,-1 8 0,-3-1 0,-7 7 0,-2-3 0,0 0 0,-5-7 0,12-5 0,-12 0 0,12 0 0,-12-5 0,3-16 0,-8-10 0,-18-31 0,-4-16-1567,-3-4 1567,17 14 0,0-6 0,3 3 0,1 0 0,0 0 0,-1 1 0,2 2 0,3 9 0,3 15 0,7 0 0,9 38 0,4-1 0,-6 18 0,-9 16 1567,5-1-1567,-13 16 0,8-16 0,-2 7 0,5-16 0,6-6 0,5-11 0,2-21 0,16-8 0,-2-28 0,11 9 0,-6-3 0,0-1 0,9-4 0,9-9 0,1 4 0,-7 24 0,21-19 0,-44 48 0,-1 11 0,-4 14 0,0 24 0,-13 24 0,-2 10-789,11-13 0,1 2 789,-12 24 0,2-1 0,12-30 0,2-4 0,-1 35 0,0-28 0,0-12 0,0-22 0,4-15 0,2-17 1578,9-7-1578,9-32 0,19-12 0,0-32-1155,6 6 1155,-25 24 0,-3-3 0,-4 5 0,-1-1 0,6-7 0,0 0 0,-10 8 0,-1 4 0,17-22 0,-18 34 0,-4 16 0,-6 31 0,0 3 0,0 52 0,-11 27-559,4-16 0,-1 7 559,2 7 0,-2 2 0,-4 0 0,1-1 0,10-1 0,-1-3 0,-8-7 0,-2-3-216,2-15 1,1-2 215,-6 38 0,-1-46 0,12-22 0,3-11 0,-2-14 2220,3-9-2220,0-18 484,0-22-484,6 1 0,-5-13 0,0-5-883,5-24 883,-5 16 0,-2-1 0,1-17 0,0 15 0,7 19 0,-5 28 0,4 5 0,-6 23 0,0 18 0,0 11 0,0 8 883,0 6-883,0-16 0,-5 7 0,4-10 0,-4-6 0,5 5 0,0-5 0,0 6 0,0 1 0,0-1 0,-4-6 0,3-2 0,-3-14 0,4-9 0,0-18 0,0 0 0,0-16 0,0 16 0,0-16 0,0 22 0,0-4 0,0 9 0,0 4 0,0-10 0,0 14 0,0-3 0</inkml:trace>
+</inkml:ink>
+</file>
+
+<file path=ppt/ink/ink12.xml><?xml version="1.0" encoding="utf-8"?>
+<inkml:ink xmlns:inkml="http://www.w3.org/2003/InkML">
+  <inkml:definitions>
+    <inkml:context xml:id="ctx0">
+      <inkml:inkSource xml:id="inkSrc0">
+        <inkml:traceFormat>
+          <inkml:channel name="X" type="integer" min="-2.14748E9" max="2.14748E9" units="cm"/>
+          <inkml:channel name="Y" type="integer" min="-2.14748E9" max="2.14748E9" units="cm"/>
+          <inkml:channel name="F" type="integer" max="32767" units="dev"/>
+        </inkml:traceFormat>
+        <inkml:channelProperties>
+          <inkml:channelProperty channel="X" name="resolution" value="1000" units="1/cm"/>
+          <inkml:channelProperty channel="Y" name="resolution" value="1000" units="1/cm"/>
+          <inkml:channelProperty channel="F" name="resolution" value="0" units="1/dev"/>
+        </inkml:channelProperties>
+      </inkml:inkSource>
+      <inkml:timestamp xml:id="ts0" timeString="2024-05-20T01:15:51.963"/>
+    </inkml:context>
+    <inkml:brush xml:id="br0">
+      <inkml:brushProperty name="width" value="0.035" units="cm"/>
+      <inkml:brushProperty name="height" value="0.035" units="cm"/>
+    </inkml:brush>
+  </inkml:definitions>
+  <inkml:trace contextRef="#ctx0" brushRef="#br0">144 127 24575,'0'9'0,"-5"6"0,-2 2 0,-13 16 0,8-14 0,-7 12 0,8-14 0,0 6 0,0-6 0,5-2 0,2-6 0,4-1 0,4-7 0,1 2 0,3-10 0,8 1 0,-6-3 0,5-1 0,0-5 0,16-16 0,5 1 0,-2-8 0,-9 22 0,-8-4 0,0 7 0,16-14 0,-7 8 0,0 1 0,-11 8 0,-6 1 0,-1 5 0,1 0 0,-15 14 0,-3 3 0,-18 20 0,-11 7 0,6 6 0,-16-4 0,17 1 0,-12-11 0,14 2 0,-4-8 0,16-9 0,2-2 0,10-7 0,-2-3 0,10-1 0,-2-8 0,14-7 0,2-1 0,34-28 0,1 11 0,-11-1 0,2-1 0,31-8 0,-32 9 0,0-1 0,38-21 0,-12 3 0,-15 12 0,-20 17 0,-16 10 0,-11 14 0,-9 5 0,-13 15 0,3-1 0,-12 10 0,6-7 0,-8 7 0,4-10 0,5 1 0,-4-1 0,3 0 0,-4-4 0,-1-2 0,6 0 0,-4-4 0,10 2 0,-3-5 0,21-16 0,13 1 0,20-31 0,20 7 0,20-19-520,-2 11 520,11-2 0,-15 11 0,-23 5 0,-4 8 0,-33 5 0,1 3 0,-18 14 0,1 6 520,-14 11-520,-4 9 0,-6 2 0,-3 10 0,0-1 0,3-8 0,6-3 0,-1-10 0,14-6 0,-6-2 0,9-6 0,4-5 0,9-10 0,18-4 0,3-22 0,14 8 0,-14-5 0,13 1 0,-16 15 0,0-6 0,-15 9 0,-7 9 0,-9 9 0,-3 18 0,-12 9 0,-14 15 0,4-14 0,-10 11 0,21-22 0,-1 8 0,9-9 0,0-7 0,5-2 0,22-10 0,9-15 0,20 0 0,12-21 0,-9 14 0,9-14 0,0 13 0,-18-8 0,6 15 0,-28-3 0,-6 17 0,-7 4 0,-4 10 0,-5 7 0,-2-1 0,-6 10 0,1-7 0,-1 7 0,3-16 0,-2 4 0,7-4 0,4-4 0,5-2 0,5-11 0,-4-4 0,2 3 0,-10 1 0,-4 6 0,-32 15 0,1-5 0,-19 15 0,-1-13 0,20 3 0,-29 4 0,-17 6 0,15-9 0,-22 7 0,46-28 0,10 6 0,9-7 0,4 0 0,12 0 0,-5-4 0,6-1 0,-1-10 0,0-2 0,0 1 0,-10-16 0,-3-9 0,-19-11 0,10 3 0,-8 3 0,13 10 0,0 1 0,0 7 0,4 6 0,-1 9 0,8-2 0,1 5 0,6 5 0,0 1 0,1 4 0,-1 0 0,1 0 0,-1 0 0,1 0 0,3 4 0,-2-3 0,6 6 0,-3-2 0,4 4 0,0-1 0,0 1 0,0-1 0,4-3 0,-3 3 0,2-4 0,1 1 0,-3 3 0,7-7 0,-4 2 0,5-6 0,1-9 0,-5-5 0,0 1 0,-5 0 0,0 1 0,0 5 0,-4-1 0,-2 17 0,-4 7 0,0 4 0,3 5 0,4-5 0,3 0 0,0-2 0,0-7 0,0 1 0,3-4 0,2-2 0,4-3 0,6-5 0,2 4 0,-1-8 0,0 4 0,-8-3 0,1 3 0,-1-3 0,-3 7 0,-1-2 0</inkml:trace>
+</inkml:ink>
+</file>
+
+<file path=ppt/ink/ink13.xml><?xml version="1.0" encoding="utf-8"?>
+<inkml:ink xmlns:inkml="http://www.w3.org/2003/InkML">
+  <inkml:definitions>
+    <inkml:context xml:id="ctx0">
+      <inkml:inkSource xml:id="inkSrc0">
+        <inkml:traceFormat>
+          <inkml:channel name="X" type="integer" min="-2.14748E9" max="2.14748E9" units="cm"/>
+          <inkml:channel name="Y" type="integer" min="-2.14748E9" max="2.14748E9" units="cm"/>
+          <inkml:channel name="F" type="integer" max="32767" units="dev"/>
+        </inkml:traceFormat>
+        <inkml:channelProperties>
+          <inkml:channelProperty channel="X" name="resolution" value="1000" units="1/cm"/>
+          <inkml:channelProperty channel="Y" name="resolution" value="1000" units="1/cm"/>
+          <inkml:channelProperty channel="F" name="resolution" value="0" units="1/dev"/>
+        </inkml:channelProperties>
+      </inkml:inkSource>
+      <inkml:timestamp xml:id="ts0" timeString="2024-05-20T01:18:18.453"/>
+    </inkml:context>
+    <inkml:brush xml:id="br0">
+      <inkml:brushProperty name="width" value="0.035" units="cm"/>
+      <inkml:brushProperty name="height" value="0.035" units="cm"/>
+    </inkml:brush>
+  </inkml:definitions>
+  <inkml:trace contextRef="#ctx0" brushRef="#br0">1 1 24575,'0'68'0,"7"-4"0,1-19 0,0 0 0,-1 0 0,-7-1 0,6 1 0,-4-10 0,5 35 0,-1-27 0,-4 20 0,5-21 0,-2-16 0,-4 7 0,4 0 0,1-7 0,-5 16 0,4-16 0,-5 7 0,5-10 0,-3 1 0,3 9 0,-5-14 0,5 12 0,-4-14 0,4 16 0,1-7 0,-5 16 0,9-16 0,-8 16 0,3-16 0,2 16 0,-6-16 0,6 7 0,-2-9 0,-4-1 0,5-6 0,-1 5 0,-4-12 0,4 5 0,-5-7 0,0 1 0,0-1 0,0 1 0,0 0 0,4-1 0,-3 1 0,3 6 0,-4-5 0,4 5 0,-3-6 0,2-1 0,-3 1 0,0-15 0,0-13 0,-6-16 0,4 10 0,-5 5 0</inkml:trace>
+</inkml:ink>
+</file>
+
+<file path=ppt/ink/ink14.xml><?xml version="1.0" encoding="utf-8"?>
+<inkml:ink xmlns:inkml="http://www.w3.org/2003/InkML">
+  <inkml:definitions>
+    <inkml:context xml:id="ctx0">
+      <inkml:inkSource xml:id="inkSrc0">
+        <inkml:traceFormat>
+          <inkml:channel name="X" type="integer" min="-2.14748E9" max="2.14748E9" units="cm"/>
+          <inkml:channel name="Y" type="integer" min="-2.14748E9" max="2.14748E9" units="cm"/>
+          <inkml:channel name="F" type="integer" max="32767" units="dev"/>
+        </inkml:traceFormat>
+        <inkml:channelProperties>
+          <inkml:channelProperty channel="X" name="resolution" value="1000" units="1/cm"/>
+          <inkml:channelProperty channel="Y" name="resolution" value="1000" units="1/cm"/>
+          <inkml:channelProperty channel="F" name="resolution" value="0" units="1/dev"/>
+        </inkml:channelProperties>
+      </inkml:inkSource>
+      <inkml:timestamp xml:id="ts0" timeString="2024-05-20T01:18:20.106"/>
+    </inkml:context>
+    <inkml:brush xml:id="br0">
+      <inkml:brushProperty name="width" value="0.035" units="cm"/>
+      <inkml:brushProperty name="height" value="0.035" units="cm"/>
+    </inkml:brush>
+  </inkml:definitions>
+  <inkml:trace contextRef="#ctx0" brushRef="#br0">132 56 24575,'-8'9'0,"-1"-1"0,-1 8 0,1-6 0,-2 11 0,2-10 0,-2 10 0,1-4 0,3 0 0,-2-2 0,8-6 0,-6-1 0,2 1 0,0-1 0,1 1 0,1-4 0,2 2 0,-3-2 0,0 0 0,3 2 0,-3-16 0,8 6 0,7-19 0,1 6 0,6-17 0,-6 7 0,2-7 0,3 9 0,-6 8 0,6-6 0,-7 5 0,2-6 0,-2 6 0,0 5 0,-5 12 0,4 12 0,-4-2 0,11 7 0,-4-2 0,3-3 0,-3 9 0,-3-10 0,1 4 0,-2-7 0,7 7 0,-5-4 0,12 5 0,-10 0 0,3-5 0,-5 4 0,-1-10 0,-1 3 0,1-4 0,-4 5 0,2-4 0,-2-1 0,0-1 0,2-2 0,-6 3 0,3-4 0</inkml:trace>
+</inkml:ink>
+</file>
+
+<file path=ppt/ink/ink15.xml><?xml version="1.0" encoding="utf-8"?>
+<inkml:ink xmlns:inkml="http://www.w3.org/2003/InkML">
+  <inkml:definitions>
+    <inkml:context xml:id="ctx0">
+      <inkml:inkSource xml:id="inkSrc0">
+        <inkml:traceFormat>
+          <inkml:channel name="X" type="integer" min="-2.14748E9" max="2.14748E9" units="cm"/>
+          <inkml:channel name="Y" type="integer" min="-2.14748E9" max="2.14748E9" units="cm"/>
+          <inkml:channel name="F" type="integer" max="32767" units="dev"/>
+        </inkml:traceFormat>
+        <inkml:channelProperties>
+          <inkml:channelProperty channel="X" name="resolution" value="1000" units="1/cm"/>
+          <inkml:channelProperty channel="Y" name="resolution" value="1000" units="1/cm"/>
+          <inkml:channelProperty channel="F" name="resolution" value="0" units="1/dev"/>
+        </inkml:channelProperties>
+      </inkml:inkSource>
+      <inkml:timestamp xml:id="ts0" timeString="2024-05-20T01:22:53.257"/>
+    </inkml:context>
+    <inkml:brush xml:id="br0">
+      <inkml:brushProperty name="width" value="0.035" units="cm"/>
+      <inkml:brushProperty name="height" value="0.035" units="cm"/>
+    </inkml:brush>
+  </inkml:definitions>
+  <inkml:trace contextRef="#ctx0" brushRef="#br0">304 0 24575,'8'4'0,"7"2"0,2 4 0,1 7 0,5-4 0,-10 9 0,9-3 0,-4 4 0,0 1 0,7 8 0,-3 4 0,0-1 0,-1 8 0,-4-18 0,-1 18 0,1-17 0,-2 16 0,-3-16 0,-4 7 0,2-10 0,-2 10 0,-1-7 0,6 16 0,-6-16 0,1 17 0,4-8 0,-4 10 0,1-1 0,4 21 0,-5-15 0,1 27 0,-3-29 0,1 9 0,-6 0 0,6-9 0,-7 9 0,0 0 0,0-9 0,5 0 0,-3 7 0,3-17 0,-5 32 0,0-10 0,0-16 0,0 22 0,0-35 0,0 59 0,0-37 0,-7 24 0,6-20 0,-17 37 0,15-35 0,-14 29 0,15-52 0,-11 8 0,11 1 0,-11 0 0,3 12 0,1-9 0,-7 22 0,8-22 0,-10 21 0,2-21 0,0 9 0,8-12 0,-5 0 0,4 0 0,-4-10 0,-2 7 0,3-16 0,4 7 0,-2-10 0,2 10 0,-3-13 0,-7 21 0,7-21 0,-8 23 0,7-17 0,0 0 0,1-4 0,1-5 0,-1 0 0,0 4 0,6-11 0,-11 12 0,9-5 0,-10 7 0,5-1 0,2-6 0,-2 5 0,3-12 0,-7 11 0,6-10 0,-7 10 0,8-10 0,-7 10 0,9-10 0,-14 10 0,15-10 0,-11 10 0,9-11 0,-2 6 0,1-8 0,-1 7 0,1-5 0,-2 12 0,-5-10 0,5 3 0,-6 2 0,2-5 0,3 7 0,-3-8 0,6 1 0,1-7 0,3 2 0,-2-2 0,6 0 0,-3-1 0</inkml:trace>
+</inkml:ink>
+</file>
+
+<file path=ppt/ink/ink16.xml><?xml version="1.0" encoding="utf-8"?>
+<inkml:ink xmlns:inkml="http://www.w3.org/2003/InkML">
+  <inkml:definitions>
+    <inkml:context xml:id="ctx0">
+      <inkml:inkSource xml:id="inkSrc0">
+        <inkml:traceFormat>
+          <inkml:channel name="X" type="integer" min="-2.14748E9" max="2.14748E9" units="cm"/>
+          <inkml:channel name="Y" type="integer" min="-2.14748E9" max="2.14748E9" units="cm"/>
+          <inkml:channel name="F" type="integer" max="32767" units="dev"/>
+        </inkml:traceFormat>
+        <inkml:channelProperties>
+          <inkml:channelProperty channel="X" name="resolution" value="1000" units="1/cm"/>
+          <inkml:channelProperty channel="Y" name="resolution" value="1000" units="1/cm"/>
+          <inkml:channelProperty channel="F" name="resolution" value="0" units="1/dev"/>
+        </inkml:channelProperties>
+      </inkml:inkSource>
+      <inkml:timestamp xml:id="ts0" timeString="2024-05-20T01:22:54.704"/>
+    </inkml:context>
+    <inkml:brush xml:id="br0">
+      <inkml:brushProperty name="width" value="0.035" units="cm"/>
+      <inkml:brushProperty name="height" value="0.035" units="cm"/>
+    </inkml:brush>
+  </inkml:definitions>
+  <inkml:trace contextRef="#ctx0" brushRef="#br0">91 0 24575,'0'9'0,"0"6"0,0-5 0,0 5 0,0 0 0,0 2 0,-5 7 0,4-8 0,-10 6 0,5-5 0,-1 0 0,2 5 0,1-12 0,4 5 0,-8-7 0,7 1 0,-3 0 0,0-1 0,3 1 0,-2-1 0,-1 1 0,3-1 0,-3 1 0,0-5 0,3 4 0,-2-3 0,-1-1 0,3 4 0,-3-3 0,4 3 0,0 1 0,-4-4 0,3 2 0,1-6 0,5 3 0,4-4 0,15 0 0,-5 0 0,8 0 0,4 0 0,-12-5 0,24 3 0,-18-3 0,2 5 0,4-7 0,-18 6 0,18-6 0,-14 2 0,-1 0 0,6-1 0,-12 2 0,12 4 0,-12 0 0,5 0 0,-6 0 0,0 0 0,-5-4 0,0 3 0,-4-3 0</inkml:trace>
+</inkml:ink>
+</file>
+
+<file path=ppt/ink/ink17.xml><?xml version="1.0" encoding="utf-8"?>
+<inkml:ink xmlns:inkml="http://www.w3.org/2003/InkML">
+  <inkml:definitions>
+    <inkml:context xml:id="ctx0">
+      <inkml:inkSource xml:id="inkSrc0">
+        <inkml:traceFormat>
+          <inkml:channel name="X" type="integer" min="-2.14748E9" max="2.14748E9" units="cm"/>
+          <inkml:channel name="Y" type="integer" min="-2.14748E9" max="2.14748E9" units="cm"/>
+          <inkml:channel name="F" type="integer" max="32767" units="dev"/>
+        </inkml:traceFormat>
+        <inkml:channelProperties>
+          <inkml:channelProperty channel="X" name="resolution" value="1000" units="1/cm"/>
+          <inkml:channelProperty channel="Y" name="resolution" value="1000" units="1/cm"/>
+          <inkml:channelProperty channel="F" name="resolution" value="0" units="1/dev"/>
+        </inkml:channelProperties>
+      </inkml:inkSource>
+      <inkml:timestamp xml:id="ts0" timeString="2024-05-20T01:28:06.095"/>
+    </inkml:context>
+    <inkml:brush xml:id="br0">
+      <inkml:brushProperty name="width" value="0.035" units="cm"/>
+      <inkml:brushProperty name="height" value="0.035" units="cm"/>
+    </inkml:brush>
+  </inkml:definitions>
+  <inkml:trace contextRef="#ctx0" brushRef="#br0">371 53 24575,'-52'13'0,"-1"0"0,-40 11 0,58-11 0,-8 2 0,18-3 0,-8 1 0,16-6 0,6 2 0,3-8 0,17-8 0,1-1 0,13-9 0,1 5 0,-1 1 0,-5-6 0,4 4 0,-3-4 0,-3 10 0,-4-2 0,-5 8 0,-6 1 0,3 12 0,-9 5 0,4-1 0,-8 0 0,8-8 0,-3 1 0,4-1 0,10-3 0,3-7 0,33 1 0,-8-11 0,19 4 0,-12-7 0,-10 7 0,-9-3 0,-10 10 0,-8-2 0,-7 3 0,-2 3 0,-14 4 0,-2 3 0,-1 7 0,-4-9 0,9 12 0,-3-17 0,0 7 0,6-6 0,-6 1 0,8 0 0,14-2 0,-4-6 0,20-3 0,-5 0 0,6-4 0,-6 5 0,-2-5 0,-6 5 0,-5-2 0,-10 6 0,-7 2 0,-20 7 0,-2 6 0,6-2 0,-2 0 0,14-1 0,0-1 0,2-4 0,14-2 0,8-4 0,20 0 0,8-7 0,10-1 0,0-7 0,-1 0 0,1 7 0,0-5 0,-10 6 0,-8-1 0,-20 6 0,-14 9 0,-10 3 0,-7 7 0,8-6 0,-6 6 0,12-8 0,-12 7 0,12-9 0,-5 7 0,14-13 0,2 3 0,7-8 0,1 3 0,-5 1 0,4 1 0,3 3 0,-1-4 0,6 0 0,-8 0 0,1 0 0,-1 0 0,-7 0 0,-3 10 0,-14-2 0,-2 14 0,1-10 0,1 9 0,7-10 0,-1 0 0,15-12 0,-2-4 0,19-7 0,4-6 0,9 3 0,1-5 0,-3 6 0,-10 3 0,-6 0 0,-2 5 0,-21 8 0,4 3 0,-13 5 0,6-2 0,1-3 0,3 2 0,11-11 0,7 7 0,11-14 0,-1 5 0,1-6 0,-7 2 0,-2 4 0,-7-2 0,1 7 0,-8-3 0,-9 4 0,-2-3 0,-12 2 0,12-3 0,-12 4 0,12 0 0,-5 0 0,6 0 0,1 0 0,3-11 0,5 5 0,6-16 0,3 12 0,-3-12 0,2 12 0,-7-12 0,6 12 0,-6-5 0,3 6 0,-14 5 0,-3 0 0,-11 4 0,1 0 0,-10 0 0,-2 0 0,6 4 0,-2-3 0,21 2 0,-6-3 0,8 0 0,-1 0 0,8 0 0,9-5 0,2 0 0,5-1 0,0-3 0,-4 4 0,4-1 0,-7-2 0,1 7 0,-8-3 0,2 4 0,-7 0 0</inkml:trace>
+</inkml:ink>
+</file>
+
+<file path=ppt/ink/ink18.xml><?xml version="1.0" encoding="utf-8"?>
+<inkml:ink xmlns:inkml="http://www.w3.org/2003/InkML">
+  <inkml:definitions>
+    <inkml:context xml:id="ctx0">
+      <inkml:inkSource xml:id="inkSrc0">
+        <inkml:traceFormat>
+          <inkml:channel name="X" type="integer" min="-2.14748E9" max="2.14748E9" units="cm"/>
+          <inkml:channel name="Y" type="integer" min="-2.14748E9" max="2.14748E9" units="cm"/>
+          <inkml:channel name="F" type="integer" max="32767" units="dev"/>
+        </inkml:traceFormat>
+        <inkml:channelProperties>
+          <inkml:channelProperty channel="X" name="resolution" value="1000" units="1/cm"/>
+          <inkml:channelProperty channel="Y" name="resolution" value="1000" units="1/cm"/>
+          <inkml:channelProperty channel="F" name="resolution" value="0" units="1/dev"/>
+        </inkml:channelProperties>
+      </inkml:inkSource>
+      <inkml:timestamp xml:id="ts0" timeString="2024-05-20T01:27:54.881"/>
+    </inkml:context>
+    <inkml:brush xml:id="br0">
+      <inkml:brushProperty name="width" value="0.035" units="cm"/>
+      <inkml:brushProperty name="height" value="0.035" units="cm"/>
+    </inkml:brush>
+  </inkml:definitions>
+  <inkml:trace contextRef="#ctx0" brushRef="#br0">306 144 24575,'0'-12'0,"-4"6"0,-1 2 0,-19 5 0,5 8 0,-8-8 0,5 4 0,12-1 0,-5-3 0,0 3 0,5-4 0,-2-4 0,12-1 0,5-3 0,4-1 0,-1 1 0,1-1 0,6-1 0,-5 2 0,5-2 0,-6 1 0,-1 1 0,1 3 0,-4-3 0,2 7 0,-2-2 0,10 3 0,-5 0 0,5-4 0,0 3 0,-4-3 0,4 4 0,-7-4 0,1 3 0,-8-2 0,-9 8 0,-9-4 0,-1 15 0,-4-14 0,10 12 0,-9-7 0,11-2 0,-6 4 0,8-5 0,-1 1 0,1-1 0,3 0 0,-3-3 0,4 2 0,-1 1 0,5-3 0,5 3 0,10-9 0,2 3 0,0-7 0,4 9 0,-11-8 0,6 7 0,-8-3 0,-14 4 0,2 11 0,-18-4 0,11 9 0,-11-5 0,5 0 0,0-1 0,2 0 0,7-5 0,3 2 0,-3-6 0,18 3 0,-1-4 0,14-5 0,1-2 0,-1 1 0,1-5 0,-7 6 0,4-1 0,-10-2 0,4 7 0,-7-6 0,-3 10 0,-5-6 0,-5 10 0,-3-2 0,13 0 0,-2-1 0,12-8 0,0 3 0,-8-7 0,7 7 0,-9-2 0,-4 6 0,-9 9 0,-18 8 0,0 4 0,-17 5 0,8-2 0,0 0 0,2-6 0,9 1 0,1-9 0,6 3 0,2-10 0,14-2 0,9-4 0,9-6 0,15-2 0,-6-4 0,1 4 0,-6-2 0,-10 5 0,4-1 0,-7 2 0,-3 0 0,3 3 0,-4-3 0,5 1 0,-1-2 0,1 0 0,-1-2 0,1 2 0,-1 0 0,-3-2 0,-1 9 0,-9 6 0,3 2 0,-7 5 0,8-6 0,-6-1 0,6 1 0,-3-1 0,4 1 0,4-4 0,-7 2 0,2-6 0,-7 3 0,-1-4 0,4-4 0,7-7 0,4-6 0,11-6 0,-2-10 0,7 7 0,-9-1 0,4 6 0,-8 11 0,-3-6 0,1 12 0,-9 0 0,-6 4 0,-9 0 0,0 0 0,2 0 0,0 5 0,5-4 0,-5 5 0,6-6 0,4 3 0,5-5 0,12-6 0,5-9 0,6-1 0,-6 2 0,-2 6 0,-6 2 0,-5-1 0,4 5 0,-11 0 0,-5 4 0,-8 5 0,-8 2 0,7 3 0,2-4 0,0 3 0,5-4 0,-5 1 0,14-2 0,2-8 0,7 0 0,1-1 0,-1-3 0,1 4 0,-1-1 0,-3-3 0,-5 7 0,-5 1 0,-3 1 0,-1 3 0,1-4 0,3-4 0,1-1 0,4-3 0,4 3 0,-3-2 0,3 2 0,-15 0 0,-11 1 0,3 4 0,-34 8 0,30 0 0,-22 1 0,28 0 0,2-8 0,6 3 0,1 0 0,7-3 0,9-3 0,8-4 0,1-5 0,5 0 0,-12 2 0,12-2 0,-12 6 0,5-4 0,-6 4 0,-1 0 0,1 1 0,-4 1 0,-2 5 0,-8 6 0,-7 9 0,-1 6 0,-2-6 0,5-2 0,5-6 0,-2-1 0,2 1 0,-4-1 0,5 1 0,-11 1 0,2 0 0,-3 0 0,-6 7 0,5-6 0,-6 6 0,6-6 0,2-1 0,6-6 0,4 4 0,5-7 0,12 3 0,5-9 0,15 3 0,-6-8 0,1 5 0,-6-1 0,-10 2 0,4 4 0,-7 0 0,1 0 0,-1-4 0,1 3 0,-1-3 0,1 4 0,-1 0 0,1 0 0,-4 4 0,2-3 0,-2 7 0,3-8 0,1 8 0,-1-3 0,1 3 0,-4 1 0,2-1 0,-6 1 0,3-1 0,-4 1 0,4-4 0,1-2 0,-1-6 0,0 2 0,-4-3 0</inkml:trace>
+</inkml:ink>
+</file>
+
+<file path=ppt/ink/ink19.xml><?xml version="1.0" encoding="utf-8"?>
+<inkml:ink xmlns:inkml="http://www.w3.org/2003/InkML">
+  <inkml:definitions>
+    <inkml:context xml:id="ctx0">
+      <inkml:inkSource xml:id="inkSrc0">
+        <inkml:traceFormat>
+          <inkml:channel name="X" type="integer" min="-2.14748E9" max="2.14748E9" units="cm"/>
+          <inkml:channel name="Y" type="integer" min="-2.14748E9" max="2.14748E9" units="cm"/>
+          <inkml:channel name="F" type="integer" max="32767" units="dev"/>
+        </inkml:traceFormat>
+        <inkml:channelProperties>
+          <inkml:channelProperty channel="X" name="resolution" value="1000" units="1/cm"/>
+          <inkml:channelProperty channel="Y" name="resolution" value="1000" units="1/cm"/>
+          <inkml:channelProperty channel="F" name="resolution" value="0" units="1/dev"/>
+        </inkml:channelProperties>
+      </inkml:inkSource>
+      <inkml:timestamp xml:id="ts0" timeString="2024-05-20T01:27:29.218"/>
+    </inkml:context>
+    <inkml:brush xml:id="br0">
+      <inkml:brushProperty name="width" value="0.035" units="cm"/>
+      <inkml:brushProperty name="height" value="0.035" units="cm"/>
+    </inkml:brush>
+  </inkml:definitions>
+  <inkml:trace contextRef="#ctx0" brushRef="#br0">252 78 24575,'-51'17'0,"13"-3"0,16-3 0,12-2 0,-5 1 0,6-2 0,1 1 0,-1-1 0,4 1 0,22-18 0,-2 5 0,27-24 0,-6 6 0,-1-5 0,-9 11 0,-4-5 0,-12 15 0,5-5 0,-10 3 0,-22 23 0,1-5 0,-17 19 0,9-6 0,1-4 0,-1 3 0,1-4 0,6-1 0,2-2 0,6-7 0,1 1 0,-1-1 0,5 1 0,4-4 0,11-2 0,6-8 0,16-9 0,2-1 0,0-6 0,-2 8 0,-16 7 0,-2-3 0,-6 4 0,-1 0 0,-3 5 0,-6 12 0,-11 4 0,-1 8 0,-4-1 0,0 1 0,5-7 0,-4 4 0,7-10 0,3 4 0,-2-11 0,11 0 0,-2-8 0,24-10 0,3-6 0,29-13 0,-25 12 0,12-1 0,-34 13 0,12-3 0,-16 4 0,8 1 0,-13 7 0,-1 5 0,-6 10 0,-4 2 0,-2 7 0,-5-1 0,6-6 0,-6 5 0,2-6 0,3 1 0,-3-2 0,10 0 0,-2-8 0,2 7 0,0-9 0,5 0 0,11-12 0,0 0 0,4-4 0,0 2 0,-5 4 0,5-5 0,-6 5 0,-5-2 0,0 10 0,-14 4 0,-3 10 0,-5 6 0,-5 1 0,10-1 0,-2-6 0,5-2 0,-5-5 0,8-1 0,-7 1 0,10-1 0,9-10 0,-2 0 0,28-19 0,-12 8 0,24-16 0,-24 16 0,6-6 0,-17 9 0,1 1 0,-8 3 0,-9 7 0,-9 4 0,-6 6 0,-1-6 0,1 5 0,6-10 0,-5 9 0,12-8 0,-5 3 0,6-5 0,1 0 0,-1 0 0,1 0 0,3-4 0,1-1 0,4-10 0,0-2 0,6-6 0,-5 0 0,4 6 0,-5-5 0,0 12 0,4-5 0,-7 10 0,2 5 0,-8 1 0,1 6 0,-1-6 0,5 7 0,4-7 0,11-3 0,-1-3 0,5-5 0,-6 2 0,-1 3 0,1-2 0,-1 2 0,1-4 0,-4 8 0,-12 4 0,1 6 0,-16 7 0,12-6 0,-5 6 0,6-8 0,1 1 0,3-1 0,-3-3 0,11-1 0,-2-4 0,8-4 0,-1-1 0,7-5 0,-5 1 0,2-1 0,-5 6 0,-6-4 0,7 3 0,-2-10 0,4-2 0,2-6 0,0-1 0,0 1 0,-2 6 0,-4 2 0,-22 17 0,-9-4 0,-10 19 0,-20 2 0,26 0 0,-16 4 0,12-10 0,7 4 0,3-4 0,3-1 0,13-5 0,-8-6 0,14-1 0,5-21 0,12 2 0,6-23 0,5 7 0,-5-1 0,3 3 0,-12 10 0,3 6 0,-10 2 0,-6 10 0,-5 5 0,-4 5 0,1 3 0,-1 1 0,-6 1 0,9-1 0,-8-3 0,13 2 0,-7-8 0,11 4 0,5-9 0,3-7 0,11-1 0,-3-4 0,-3 7 0,-1 0 0,1 0 0,-6 1 0,1 14 0,-12 4 0,-6 14 0,-6 10 0,-4-7 0,1 16 0,-1-16 0,9 7 0,-1-16 0,8 5 0,-7-12 0,7 5 0,1-10 0,12-7 0,4-4 0,8-6 0,9-1 0,-14 6 0,6-3 0,-17 5 0,-3 4 0,-1 9 0,-4 2 0,-6 12 0,0-6 0,-1 8 0,-2-7 0,3 4 0,1-4 0,-4 0 0,8-2 0,8-10 0,6-1 0,10-10 0,10-8 0,-7 5 0,7-9 0,-16 13 0,-2-1 0,-10 6 0,-2 4 0,-3 12 0,-3-6 0,-2 5 0,0-7 0,-2 1 0,6-1 0,-3 1 0,4-1 0,0 1 0,0-4 0,0-1 0</inkml:trace>
 </inkml:ink>
 </file>
 
@@ -221,6 +442,276 @@
 </inkml:ink>
 </file>
 
+<file path=ppt/ink/ink20.xml><?xml version="1.0" encoding="utf-8"?>
+<inkml:ink xmlns:inkml="http://www.w3.org/2003/InkML">
+  <inkml:definitions>
+    <inkml:context xml:id="ctx0">
+      <inkml:inkSource xml:id="inkSrc0">
+        <inkml:traceFormat>
+          <inkml:channel name="X" type="integer" min="-2.14748E9" max="2.14748E9" units="cm"/>
+          <inkml:channel name="Y" type="integer" min="-2.14748E9" max="2.14748E9" units="cm"/>
+          <inkml:channel name="F" type="integer" max="32767" units="dev"/>
+        </inkml:traceFormat>
+        <inkml:channelProperties>
+          <inkml:channelProperty channel="X" name="resolution" value="1000" units="1/cm"/>
+          <inkml:channelProperty channel="Y" name="resolution" value="1000" units="1/cm"/>
+          <inkml:channelProperty channel="F" name="resolution" value="0" units="1/dev"/>
+        </inkml:channelProperties>
+      </inkml:inkSource>
+      <inkml:timestamp xml:id="ts0" timeString="2024-05-20T01:27:20.382"/>
+    </inkml:context>
+    <inkml:brush xml:id="br0">
+      <inkml:brushProperty name="width" value="0.035" units="cm"/>
+      <inkml:brushProperty name="height" value="0.035" units="cm"/>
+    </inkml:brush>
+  </inkml:definitions>
+  <inkml:trace contextRef="#ctx0" brushRef="#br0">307 181 24575,'-19'3'0,"8"2"0,-14 5 0,14-1 0,-10 8 0,10-7 0,-4 5 0,0-5 0,5-1 0,-5 1 0,6-2 0,1-3 0,-1 3 0,1-8 0,3 8 0,-3-7 0,4 3 0,9-9 0,-1-7 0,12 4 0,0-13 0,1 13 0,7-14 0,-1 9 0,-6 2 0,-2 2 0,-6 8 0,-5-7 0,4 7 0,-11-3 0,1 15 0,-14-4 0,5 9 0,-5-6 0,7 5 0,0-5 0,-1 5 0,1-6 0,1-1 0,3 1 0,-3-4 0,7 2 0,1-6 0,5-1 0,20-7 0,-6-9 0,23 0 0,-6-9 0,-1 9 0,-9-2 0,-4 12 0,-16-2 0,5 11 0,-15-2 0,-2 14 0,-10 2 0,-5 16 0,-3-7 0,5 0 0,-3-4 0,5-5 0,0-1 0,-5 6 0,6-10 0,3 3 0,-8-3 0,14-3 0,-4 1 0,3-6 0,18-5 0,-1-11 0,14-6 0,1 0 0,9-7 0,-7 11 0,0-4 0,-4 6 0,-12 7 0,1-4 0,-7 12 0,-9 5 0,-7 8 0,1 1 0,-1 5 0,5-12 0,0 12 0,-1-12 0,1 5 0,0-6 0,10-4 0,4-12 0,10-1 0,0-7 0,14-5 0,-12 8 0,14-8 0,-16 10 0,5-2 0,-12 4 0,5 1 0,-10 7 0,-5 5 0,-6 10 0,-5 2 0,0 6 0,-1 1 0,2-7 0,-2 5 0,3-12 0,0 1 0,4-3 0,-4 3 0,4-5 0,-1 9 0,-2-11 0,11 1 0,-2-5 0,7-5 0,7-10 0,-4 5 0,4-5 0,-7 6 0,1 5 0,-4-4 0,2 7 0,-10-3 0,2 8 0,-9 7 0,-5 1 0,3 4 0,-4 0 0,7-6 0,-1 5 0,5-6 0,-2-4 0,9-2 0,6-8 0,9-1 0,16-7 0,2-8 0,0 6 0,-2-10 0,-16 18 0,5-14 0,-12 18 0,5-11 0,-14 17 0,-2-2 0,-14 14 0,-2-4 0,0 5 0,2-6 0,7-2 0,-7 2 0,8-1 0,-7-3 0,13-6 0,-3-11 0,4-6 0,4 0 0,2-4 0,-1 10 0,4 0 0,-18 7 0,0 15 0,-15-4 0,-9 18 0,7-11 0,-7 6 0,17-13 0,-6 3 0,12-9 0,-2 8 0,5-8 0,6-1 0,-3-11 0,9-6 0,2-6 0,6-10 0,-1 7 0,-4-7 0,2 9 0,-2-8 0,-1 6 0,0-7 0,-7 16 0,0 2 0,0 6 0,-4 1 0,-1 3 0,-3 1 0,-1 4 0,1 0 0,-1 0 0,1 0 0,-1 0 0,1 0 0,7 0 0,2-4 0,14-2 0,2-4 0,6-2 0,0 6 0,-6-3 0,5 3 0,-12 1 0,5-4 0,-6 8 0,-4-7 0,2 7 0,-6-6 0,3 2 0,-4-4 0,0 1 0,0-1 0,4 1 0,0-1 0,6-6 0,-1 5 0,-3-12 0,2 12 0,-3-5 0,-1 6 0,4 4 0,-7-2 0,-8 11 0,-6-1 0,-20 17 0,-14 4 0,8 4 0,-34 19 0,34-16 0,-15 11 0,12-12 0,16-11 0,-17 8 0,24-14 0,-12 6 0,21-10 0,-5 1 0,10-1 0,-3-1 0,18-3 0,-1-12 0,24-2 0,-7-14 0,7 9 0,-10-3 0,-6 7 0,5-2 0,-12 3 0,5 0 0,-10 8 0,-5 2 0,-5 7 0,0 1 0,-2-1 0,6 1 0,-3-1 0,14-8 0,13-4 0,17-28 0,33 1 0,-17-12 0,17 14 0,-38 9 0,-2 7 0,-25 17 0,-15 26 0,-16 8 0,-21 24 0,15-26 0,-11 11 0,13-12 0,0-5 0,5 2 0,0-19 0,11 2 0,-4-5 0,6-1 0,8-4 0,9-7 0,8-4 0,8-6 0,-7 5 0,-2-2 0,-7 8 0,1-6 0,-10 16 0,-6 1 0,-5 6 0,-10 6 0,12-12 0,-7 12 0,9-16 0,1 9 0,4-11 0,6 1 0,9-6 0,5-1 0,6-8 0,0 9 0,-6-4 0,5-1 0,-12 5 0,5-4 0,-6 5 0,-4 0 0,-2 0 0</inkml:trace>
+</inkml:ink>
+</file>
+
+<file path=ppt/ink/ink21.xml><?xml version="1.0" encoding="utf-8"?>
+<inkml:ink xmlns:inkml="http://www.w3.org/2003/InkML">
+  <inkml:definitions>
+    <inkml:context xml:id="ctx0">
+      <inkml:inkSource xml:id="inkSrc0">
+        <inkml:traceFormat>
+          <inkml:channel name="X" type="integer" min="-2.14748E9" max="2.14748E9" units="cm"/>
+          <inkml:channel name="Y" type="integer" min="-2.14748E9" max="2.14748E9" units="cm"/>
+          <inkml:channel name="F" type="integer" max="32767" units="dev"/>
+        </inkml:traceFormat>
+        <inkml:channelProperties>
+          <inkml:channelProperty channel="X" name="resolution" value="1000" units="1/cm"/>
+          <inkml:channelProperty channel="Y" name="resolution" value="1000" units="1/cm"/>
+          <inkml:channelProperty channel="F" name="resolution" value="0" units="1/dev"/>
+        </inkml:channelProperties>
+      </inkml:inkSource>
+      <inkml:timestamp xml:id="ts0" timeString="2024-05-17T16:13:34.997"/>
+    </inkml:context>
+    <inkml:brush xml:id="br0">
+      <inkml:brushProperty name="width" value="0.035" units="cm"/>
+      <inkml:brushProperty name="height" value="0.035" units="cm"/>
+    </inkml:brush>
+  </inkml:definitions>
+  <inkml:trace contextRef="#ctx0" brushRef="#br0">0 1 24575,'86'33'0,"-1"0"0,0 0 0,1 0 0,-1 0 0,9 7 0,5 3 0,-20-1 0,-45-3 0,-73 6 0,-25-3 0,-1 13 0,14-15 0,12-16 0,33-28 0,2 3 0,4-4 0</inkml:trace>
+</inkml:ink>
+</file>
+
+<file path=ppt/ink/ink22.xml><?xml version="1.0" encoding="utf-8"?>
+<inkml:ink xmlns:inkml="http://www.w3.org/2003/InkML">
+  <inkml:definitions>
+    <inkml:context xml:id="ctx0">
+      <inkml:inkSource xml:id="inkSrc0">
+        <inkml:traceFormat>
+          <inkml:channel name="X" type="integer" min="-2.14748E9" max="2.14748E9" units="cm"/>
+          <inkml:channel name="Y" type="integer" min="-2.14748E9" max="2.14748E9" units="cm"/>
+          <inkml:channel name="F" type="integer" max="32767" units="dev"/>
+        </inkml:traceFormat>
+        <inkml:channelProperties>
+          <inkml:channelProperty channel="X" name="resolution" value="1000" units="1/cm"/>
+          <inkml:channelProperty channel="Y" name="resolution" value="1000" units="1/cm"/>
+          <inkml:channelProperty channel="F" name="resolution" value="0" units="1/dev"/>
+        </inkml:channelProperties>
+      </inkml:inkSource>
+      <inkml:timestamp xml:id="ts0" timeString="2024-05-17T16:13:37.294"/>
+    </inkml:context>
+    <inkml:brush xml:id="br0">
+      <inkml:brushProperty name="width" value="0.035" units="cm"/>
+      <inkml:brushProperty name="height" value="0.035" units="cm"/>
+    </inkml:brush>
+  </inkml:definitions>
+  <inkml:trace contextRef="#ctx0" brushRef="#br0">209 39 24575,'28'0'0,"5"0"0,32-10 0,-10 1 0,24-3 0,-35 5 0,0 7 0,-27 0 0,-16 4 0,-4 9 0,-21 31 0,-7 5 0,-5 8-1045,-7 14 0,-3 1 1045,-6 4 0,0-2 0,11-13 0,2-3-286,3-11 0,3-2 286,-8 26 0,-2-7 0,11-12 0,19-21 0,4-15 2024,18-6-2024,52-33 0,-24 6 0,43-25 0,9-3-528,-42 24 1,-1-2 527,37-27 0,2-1 0,-22 24 0,-6 2-780,22-28 780,4 20 0,-50 12 0,-5 12 0,-27 9 0,-10 7 1622,-41 43-1622,-1-6 0,13-7 0,-2 4 0,0-1 0,2-2 0,-12 12 0,10-5 0,1 0 0,4 0 0,-13 16 851,15-12-851,11-20 0,-7 3 0,21-15 0,-4-5 0,16-7 0,20-16 0,13-20 0,47-13 0,-6-7-942,-25 21 1,1 1 941,31-16 0,-21 2 0,-20 19 0,-37 28 0,-37 38 0,0-2 0,-4 6-1162,-3 8 1,-3 5 1161,-4 0 0,-4 6 0,2-2 0,-9 21 0,1-1 0,12-23 0,-2-1 0,4-2 0,1 5 0,6-6 0,-9 16 0,26-32 1648,7-10-1648,-1-17 0,13-8 0,-2-5 2558,42-19-2558,7-4 0,19-15 0,10-2 0,-43 15 0,6 6 0,-36 10 0,2 8 0,-11 1 0,-21 29 0,-20 26 0,1-6 0,0 3 0,-9 29 0,15-33 0,7-5 0,18-3 0,-9-2 0,20-19 0,-5-2 0,28-11 0,21-2 0,7-9 0,7-2-695,7-1 0,3 0 695,7-5 0,0 0 0,-9 5 0,-5 0 0,15-8 0,-31 14 0,-38 19 0,-31 16 0,-22 40 0,-4-12-779,17-17 0,-1 5 779,-5 10 0,0 0 270,6-9 0,2 0-270,-6 10 0,7-4 0,9-12 0,15-15 0,19-24 0,13-1 1605,30-13-1605,13-2 0,-18 5 0,1 0 803,22-11-803,-2 15 0,-41-5 0,-17 19 0,-16 13 0,-14 16 0,-12 3 0,-3 3-661,-11 14 661,5-1 0,0 2 0,0 11 0,5 2 0,7-23 0,19-25 0,1-8 0,6-2 0,4-11 0,34-2 661,13-13-661,31 6 0,-13-6 0,-22 9 0,-19 0 0,-27 0 0,-2 5 0,-27 11 0,-10 19 0,-28 6 0,2 19 0,8-23 0,14 5 0,22-22 0,7-3 0,21-12 0,18 0 0,28-5 0,15-19 0,14 15 0,-15-15 0,-13 19 0,-25 0 0,-22 0 0,-11 12 0,-14-3 0,-4 16 0,-6-4 0,7 6 0,2-8 0,7-2 0,5-7 0,6-9 0,6-2 0,11-11 0,-10 2 0,11-9 0,-17 0 0,5-7 0,-6 11 0,0 3 0</inkml:trace>
+</inkml:ink>
+</file>
+
+<file path=ppt/ink/ink23.xml><?xml version="1.0" encoding="utf-8"?>
+<inkml:ink xmlns:inkml="http://www.w3.org/2003/InkML">
+  <inkml:definitions>
+    <inkml:context xml:id="ctx0">
+      <inkml:inkSource xml:id="inkSrc0">
+        <inkml:traceFormat>
+          <inkml:channel name="X" type="integer" min="-2.14748E9" max="2.14748E9" units="cm"/>
+          <inkml:channel name="Y" type="integer" min="-2.14748E9" max="2.14748E9" units="cm"/>
+          <inkml:channel name="F" type="integer" max="32767" units="dev"/>
+        </inkml:traceFormat>
+        <inkml:channelProperties>
+          <inkml:channelProperty channel="X" name="resolution" value="1000" units="1/cm"/>
+          <inkml:channelProperty channel="Y" name="resolution" value="1000" units="1/cm"/>
+          <inkml:channelProperty channel="F" name="resolution" value="0" units="1/dev"/>
+        </inkml:channelProperties>
+      </inkml:inkSource>
+      <inkml:timestamp xml:id="ts0" timeString="2024-05-17T16:13:38.525"/>
+    </inkml:context>
+    <inkml:brush xml:id="br0">
+      <inkml:brushProperty name="width" value="0.035" units="cm"/>
+      <inkml:brushProperty name="height" value="0.035" units="cm"/>
+    </inkml:brush>
+  </inkml:definitions>
+  <inkml:trace contextRef="#ctx0" brushRef="#br0">0 3294 24575,'0'10'0,"4"-5"0,-2-12 0,8-8 0,-1-23 0,6-2 0,12-32 0,3-11-1242,-8 19 0,1-2 1242,5-3 0,4-8 0,-1 3-914,-5 9 1,-1 1 0,1 0 913,3-2 0,2 0 0,0-1 0,0-7 0,0 0 0,2-2-917,5-2 1,1-1-1,1 1 917,-2 6 0,-1 2 0,3 0 0,0 4 0,3 0 0,2 4-621,1 4 1,4 3-1,8-4 621,1 3 0,10-6 0,3-1 0,-1 3 0,-6 7 0,5-2 0,-6 6 0,8-4-198,-6 3 1,8-6 0,3 0 0,-5 3 0,-8 8 197,18-9 0,-6 10 0,10 5 0,-1 1 241,-5-5 1,-1 1-242,4 6 0,-3 4 727,-24 12 0,-2 0-727,18-12 0,-5 3 1966,-5 8-1966,32-11 0,-36 14 3448,0 1-3448,4 6 2100,-40 1-2100,6 9 1279,-18-8-1279,-1 8 23,-3-8 0,-2 8 0,-4-3 0</inkml:trace>
+</inkml:ink>
+</file>
+
+<file path=ppt/ink/ink24.xml><?xml version="1.0" encoding="utf-8"?>
+<inkml:ink xmlns:inkml="http://www.w3.org/2003/InkML">
+  <inkml:definitions>
+    <inkml:context xml:id="ctx0">
+      <inkml:inkSource xml:id="inkSrc0">
+        <inkml:traceFormat>
+          <inkml:channel name="X" type="integer" min="-2.14748E9" max="2.14748E9" units="cm"/>
+          <inkml:channel name="Y" type="integer" min="-2.14748E9" max="2.14748E9" units="cm"/>
+          <inkml:channel name="F" type="integer" max="32767" units="dev"/>
+        </inkml:traceFormat>
+        <inkml:channelProperties>
+          <inkml:channelProperty channel="X" name="resolution" value="1000" units="1/cm"/>
+          <inkml:channelProperty channel="Y" name="resolution" value="1000" units="1/cm"/>
+          <inkml:channelProperty channel="F" name="resolution" value="0" units="1/dev"/>
+        </inkml:channelProperties>
+      </inkml:inkSource>
+      <inkml:timestamp xml:id="ts0" timeString="2024-05-17T16:13:39.460"/>
+    </inkml:context>
+    <inkml:brush xml:id="br0">
+      <inkml:brushProperty name="width" value="0.035" units="cm"/>
+      <inkml:brushProperty name="height" value="0.035" units="cm"/>
+    </inkml:brush>
+  </inkml:definitions>
+  <inkml:trace contextRef="#ctx0" brushRef="#br0">92 0 24575,'4'6'0,"9"-2"0,6 2 0,19-4 0,2 3 0,11-5 0,0 0 0,0 0 0,14 0 0,-21-5 0,19 3 0,-41-4 0,6 6 0,-19 0 0,1 0 0,0 0 0,0 0 0,-1 0 0,-8 4 0,-9 9 0,-22 10 0,-15 20 0,-13 7 0,9 7 0,-10 4 0,9-4 0,10-11 0,-5 8 0,8-9 0,-13 12 0,10-11 0,-4 8 0,22-25 0,-2 9 0,6-19 0,11-2 0,3-7 0,4-5 0,0 0 0</inkml:trace>
+</inkml:ink>
+</file>
+
+<file path=ppt/ink/ink25.xml><?xml version="1.0" encoding="utf-8"?>
+<inkml:ink xmlns:inkml="http://www.w3.org/2003/InkML">
+  <inkml:definitions>
+    <inkml:context xml:id="ctx0">
+      <inkml:inkSource xml:id="inkSrc0">
+        <inkml:traceFormat>
+          <inkml:channel name="X" type="integer" min="-2.14748E9" max="2.14748E9" units="cm"/>
+          <inkml:channel name="Y" type="integer" min="-2.14748E9" max="2.14748E9" units="cm"/>
+          <inkml:channel name="F" type="integer" max="32767" units="dev"/>
+        </inkml:traceFormat>
+        <inkml:channelProperties>
+          <inkml:channelProperty channel="X" name="resolution" value="1000" units="1/cm"/>
+          <inkml:channelProperty channel="Y" name="resolution" value="1000" units="1/cm"/>
+          <inkml:channelProperty channel="F" name="resolution" value="0" units="1/dev"/>
+        </inkml:channelProperties>
+      </inkml:inkSource>
+      <inkml:timestamp xml:id="ts0" timeString="2024-05-17T16:14:34.963"/>
+    </inkml:context>
+    <inkml:brush xml:id="br0">
+      <inkml:brushProperty name="width" value="0.035" units="cm"/>
+      <inkml:brushProperty name="height" value="0.035" units="cm"/>
+    </inkml:brush>
+  </inkml:definitions>
+  <inkml:trace contextRef="#ctx0" brushRef="#br0">232 1 24575,'-26'90'0,"0"0"0,-1 0 0,1 0 0,6-31 0,2 1 0,-9 29 0,-5 22 0,7-7 0,21-34 0,34-38 0,54-21 0,3-8-1638,-19 1 1,12 1 0,-7-4 1637,-7-6 0,-1 0 0,33 4 0,-2-1 745,-35-9 0,-13 5-745,-26 16 798,20-8-798,-67 17 0,6-8 0,0 1 2624,-6 1-2624,13-3 0,-1 2 0,5-7 0,-5-1 0,-6 2 0,-19 3 0,-2 14 0,-11-4 0,0 6 0,18-12 0,5-4 0,28-16 0,16-33 0,27-25 0,-20 17 0,2-6-1163,26-28 1,0-4 1162,-21 19 0,-1-2 0,13-23 0,-4 5 0,-8 8-96,-10-1 96,-8 58 0,-3-6 0,-5 18 0,-4 0 0,-4 5 2312,-2 1-2312,-3-1 109,-1 4-109,0-7 0,0 7 0,-7-10 0,6 6 0,-7-7 0,9 2 0,-1 5 0,0-4 0,0 8 0,1-7 0,-1 2 0,0 1 0,-4 1 0,4 4 0,-12 0 0,10 4 0,-13 3 0,14 3 0,-8 9 0,9-7 0,3 12 0,3-12 0,4 5 0,0-7 0,11-5 0,-3 4 0,27 0 0,23 0 0,5 2 0,25 9-215,-7-11 0,-5-1 215,-26 5 0,-8-12 0,-32 8 0,0-4 0,-5 5 0,0 18 0,-5 5 0,-19 32 0,-18 21-1035,8-25 1,-6 4 1034,-19 13 0,-5 2 0,7-1 0,-1 1 0,-5 0 0,0-5 0,13-22 0,4-3-46,10 1 1,4-4 45,-11 2 0,12 3 0,19-33 0,5-6 0,15-9 2486,17-4-2486,10 0 0,10-5 0,4-2-1093,24-6 1093,-17 6 0,-1-1 0,9-1 0,-15 3 0,-24 5 0,-17-1 0,-20 15 0,-24 22 0,-20 27 0,-13 4 341,28-18 0,0-2-341,-11 4 0,-1 9 0,28-33 0,6-7 0,20-6 0,9-8 0,37-5 0,5 0 515,1-6-515,-6 4 0,-25-10 0,-8 11 0,-21 18 0,-25 16 0,-39 40 0,27-34 0,-4 4-1135,-18 24 1,-3 5 1134,9-8 0,-1-1 0,-8 4 0,1 0-396,14-8 0,5-4 396,-15 11 0,12-5 0,33-31 0,1-13 0,20-12 2170,8-6-2170,23-8 891,2-7-891,25-2 0,-21 8 0,7-5 0,-24 7 0,-8 1 0,-10 5 0,-33 31 0,-15 10 0,-11 18 0,7-12 0,13-7 0,15-19 0,3-2 0,12-7 0,12-5 0,3-1 0,36-4 0,5-6 0,9-2-1188,13 0 1,5-1 1187,-18-1 0,2-1 0,0 1 0,32 1 0,-5 1 0,-27-4 0,-4 2 0,-6 9 0,-7 0 0,5-14 0,-25 13 0,-32 19 0,-26 16 0,-26 40 0,12-23 0,-2 1 605,0 1 1,0-1-606,-1 0 0,1-1 0,-21 23 0,27-28 0,22-15 0,14-17 0,8-9 0,11-4 0,-6-4 1164,7 3-1164,-9-3 0,5-1 0,-11 8 0,-8 6 0,-30 26 0,1 6 0,-1-7 0,11 11 0,13-35 0,3 18 0,8-22 0,13-8 0,6-5 0,0-5 0,-2 1 0,1-1 0,-11 2 0,9 3 0,-11-2 0,-3 13 0,-4-8 0,-3 13 0,-4-8 0,4 8 0,-5-8 0,5 7 0,-4-6 0,4 2 0,0-4 0,0 0 0</inkml:trace>
+</inkml:ink>
+</file>
+
+<file path=ppt/ink/ink26.xml><?xml version="1.0" encoding="utf-8"?>
+<inkml:ink xmlns:inkml="http://www.w3.org/2003/InkML">
+  <inkml:definitions>
+    <inkml:context xml:id="ctx0">
+      <inkml:inkSource xml:id="inkSrc0">
+        <inkml:traceFormat>
+          <inkml:channel name="X" type="integer" min="-2.14748E9" max="2.14748E9" units="cm"/>
+          <inkml:channel name="Y" type="integer" min="-2.14748E9" max="2.14748E9" units="cm"/>
+          <inkml:channel name="F" type="integer" max="32767" units="dev"/>
+        </inkml:traceFormat>
+        <inkml:channelProperties>
+          <inkml:channelProperty channel="X" name="resolution" value="1000" units="1/cm"/>
+          <inkml:channelProperty channel="Y" name="resolution" value="1000" units="1/cm"/>
+          <inkml:channelProperty channel="F" name="resolution" value="0" units="1/dev"/>
+        </inkml:channelProperties>
+      </inkml:inkSource>
+      <inkml:timestamp xml:id="ts0" timeString="2024-05-17T16:14:37.813"/>
+    </inkml:context>
+    <inkml:brush xml:id="br0">
+      <inkml:brushProperty name="width" value="0.035" units="cm"/>
+      <inkml:brushProperty name="height" value="0.035" units="cm"/>
+    </inkml:brush>
+  </inkml:definitions>
+  <inkml:trace contextRef="#ctx0" brushRef="#br0">0 778 24575,'20'-4'0,"15"-5"0,-13-3 0,41-16 0,-6-1 0,-7 13 0,1-1 0,22-20-1186,-18 14 1,4-1 1185,8 0 0,1-3 0,7-12 0,5 0-1030,-12 16 0,5 2 1,3-1 1029,8-5 0,2-1 0,1 4 0,1 4 0,1 3 0,0 1 0,1-2 0,-1 0 0,-3 2 0,-20 5 0,-2 2 0,5-1 0,7 1 0,6 0 0,1 0 0,-5 0 0,3-2 0,-4 1 0,4-1 0,0 1 0,4 0 0,2 1 0,-3 1 0,-6 2 0,0 2 0,-2 0 0,-4-1 0,0-4 0,-3-1 0,3 2 0,3 5 0,6 3 0,0 1 0,-8-2-859,22-7 0,-5 1 859,-18 6 0,2 2 0,-5-1 0,7 0 0,-3 0 0,9 0 0,4 0 0,-13 0 0,4 0 0,-6 0 0,2 0 0,-2 0 0,19 4 0,-8 2 0,-13 3-179,-4 2 179,-14 5 0,32-4 0,-10 8 0,-23-5 0,0 1 0,33 7 0,-34-7 0,2 0 165,11 2 1,2 1-166,0 0 0,-1 1 0,-6-1 0,-3 0 1545,-4-2 1,-3-1-1546,22 3 0,14 1 0,-3 5 0,-12-5 0,-15 2 2137,-16-7-2137,2-2 254,-17-1-254,14-5 1320,-24 1-1320,5-6 224,-7 2-224,0 0 0,0-3 0,-9-1 0,2-1 0,-7-3 0</inkml:trace>
+</inkml:ink>
+</file>
+
+<file path=ppt/ink/ink27.xml><?xml version="1.0" encoding="utf-8"?>
+<inkml:ink xmlns:inkml="http://www.w3.org/2003/InkML">
+  <inkml:definitions>
+    <inkml:context xml:id="ctx0">
+      <inkml:inkSource xml:id="inkSrc0">
+        <inkml:traceFormat>
+          <inkml:channel name="X" type="integer" min="-2.14748E9" max="2.14748E9" units="cm"/>
+          <inkml:channel name="Y" type="integer" min="-2.14748E9" max="2.14748E9" units="cm"/>
+          <inkml:channel name="F" type="integer" max="32767" units="dev"/>
+        </inkml:traceFormat>
+        <inkml:channelProperties>
+          <inkml:channelProperty channel="X" name="resolution" value="1000" units="1/cm"/>
+          <inkml:channelProperty channel="Y" name="resolution" value="1000" units="1/cm"/>
+          <inkml:channelProperty channel="F" name="resolution" value="0" units="1/dev"/>
+        </inkml:channelProperties>
+      </inkml:inkSource>
+      <inkml:timestamp xml:id="ts0" timeString="2024-05-17T16:14:38.867"/>
+    </inkml:context>
+    <inkml:brush xml:id="br0">
+      <inkml:brushProperty name="width" value="0.035" units="cm"/>
+      <inkml:brushProperty name="height" value="0.035" units="cm"/>
+    </inkml:brush>
+  </inkml:definitions>
+  <inkml:trace contextRef="#ctx0" brushRef="#br0">12 0 24575,'19'12'0,"6"7"0,-6 0 0,18 3 0,-4 15 0,5-18 0,3 20 0,4-1 0,-3-10 0,11 16 0,-24-29 0,9 8 0,-11-10 0,-1 1 0,1-1 0,-8-6 0,6 5 0,-13-10 0,5 8 0,-7-9 0,-5 8 0,4-8 0,-8 7 0,7-6 0,-2 2 0,-1 0 0,-12 3 0,-8 5 0,-12 1 0,-11 2 0,9-1 0,-8 1 0,-15 2 0,8 6 0,-35 8 0,24 4 0,1-7 0,6-3 0,26-13 0,-14 2 0,24-4 0,-12-3 0,12 2 0,-5-4 0,7 1 0,5 3 0,0-8 0,5 3 0</inkml:trace>
+</inkml:ink>
+</file>
+
+<file path=ppt/ink/ink28.xml><?xml version="1.0" encoding="utf-8"?>
+<inkml:ink xmlns:inkml="http://www.w3.org/2003/InkML">
+  <inkml:definitions>
+    <inkml:context xml:id="ctx0">
+      <inkml:inkSource xml:id="inkSrc0">
+        <inkml:traceFormat>
+          <inkml:channel name="X" type="integer" min="-2.14748E9" max="2.14748E9" units="cm"/>
+          <inkml:channel name="Y" type="integer" min="-2.14748E9" max="2.14748E9" units="cm"/>
+          <inkml:channel name="F" type="integer" max="32767" units="dev"/>
+        </inkml:traceFormat>
+        <inkml:channelProperties>
+          <inkml:channelProperty channel="X" name="resolution" value="1000" units="1/cm"/>
+          <inkml:channelProperty channel="Y" name="resolution" value="1000" units="1/cm"/>
+          <inkml:channelProperty channel="F" name="resolution" value="0" units="1/dev"/>
+        </inkml:channelProperties>
+      </inkml:inkSource>
+      <inkml:timestamp xml:id="ts0" timeString="2024-05-17T16:16:32.437"/>
+    </inkml:context>
+    <inkml:brush xml:id="br0">
+      <inkml:brushProperty name="width" value="0.035" units="cm"/>
+      <inkml:brushProperty name="height" value="0.035" units="cm"/>
+    </inkml:brush>
+  </inkml:definitions>
+  <inkml:trace contextRef="#ctx0" brushRef="#br0">1 1 24575,'93'12'0,"1"0"0,0 0 0,-1 0 0,1 0 0,-1 0 0,1 0 0,-1 0 0,1 0 0,0 0 0,-1 0 0,1 0 0,-1 0 0,17 2 0,12 1 0,6 2 0,0-1 0,-4 0 0,-11-2 0,-15-1 0,-22-3 0,-26-3 0,-32-5 0,-19-2 0,-4 0 0,0 0 0</inkml:trace>
+</inkml:ink>
+</file>
+
+<file path=ppt/ink/ink29.xml><?xml version="1.0" encoding="utf-8"?>
+<inkml:ink xmlns:inkml="http://www.w3.org/2003/InkML">
+  <inkml:definitions>
+    <inkml:context xml:id="ctx0">
+      <inkml:inkSource xml:id="inkSrc0">
+        <inkml:traceFormat>
+          <inkml:channel name="X" type="integer" min="-2.14748E9" max="2.14748E9" units="cm"/>
+          <inkml:channel name="Y" type="integer" min="-2.14748E9" max="2.14748E9" units="cm"/>
+          <inkml:channel name="F" type="integer" max="32767" units="dev"/>
+        </inkml:traceFormat>
+        <inkml:channelProperties>
+          <inkml:channelProperty channel="X" name="resolution" value="1000" units="1/cm"/>
+          <inkml:channelProperty channel="Y" name="resolution" value="1000" units="1/cm"/>
+          <inkml:channelProperty channel="F" name="resolution" value="0" units="1/dev"/>
+        </inkml:channelProperties>
+      </inkml:inkSource>
+      <inkml:timestamp xml:id="ts0" timeString="2024-05-17T16:16:34.066"/>
+    </inkml:context>
+    <inkml:brush xml:id="br0">
+      <inkml:brushProperty name="width" value="0.035" units="cm"/>
+      <inkml:brushProperty name="height" value="0.035" units="cm"/>
+    </inkml:brush>
+  </inkml:definitions>
+  <inkml:trace contextRef="#ctx0" brushRef="#br0">302 1 24575,'-10'0'0,"0"0"0,1 0 0,-9 5 0,-1 3 0,-8-1 0,1-1 0,7-6 0,1 5 0,9-4 0,-1 3 0,0-4 0,0 0 0,1 0 0,-1 0 0,0 0 0,1 0 0,-1 0 0,0 0 0,0 4 0,1-3 0,-1 4 0,0-5 0,5 4 0,1 1 0,4 5 0,0 0 0,5 7 0,3 2 0,7 19 0,0 2 0,1 0 0,-1-2 0,4-11 0,-4-1 0,-2-7 0,-3-1 0,-4-9 0,-1 1 0,4 0 0,-4 0 0,1-1 0,2-3 0,-7 2 0,8-7 0,-8 4 0,3-5 0</inkml:trace>
+</inkml:ink>
+</file>
+
 <file path=ppt/ink/ink3.xml><?xml version="1.0" encoding="utf-8"?>
 <inkml:ink xmlns:inkml="http://www.w3.org/2003/InkML">
   <inkml:definitions>
@@ -245,6 +736,195 @@
     </inkml:brush>
   </inkml:definitions>
   <inkml:trace contextRef="#ctx0" brushRef="#br0">0 3294 24575,'0'10'0,"4"-5"0,-2-12 0,8-8 0,-1-23 0,6-2 0,12-32 0,3-11-1242,-8 19 0,1-2 1242,5-3 0,4-8 0,-1 3-914,-5 9 1,-1 1 0,1 0 913,3-2 0,2 0 0,0-1 0,0-7 0,0 0 0,2-2-917,5-2 1,1-1-1,1 1 917,-2 6 0,-1 2 0,3 0 0,0 4 0,3 0 0,2 4-621,1 4 1,4 3-1,8-4 621,1 3 0,10-6 0,3-1 0,-1 3 0,-6 7 0,5-2 0,-6 6 0,8-4-198,-6 3 1,8-6 0,3 0 0,-5 3 0,-8 8 197,18-9 0,-6 10 0,10 5 0,-1 1 241,-5-5 1,-1 1-242,4 6 0,-3 4 727,-24 12 0,-2 0-727,18-12 0,-5 3 1966,-5 8-1966,32-11 0,-36 14 3448,0 1-3448,4 6 2100,-40 1-2100,6 9 1279,-18-8-1279,-1 8 23,-3-8 0,-2 8 0,-4-3 0</inkml:trace>
+</inkml:ink>
+</file>
+
+<file path=ppt/ink/ink30.xml><?xml version="1.0" encoding="utf-8"?>
+<inkml:ink xmlns:inkml="http://www.w3.org/2003/InkML">
+  <inkml:definitions>
+    <inkml:context xml:id="ctx0">
+      <inkml:inkSource xml:id="inkSrc0">
+        <inkml:traceFormat>
+          <inkml:channel name="X" type="integer" min="-2.14748E9" max="2.14748E9" units="cm"/>
+          <inkml:channel name="Y" type="integer" min="-2.14748E9" max="2.14748E9" units="cm"/>
+          <inkml:channel name="F" type="integer" max="32767" units="dev"/>
+        </inkml:traceFormat>
+        <inkml:channelProperties>
+          <inkml:channelProperty channel="X" name="resolution" value="1000" units="1/cm"/>
+          <inkml:channelProperty channel="Y" name="resolution" value="1000" units="1/cm"/>
+          <inkml:channelProperty channel="F" name="resolution" value="0" units="1/dev"/>
+        </inkml:channelProperties>
+      </inkml:inkSource>
+      <inkml:timestamp xml:id="ts0" timeString="2024-05-20T01:15:39.108"/>
+    </inkml:context>
+    <inkml:brush xml:id="br0">
+      <inkml:brushProperty name="width" value="0.035" units="cm"/>
+      <inkml:brushProperty name="height" value="0.035" units="cm"/>
+    </inkml:brush>
+  </inkml:definitions>
+  <inkml:trace contextRef="#ctx0" brushRef="#br0">4 48 24575,'8'0'0,"1"0"0,-1 0 0,1 0 0,6 0 0,-5 0 0,5 0 0,0 0 0,12 0 0,20 0 0,14 8 0,-11-6 0,18 6 0,-30-8 0,47 9 0,-33-6 0,32 6 0,-36-9 0,0 0 0,-15 0 0,0 0 0,-14 0 0,12 0 0,-21 0 0,6 0 0,-8 0 0,1 0 0,-1 0 0,1 0 0,-1 0 0,-7 0 0,-8 0 0,-4 0 0,-20 0 0,12 5 0,-14-3 0,0 3 0,7 0 0,-7-4 0,10 5 0,0-1 0,-1-4 0,1 4 0,6-5 0,-5 5 0,5-3 0,0 3 0,-4-5 0,4 0 0,0 4 0,-5-3 0,12 2 0,-12-3 0,12 4 0,-12-3 0,12 3 0,-5-4 0,0 0 0,5 0 0,-5 4 0,-1-3 0,6 3 0,-5-4 0,7 0 0,-1 0 0,0 0 0,-6 0 0,5 0 0,-12 0 0,6 0 0,-8 0 0,7 0 0,2 3 0,0-2 0,5 3 0,-5-4 0,6 0 0,1 0 0,-1 0 0,1 0 0,-1 0 0,1 0 0,-1-4 0,1 3 0,3-6 0,-3 2 0,7-4 0,-6 5 0,6-4 0,-3 3 0,4-3 0,0-1 0,0 1 0,0-1 0,0 1 0,4 3 0,0-2 0,5 6 0,6-8 0,-5 7 0,22-10 0,-13 11 0,14-6 0,0 0 0,2 6 0,0-11 0,-2 11 0,-9-10 0,-1 10 0,-6-4 0,-2 5 0,-6 0 0,-1 0 0,1 0 0,-1 0 0,1 0 0,-8 0 0,-9 0 0,-18 6 0,-10 3 0,1-1 0,-7 5 0,16-11 0,-7 5 0,9-2 0,8-4 0,1 8 0,6-8 0,8 7 0,9-7 0,18 2 0,-7-3 0,22 7 0,0-5 0,19 4 0,-9-6 0,-6 0 0,-21 0 0,-7 0 0,-2 0 0,-7 0 0,1 0 0,-8 0 0,-9 0 0,-18 7 0,0 0 0,-16 1 0,-6-3 0,10 0 0,-17-4 0,19 11 0,1-10 0,9 5 0,4-2 0,12-4 0,-5 4 0,6-5 0,1 0 0,-1 0 0,1 0 0,23 0 0,-4 0 0,22-5 0,0-3 0,3 1 0,21-7 0,-9 5 0,9-1 0,-22-2 0,-9 11 0,-10-4 0,-12 1 0,-4 3 0,-4-3 0,-5 4 0,4 0 0,1 0 0</inkml:trace>
+</inkml:ink>
+</file>
+
+<file path=ppt/ink/ink31.xml><?xml version="1.0" encoding="utf-8"?>
+<inkml:ink xmlns:inkml="http://www.w3.org/2003/InkML">
+  <inkml:definitions>
+    <inkml:context xml:id="ctx0">
+      <inkml:inkSource xml:id="inkSrc0">
+        <inkml:traceFormat>
+          <inkml:channel name="X" type="integer" min="-2.14748E9" max="2.14748E9" units="cm"/>
+          <inkml:channel name="Y" type="integer" min="-2.14748E9" max="2.14748E9" units="cm"/>
+          <inkml:channel name="F" type="integer" max="32767" units="dev"/>
+        </inkml:traceFormat>
+        <inkml:channelProperties>
+          <inkml:channelProperty channel="X" name="resolution" value="1000" units="1/cm"/>
+          <inkml:channelProperty channel="Y" name="resolution" value="1000" units="1/cm"/>
+          <inkml:channelProperty channel="F" name="resolution" value="0" units="1/dev"/>
+        </inkml:channelProperties>
+      </inkml:inkSource>
+      <inkml:timestamp xml:id="ts0" timeString="2024-05-20T01:15:46.621"/>
+    </inkml:context>
+    <inkml:brush xml:id="br0">
+      <inkml:brushProperty name="width" value="0.035" units="cm"/>
+      <inkml:brushProperty name="height" value="0.035" units="cm"/>
+    </inkml:brush>
+  </inkml:definitions>
+  <inkml:trace contextRef="#ctx0" brushRef="#br0">1 1 24575,'33'0'0,"-7"0"0,36 0 0,9 0 0,15 0-1081,-1 0 1,1 0 1080,6 0 0,-32 0 0,1 0 0,36 0 0,-18 0 0,6 0-1513,4-1 1,3 2 1512,-17 3 0,3 2 0,-5-2 0,6-2 0,1-1-226,5 4 0,8 1 0,-16-3 226,10-3 0,10-1 0,0 2 0,-21 7-7,0-6 7,-7 7 838,-30-9-838,6 0 2739,-28 0-2739,-2 0 2285,-14 0-2285,-2 0 9,-24 6-9,-3-4 0,-1 4 0,-58 5 0,35 0 0,1-4 0,-4-1 0,1 4 0,1-1 0,-43-6 0,27 5 0,-9 2 0,9-2-876,18-6 0,0 0 876,-23 7 0,-10 2 0,11-3 0,-16-5-548,16 3 1,-1 1 547,19-2 0,3-1 0,-27-1 0,6 6 0,29-9 0,8 0 1650,3 0-1650,10 0 1197,-10 7-1197,-15-6 0,10 6 0,-17 0 0,29-6 0,-7 11 0,10-11 0,6 5 0,-14 0 0,12-4 0,-14 10 0,9-6 0,8 1 0,-6 8 0,5-12 0,0 11 0,2-9 0,14 0 0,2 2 0,24-6 0,16 3 0,13-4 0,7 0-471,-11 0 0,1 0 471,22 0 0,1 0 0,-19 0 0,-3 0 0,40 0-106,-4 0 106,-28 0 0,-3 0 0,-28 0 0,-4 0 0,-17 0 936,1 0-936,-1 0 112,1 0-112,-1 0 0,1 0 0,-1 0 0,-7 0 0,-8 5 0,-10-4 0,-16 11 0,7-5 0,-7 6 0,16-6 0,2 2 0,7-8 0,-1 6 0,1-2 0,3 4 0,1-1 0,8-3 0,1-1 0,10 1 0,2-4 0,15 11 0,4-10 0,54 15 0,-33-7 0,17 2 0,-49-5 0,-16-7 0,-9 4 0,-7 2 0,-19-1 0,-22 16 0,0-10 0,-9 7 0,0 5 0,18-19 0,1 16 0,22-20 0,8 4 0,-1-4 0,8 0 0,9-5 0,9-1 0,1-11 0,4-2 0,-9-4 0,4 0 0,-4-10 0,-6 13 0,0-20 0,-7 11 0,0 0 0,-4 5 0,-1 15 0,-3 1 0,-1 3 0,1 1 0,-1 4 0,1 0 0,-1 0 0,-6 5 0,3 7 0,-18 43 0,14-22 0,-4 37 0,15-44 0,10 7 0,7-10 0,-1-6 0,5-2 0,-1-10 0,-5 3 0,5-7 0,-6 2 0,6-3 0,2-5 0,-1 0 0,1-11 0,-12-1 0,0-16 0,-5 7 0,0-16 0,0 16 0,-10-2 0,2 6 0,-9 4 0,0 0 0,-1 1 0,-15 10 0,7-3 0,-16 8 0,6-9 0,1 9 0,2-5 0,10 7 0,6 4 0,-5 2 0,5 10 0,1-5 0,0 4 0,6 1 0,5 0 0,0 1 0,5 5 0,0-12 0,0 5 0,8-2 0,-3-4 0,8 0 0,2-6 0,2-3 0,16 0 0,14 0 0,-8-5 0,-1 0 0,-22-5 0,-12-5 0,0-2 0,-4-6 0,-5-1 0,4 8 0,-10-6 0,-1 10 0,-6-10 0,-5 9 0,-38-8 0,7 5 0,-13 5 0,13 2 0,-9 9 0,20 0 0,-27 0 0,45 6 0,-8 0 0,9 11 0,1 1 0,-4 15 0,-8 48 0,8-12 0,-4 25 0,22-24 0,2-10 0,7 0 0,0-3 0,16 0 0,-5-9 0,13 9 0,-2-12 0,-2-9 0,9 6 0,-5-16 0,25 12 0,-11-16 0,19 2 0,0-8 0,4-7 0,-1-1 0,-8-7 0,-1-2 0,5-6 0,35-1 0,-62 0 0,-5-3 0,-15 7 0,-8-1 0,-9 1 0,-9 15 0,-15-2 0,6 8 0,-7-4 0,9-1 0,8-2 0,0 0 0,1 0 0,5-1 0,-5 1 0,6-5 0,5 2 0,-4-2 0,3 0 0,4-5 0,73-63 0,-21 5-607,3 5 0,2-4 607,-16 15 0,-6-1 0,-4-4 0,-3-1 0,6-1 0,-4 0 0,-5-43 0,-5 17 0,-19 34 0,0 16 0,0 16 0,-4 5 0,-17 0 0,-7 4 1214,-17 13-1214,0 4 0,-4 24 0,10-2 0,-13 14 0,19-7 0,-7 3 0,18-13 0,1 6 0,14-16 0,-5 7 0,11-16 0,-5-2 0,10-14 0,1-2 0,0-8 0,2 1 0,-2-1 0,0 8 0,-1 18 0,-14 40 0,-3 9 0,-4 11-2112,-5 14 0,0 4 2112,6-27 0,0 2 0,2-3 0,-3 23 0,3-5 0,2-18 0,4-8 0,5 11 0,-6 0 0,9-35 0,0-6 0,10-19 0,-2-19 4224,28-28-4224,-1-4 0,12-22 0,5 7 0,-1-20 0,-4 26 0,0 4 0,1-8 0,15-4 0,-68 91 0,-6 26 0,-10-6 0,-2 4-495,10-1 1,-1 0 494,-13 8 0,0-3 0,6 19 0,-16 5 0,20-38 0,-6 1 0,15-36 0,16-24 0,3-36 0,24-27 0,-3-17-323,-10 31 0,1-3 323,-4-1 0,-2 0 0,0 7 0,-1 1-222,-5-5 1,0 3 221,8-18 0,-8 11 0,1 28 0,-11 30 0,-20 57 0,-6 16 0,7-11 0,-1 3-198,3-3 1,1 0 197,3 9 0,1-1 0,-9 34 338,0-2-338,11-37 0,-3-21 0,10-4 0,-3-15 0,1-5 2029,7-12-2029,-6-21 106,23-20-106,1-20 0,18-27 0,-5 24 0,-5-8 0,-10 43 0,-8 8 0,-6 21 0,-1 21 0,-3 33 0,0 33 0,-2 16 0,0-3 0,1-19-2945,0-5 0,0 4 2945,0-6 0,0 20 0,0 11 0,0 5 0,0-3 0,0-12 0,0-18 0,0 17 0,0-9 0,-2-11 0,-1 9 0,0-2 0,1-11-205,1 1 1,0-11 204,-9 28 0,10-37 0,0-12 0,0-32 0,5-14 5724,10-20-5724,0-8 0,29-28 0,-14 1-16,0 16 0,1-1 16,8-30 0,4 11 0,-19 21 0,-2 21 0,-14 7 0,6 6 0,-13 3 607,3 11-607,-8-2 0,-1 8 0,-3-1 0,-7 7 0,-2-3 0,0 0 0,-5-7 0,12-5 0,-12 0 0,12 0 0,-12-5 0,3-16 0,-8-10 0,-18-31 0,-4-16-1567,-3-4 1567,17 14 0,0-6 0,3 3 0,1 0 0,0 0 0,-1 1 0,2 2 0,3 9 0,3 15 0,7 0 0,9 38 0,4-1 0,-6 18 0,-9 16 1567,5-1-1567,-13 16 0,8-16 0,-2 7 0,5-16 0,6-6 0,5-11 0,2-21 0,16-8 0,-2-28 0,11 9 0,-6-3 0,0-1 0,9-4 0,9-9 0,1 4 0,-7 24 0,21-19 0,-44 48 0,-1 11 0,-4 14 0,0 24 0,-13 24 0,-2 10-789,11-13 0,1 2 789,-12 24 0,2-1 0,12-30 0,2-4 0,-1 35 0,0-28 0,0-12 0,0-22 0,4-15 0,2-17 1578,9-7-1578,9-32 0,19-12 0,0-32-1155,6 6 1155,-25 24 0,-3-3 0,-4 5 0,-1-1 0,6-7 0,0 0 0,-10 8 0,-1 4 0,17-22 0,-18 34 0,-4 16 0,-6 31 0,0 3 0,0 52 0,-11 27-559,4-16 0,-1 7 559,2 7 0,-2 2 0,-4 0 0,1-1 0,10-1 0,-1-3 0,-8-7 0,-2-3-216,2-15 1,1-2 215,-6 38 0,-1-46 0,12-22 0,3-11 0,-2-14 2220,3-9-2220,0-18 484,0-22-484,6 1 0,-5-13 0,0-5-883,5-24 883,-5 16 0,-2-1 0,1-17 0,0 15 0,7 19 0,-5 28 0,4 5 0,-6 23 0,0 18 0,0 11 0,0 8 883,0 6-883,0-16 0,-5 7 0,4-10 0,-4-6 0,5 5 0,0-5 0,0 6 0,0 1 0,0-1 0,-4-6 0,3-2 0,-3-14 0,4-9 0,0-18 0,0 0 0,0-16 0,0 16 0,0-16 0,0 22 0,0-4 0,0 9 0,0 4 0,0-10 0,0 14 0,0-3 0</inkml:trace>
+</inkml:ink>
+</file>
+
+<file path=ppt/ink/ink32.xml><?xml version="1.0" encoding="utf-8"?>
+<inkml:ink xmlns:inkml="http://www.w3.org/2003/InkML">
+  <inkml:definitions>
+    <inkml:context xml:id="ctx0">
+      <inkml:inkSource xml:id="inkSrc0">
+        <inkml:traceFormat>
+          <inkml:channel name="X" type="integer" min="-2.14748E9" max="2.14748E9" units="cm"/>
+          <inkml:channel name="Y" type="integer" min="-2.14748E9" max="2.14748E9" units="cm"/>
+          <inkml:channel name="F" type="integer" max="32767" units="dev"/>
+        </inkml:traceFormat>
+        <inkml:channelProperties>
+          <inkml:channelProperty channel="X" name="resolution" value="1000" units="1/cm"/>
+          <inkml:channelProperty channel="Y" name="resolution" value="1000" units="1/cm"/>
+          <inkml:channelProperty channel="F" name="resolution" value="0" units="1/dev"/>
+        </inkml:channelProperties>
+      </inkml:inkSource>
+      <inkml:timestamp xml:id="ts0" timeString="2024-05-20T01:15:51.963"/>
+    </inkml:context>
+    <inkml:brush xml:id="br0">
+      <inkml:brushProperty name="width" value="0.035" units="cm"/>
+      <inkml:brushProperty name="height" value="0.035" units="cm"/>
+    </inkml:brush>
+  </inkml:definitions>
+  <inkml:trace contextRef="#ctx0" brushRef="#br0">144 127 24575,'0'9'0,"-5"6"0,-2 2 0,-13 16 0,8-14 0,-7 12 0,8-14 0,0 6 0,0-6 0,5-2 0,2-6 0,4-1 0,4-7 0,1 2 0,3-10 0,8 1 0,-6-3 0,5-1 0,0-5 0,16-16 0,5 1 0,-2-8 0,-9 22 0,-8-4 0,0 7 0,16-14 0,-7 8 0,0 1 0,-11 8 0,-6 1 0,-1 5 0,1 0 0,-15 14 0,-3 3 0,-18 20 0,-11 7 0,6 6 0,-16-4 0,17 1 0,-12-11 0,14 2 0,-4-8 0,16-9 0,2-2 0,10-7 0,-2-3 0,10-1 0,-2-8 0,14-7 0,2-1 0,34-28 0,1 11 0,-11-1 0,2-1 0,31-8 0,-32 9 0,0-1 0,38-21 0,-12 3 0,-15 12 0,-20 17 0,-16 10 0,-11 14 0,-9 5 0,-13 15 0,3-1 0,-12 10 0,6-7 0,-8 7 0,4-10 0,5 1 0,-4-1 0,3 0 0,-4-4 0,-1-2 0,6 0 0,-4-4 0,10 2 0,-3-5 0,21-16 0,13 1 0,20-31 0,20 7 0,20-19-520,-2 11 520,11-2 0,-15 11 0,-23 5 0,-4 8 0,-33 5 0,1 3 0,-18 14 0,1 6 520,-14 11-520,-4 9 0,-6 2 0,-3 10 0,0-1 0,3-8 0,6-3 0,-1-10 0,14-6 0,-6-2 0,9-6 0,4-5 0,9-10 0,18-4 0,3-22 0,14 8 0,-14-5 0,13 1 0,-16 15 0,0-6 0,-15 9 0,-7 9 0,-9 9 0,-3 18 0,-12 9 0,-14 15 0,4-14 0,-10 11 0,21-22 0,-1 8 0,9-9 0,0-7 0,5-2 0,22-10 0,9-15 0,20 0 0,12-21 0,-9 14 0,9-14 0,0 13 0,-18-8 0,6 15 0,-28-3 0,-6 17 0,-7 4 0,-4 10 0,-5 7 0,-2-1 0,-6 10 0,1-7 0,-1 7 0,3-16 0,-2 4 0,7-4 0,4-4 0,5-2 0,5-11 0,-4-4 0,2 3 0,-10 1 0,-4 6 0,-32 15 0,1-5 0,-19 15 0,-1-13 0,20 3 0,-29 4 0,-17 6 0,15-9 0,-22 7 0,46-28 0,10 6 0,9-7 0,4 0 0,12 0 0,-5-4 0,6-1 0,-1-10 0,0-2 0,0 1 0,-10-16 0,-3-9 0,-19-11 0,10 3 0,-8 3 0,13 10 0,0 1 0,0 7 0,4 6 0,-1 9 0,8-2 0,1 5 0,6 5 0,0 1 0,1 4 0,-1 0 0,1 0 0,-1 0 0,1 0 0,3 4 0,-2-3 0,6 6 0,-3-2 0,4 4 0,0-1 0,0 1 0,0-1 0,4-3 0,-3 3 0,2-4 0,1 1 0,-3 3 0,7-7 0,-4 2 0,5-6 0,1-9 0,-5-5 0,0 1 0,-5 0 0,0 1 0,0 5 0,-4-1 0,-2 17 0,-4 7 0,0 4 0,3 5 0,4-5 0,3 0 0,0-2 0,0-7 0,0 1 0,3-4 0,2-2 0,4-3 0,6-5 0,2 4 0,-1-8 0,0 4 0,-8-3 0,1 3 0,-1-3 0,-3 7 0,-1-2 0</inkml:trace>
+</inkml:ink>
+</file>
+
+<file path=ppt/ink/ink33.xml><?xml version="1.0" encoding="utf-8"?>
+<inkml:ink xmlns:inkml="http://www.w3.org/2003/InkML">
+  <inkml:definitions>
+    <inkml:context xml:id="ctx0">
+      <inkml:inkSource xml:id="inkSrc0">
+        <inkml:traceFormat>
+          <inkml:channel name="X" type="integer" min="-2.14748E9" max="2.14748E9" units="cm"/>
+          <inkml:channel name="Y" type="integer" min="-2.14748E9" max="2.14748E9" units="cm"/>
+          <inkml:channel name="F" type="integer" max="32767" units="dev"/>
+        </inkml:traceFormat>
+        <inkml:channelProperties>
+          <inkml:channelProperty channel="X" name="resolution" value="1000" units="1/cm"/>
+          <inkml:channelProperty channel="Y" name="resolution" value="1000" units="1/cm"/>
+          <inkml:channelProperty channel="F" name="resolution" value="0" units="1/dev"/>
+        </inkml:channelProperties>
+      </inkml:inkSource>
+      <inkml:timestamp xml:id="ts0" timeString="2024-05-20T01:18:18.453"/>
+    </inkml:context>
+    <inkml:brush xml:id="br0">
+      <inkml:brushProperty name="width" value="0.035" units="cm"/>
+      <inkml:brushProperty name="height" value="0.035" units="cm"/>
+    </inkml:brush>
+  </inkml:definitions>
+  <inkml:trace contextRef="#ctx0" brushRef="#br0">1 1 24575,'0'68'0,"7"-4"0,1-19 0,0 0 0,-1 0 0,-7-1 0,6 1 0,-4-10 0,5 35 0,-1-27 0,-4 20 0,5-21 0,-2-16 0,-4 7 0,4 0 0,1-7 0,-5 16 0,4-16 0,-5 7 0,5-10 0,-3 1 0,3 9 0,-5-14 0,5 12 0,-4-14 0,4 16 0,1-7 0,-5 16 0,9-16 0,-8 16 0,3-16 0,2 16 0,-6-16 0,6 7 0,-2-9 0,-4-1 0,5-6 0,-1 5 0,-4-12 0,4 5 0,-5-7 0,0 1 0,0-1 0,0 1 0,0 0 0,4-1 0,-3 1 0,3 6 0,-4-5 0,4 5 0,-3-6 0,2-1 0,-3 1 0,0-15 0,0-13 0,-6-16 0,4 10 0,-5 5 0</inkml:trace>
+</inkml:ink>
+</file>
+
+<file path=ppt/ink/ink34.xml><?xml version="1.0" encoding="utf-8"?>
+<inkml:ink xmlns:inkml="http://www.w3.org/2003/InkML">
+  <inkml:definitions>
+    <inkml:context xml:id="ctx0">
+      <inkml:inkSource xml:id="inkSrc0">
+        <inkml:traceFormat>
+          <inkml:channel name="X" type="integer" min="-2.14748E9" max="2.14748E9" units="cm"/>
+          <inkml:channel name="Y" type="integer" min="-2.14748E9" max="2.14748E9" units="cm"/>
+          <inkml:channel name="F" type="integer" max="32767" units="dev"/>
+        </inkml:traceFormat>
+        <inkml:channelProperties>
+          <inkml:channelProperty channel="X" name="resolution" value="1000" units="1/cm"/>
+          <inkml:channelProperty channel="Y" name="resolution" value="1000" units="1/cm"/>
+          <inkml:channelProperty channel="F" name="resolution" value="0" units="1/dev"/>
+        </inkml:channelProperties>
+      </inkml:inkSource>
+      <inkml:timestamp xml:id="ts0" timeString="2024-05-20T01:18:20.106"/>
+    </inkml:context>
+    <inkml:brush xml:id="br0">
+      <inkml:brushProperty name="width" value="0.035" units="cm"/>
+      <inkml:brushProperty name="height" value="0.035" units="cm"/>
+    </inkml:brush>
+  </inkml:definitions>
+  <inkml:trace contextRef="#ctx0" brushRef="#br0">132 56 24575,'-8'9'0,"-1"-1"0,-1 8 0,1-6 0,-2 11 0,2-10 0,-2 10 0,1-4 0,3 0 0,-2-2 0,8-6 0,-6-1 0,2 1 0,0-1 0,1 1 0,1-4 0,2 2 0,-3-2 0,0 0 0,3 2 0,-3-16 0,8 6 0,7-19 0,1 6 0,6-17 0,-6 7 0,2-7 0,3 9 0,-6 8 0,6-6 0,-7 5 0,2-6 0,-2 6 0,0 5 0,-5 12 0,4 12 0,-4-2 0,11 7 0,-4-2 0,3-3 0,-3 9 0,-3-10 0,1 4 0,-2-7 0,7 7 0,-5-4 0,12 5 0,-10 0 0,3-5 0,-5 4 0,-1-10 0,-1 3 0,1-4 0,-4 5 0,2-4 0,-2-1 0,0-1 0,2-2 0,-6 3 0,3-4 0</inkml:trace>
+</inkml:ink>
+</file>
+
+<file path=ppt/ink/ink35.xml><?xml version="1.0" encoding="utf-8"?>
+<inkml:ink xmlns:inkml="http://www.w3.org/2003/InkML">
+  <inkml:definitions>
+    <inkml:context xml:id="ctx0">
+      <inkml:inkSource xml:id="inkSrc0">
+        <inkml:traceFormat>
+          <inkml:channel name="X" type="integer" min="-2.14748E9" max="2.14748E9" units="cm"/>
+          <inkml:channel name="Y" type="integer" min="-2.14748E9" max="2.14748E9" units="cm"/>
+          <inkml:channel name="F" type="integer" max="32767" units="dev"/>
+        </inkml:traceFormat>
+        <inkml:channelProperties>
+          <inkml:channelProperty channel="X" name="resolution" value="1000" units="1/cm"/>
+          <inkml:channelProperty channel="Y" name="resolution" value="1000" units="1/cm"/>
+          <inkml:channelProperty channel="F" name="resolution" value="0" units="1/dev"/>
+        </inkml:channelProperties>
+      </inkml:inkSource>
+      <inkml:timestamp xml:id="ts0" timeString="2024-05-20T01:22:53.257"/>
+    </inkml:context>
+    <inkml:brush xml:id="br0">
+      <inkml:brushProperty name="width" value="0.035" units="cm"/>
+      <inkml:brushProperty name="height" value="0.035" units="cm"/>
+    </inkml:brush>
+  </inkml:definitions>
+  <inkml:trace contextRef="#ctx0" brushRef="#br0">304 0 24575,'8'4'0,"7"2"0,2 4 0,1 7 0,5-4 0,-10 9 0,9-3 0,-4 4 0,0 1 0,7 8 0,-3 4 0,0-1 0,-1 8 0,-4-18 0,-1 18 0,1-17 0,-2 16 0,-3-16 0,-4 7 0,2-10 0,-2 10 0,-1-7 0,6 16 0,-6-16 0,1 17 0,4-8 0,-4 10 0,1-1 0,4 21 0,-5-15 0,1 27 0,-3-29 0,1 9 0,-6 0 0,6-9 0,-7 9 0,0 0 0,0-9 0,5 0 0,-3 7 0,3-17 0,-5 32 0,0-10 0,0-16 0,0 22 0,0-35 0,0 59 0,0-37 0,-7 24 0,6-20 0,-17 37 0,15-35 0,-14 29 0,15-52 0,-11 8 0,11 1 0,-11 0 0,3 12 0,1-9 0,-7 22 0,8-22 0,-10 21 0,2-21 0,0 9 0,8-12 0,-5 0 0,4 0 0,-4-10 0,-2 7 0,3-16 0,4 7 0,-2-10 0,2 10 0,-3-13 0,-7 21 0,7-21 0,-8 23 0,7-17 0,0 0 0,1-4 0,1-5 0,-1 0 0,0 4 0,6-11 0,-11 12 0,9-5 0,-10 7 0,5-1 0,2-6 0,-2 5 0,3-12 0,-7 11 0,6-10 0,-7 10 0,8-10 0,-7 10 0,9-10 0,-14 10 0,15-10 0,-11 10 0,9-11 0,-2 6 0,1-8 0,-1 7 0,1-5 0,-2 12 0,-5-10 0,5 3 0,-6 2 0,2-5 0,3 7 0,-3-8 0,6 1 0,1-7 0,3 2 0,-2-2 0,6 0 0,-3-1 0</inkml:trace>
+</inkml:ink>
+</file>
+
+<file path=ppt/ink/ink36.xml><?xml version="1.0" encoding="utf-8"?>
+<inkml:ink xmlns:inkml="http://www.w3.org/2003/InkML">
+  <inkml:definitions>
+    <inkml:context xml:id="ctx0">
+      <inkml:inkSource xml:id="inkSrc0">
+        <inkml:traceFormat>
+          <inkml:channel name="X" type="integer" min="-2.14748E9" max="2.14748E9" units="cm"/>
+          <inkml:channel name="Y" type="integer" min="-2.14748E9" max="2.14748E9" units="cm"/>
+          <inkml:channel name="F" type="integer" max="32767" units="dev"/>
+        </inkml:traceFormat>
+        <inkml:channelProperties>
+          <inkml:channelProperty channel="X" name="resolution" value="1000" units="1/cm"/>
+          <inkml:channelProperty channel="Y" name="resolution" value="1000" units="1/cm"/>
+          <inkml:channelProperty channel="F" name="resolution" value="0" units="1/dev"/>
+        </inkml:channelProperties>
+      </inkml:inkSource>
+      <inkml:timestamp xml:id="ts0" timeString="2024-05-20T01:22:54.704"/>
+    </inkml:context>
+    <inkml:brush xml:id="br0">
+      <inkml:brushProperty name="width" value="0.035" units="cm"/>
+      <inkml:brushProperty name="height" value="0.035" units="cm"/>
+    </inkml:brush>
+  </inkml:definitions>
+  <inkml:trace contextRef="#ctx0" brushRef="#br0">91 0 24575,'0'9'0,"0"6"0,0-5 0,0 5 0,0 0 0,0 2 0,-5 7 0,4-8 0,-10 6 0,5-5 0,-1 0 0,2 5 0,1-12 0,4 5 0,-8-7 0,7 1 0,-3 0 0,0-1 0,3 1 0,-2-1 0,-1 1 0,3-1 0,-3 1 0,0-5 0,3 4 0,-2-3 0,-1-1 0,3 4 0,-3-3 0,4 3 0,0 1 0,-4-4 0,3 2 0,1-6 0,5 3 0,4-4 0,15 0 0,-5 0 0,8 0 0,4 0 0,-12-5 0,24 3 0,-18-3 0,2 5 0,4-7 0,-18 6 0,18-6 0,-14 2 0,-1 0 0,6-1 0,-12 2 0,12 4 0,-12 0 0,5 0 0,-6 0 0,0 0 0,-5-4 0,0 3 0,-4-3 0</inkml:trace>
 </inkml:ink>
 </file>
 
@@ -372,14 +1052,14 @@
           <inkml:channelProperty channel="F" name="resolution" value="0" units="1/dev"/>
         </inkml:channelProperties>
       </inkml:inkSource>
-      <inkml:timestamp xml:id="ts0" timeString="2024-05-17T16:15:23.141"/>
+      <inkml:timestamp xml:id="ts0" timeString="2024-05-17T16:16:32.437"/>
     </inkml:context>
     <inkml:brush xml:id="br0">
       <inkml:brushProperty name="width" value="0.035" units="cm"/>
       <inkml:brushProperty name="height" value="0.035" units="cm"/>
     </inkml:brush>
   </inkml:definitions>
-  <inkml:trace contextRef="#ctx0" brushRef="#br0">0 1 24575,'27'26'0,"-1"1"0,22 31 0,4 19-1222,-20-22 0,-1 2 1222,-2-6 0,-2 2 0,0 15 0,-2 3-818,-1-7 1,1 2 817,4 17 0,-2 3-619,-2 10 0,-4 1 619,-5-9 0,-4-1 0,-2 10 0,-5-1 0,-5-9 0,0-5-458,0-16 0,0-1 458,-5 6 0,-1-4 0,-6 20 0,1-36 0,0-1 0,-9 18 930,2-2-930,-10-1 1648,16-21-1648,-18 7 2413,-1-8-2413,0-13 1236,-7 24-1236,13-25 6,8 9-6,-1-19 0,7-2 0,6-7 0,0-1 0,1-3 0,3 2 0,-3-2 0,4 4 0,0-1 0,0-3 0,0-2 0</inkml:trace>
+  <inkml:trace contextRef="#ctx0" brushRef="#br0">1 1 24575,'93'12'0,"1"0"0,0 0 0,-1 0 0,1 0 0,-1 0 0,1 0 0,-1 0 0,1 0 0,0 0 0,-1 0 0,1 0 0,-1 0 0,17 2 0,12 1 0,6 2 0,0-1 0,-4 0 0,-11-2 0,-15-1 0,-22-3 0,-26-3 0,-32-5 0,-19-2 0,-4 0 0,0 0 0</inkml:trace>
 </inkml:ink>
 </file>
 
@@ -399,14 +1079,14 @@
           <inkml:channelProperty channel="F" name="resolution" value="0" units="1/dev"/>
         </inkml:channelProperties>
       </inkml:inkSource>
-      <inkml:timestamp xml:id="ts0" timeString="2024-05-17T16:15:23.950"/>
+      <inkml:timestamp xml:id="ts0" timeString="2024-05-17T16:16:34.066"/>
     </inkml:context>
     <inkml:brush xml:id="br0">
       <inkml:brushProperty name="width" value="0.035" units="cm"/>
       <inkml:brushProperty name="height" value="0.035" units="cm"/>
     </inkml:brush>
   </inkml:definitions>
-  <inkml:trace contextRef="#ctx0" brushRef="#br0">40 0 24575,'0'18'0,"0"-7"0,8 25 0,-6-14 0,5 26 0,-7-8 0,-7 11 0,5 0 0,-12-10 0,13 7 0,-11-19 0,10 1 0,-9-5 0,9-13 0,-4 5 0,6-7 0,0 0 0,0-1 0,0 1 0,4-5 0,2 0 0,4-5 0,7 0 0,13 0 0,10 0 0,11 0 0,14-9 0,-10-1 0,-1-1 0,9-6 0,-30 9 0,18-3 0,-31 1 0,-3 9 0,-7-4 0,-1 5 0,1 0 0,0 0 0,-1 0 0,1 0 0,-5-4 0,0 3 0,-5-3 0</inkml:trace>
+  <inkml:trace contextRef="#ctx0" brushRef="#br0">302 1 24575,'-10'0'0,"0"0"0,1 0 0,-9 5 0,-1 3 0,-8-1 0,1-1 0,7-6 0,1 5 0,9-4 0,-1 3 0,0-4 0,0 0 0,1 0 0,-1 0 0,0 0 0,1 0 0,-1 0 0,0 0 0,0 4 0,1-3 0,-1 4 0,0-5 0,5 4 0,1 1 0,4 5 0,0 0 0,5 7 0,3 2 0,7 19 0,0 2 0,1 0 0,-1-2 0,4-11 0,-4-1 0,-2-7 0,-3-1 0,-4-9 0,-1 1 0,4 0 0,-4 0 0,1-1 0,2-3 0,-7 2 0,8-7 0,-8 4 0,3-5 0</inkml:trace>
 </inkml:ink>
 </file>
 
@@ -557,7 +1237,7 @@
           <a:p>
             <a:fld id="{428B5836-9C57-3648-B257-2FB375CBAE77}" type="datetimeFigureOut">
               <a:rPr lang="en-US" smtClean="0"/>
-              <a:t>5/17/24</a:t>
+              <a:t>5/19/24</a:t>
             </a:fld>
             <a:endParaRPr lang="en-US"/>
           </a:p>
@@ -755,7 +1435,7 @@
           <a:p>
             <a:fld id="{428B5836-9C57-3648-B257-2FB375CBAE77}" type="datetimeFigureOut">
               <a:rPr lang="en-US" smtClean="0"/>
-              <a:t>5/17/24</a:t>
+              <a:t>5/19/24</a:t>
             </a:fld>
             <a:endParaRPr lang="en-US"/>
           </a:p>
@@ -963,7 +1643,7 @@
           <a:p>
             <a:fld id="{428B5836-9C57-3648-B257-2FB375CBAE77}" type="datetimeFigureOut">
               <a:rPr lang="en-US" smtClean="0"/>
-              <a:t>5/17/24</a:t>
+              <a:t>5/19/24</a:t>
             </a:fld>
             <a:endParaRPr lang="en-US"/>
           </a:p>
@@ -1161,7 +1841,7 @@
           <a:p>
             <a:fld id="{428B5836-9C57-3648-B257-2FB375CBAE77}" type="datetimeFigureOut">
               <a:rPr lang="en-US" smtClean="0"/>
-              <a:t>5/17/24</a:t>
+              <a:t>5/19/24</a:t>
             </a:fld>
             <a:endParaRPr lang="en-US"/>
           </a:p>
@@ -1436,7 +2116,7 @@
           <a:p>
             <a:fld id="{428B5836-9C57-3648-B257-2FB375CBAE77}" type="datetimeFigureOut">
               <a:rPr lang="en-US" smtClean="0"/>
-              <a:t>5/17/24</a:t>
+              <a:t>5/19/24</a:t>
             </a:fld>
             <a:endParaRPr lang="en-US"/>
           </a:p>
@@ -1701,7 +2381,7 @@
           <a:p>
             <a:fld id="{428B5836-9C57-3648-B257-2FB375CBAE77}" type="datetimeFigureOut">
               <a:rPr lang="en-US" smtClean="0"/>
-              <a:t>5/17/24</a:t>
+              <a:t>5/19/24</a:t>
             </a:fld>
             <a:endParaRPr lang="en-US"/>
           </a:p>
@@ -2113,7 +2793,7 @@
           <a:p>
             <a:fld id="{428B5836-9C57-3648-B257-2FB375CBAE77}" type="datetimeFigureOut">
               <a:rPr lang="en-US" smtClean="0"/>
-              <a:t>5/17/24</a:t>
+              <a:t>5/19/24</a:t>
             </a:fld>
             <a:endParaRPr lang="en-US"/>
           </a:p>
@@ -2254,7 +2934,7 @@
           <a:p>
             <a:fld id="{428B5836-9C57-3648-B257-2FB375CBAE77}" type="datetimeFigureOut">
               <a:rPr lang="en-US" smtClean="0"/>
-              <a:t>5/17/24</a:t>
+              <a:t>5/19/24</a:t>
             </a:fld>
             <a:endParaRPr lang="en-US"/>
           </a:p>
@@ -2367,7 +3047,7 @@
           <a:p>
             <a:fld id="{428B5836-9C57-3648-B257-2FB375CBAE77}" type="datetimeFigureOut">
               <a:rPr lang="en-US" smtClean="0"/>
-              <a:t>5/17/24</a:t>
+              <a:t>5/19/24</a:t>
             </a:fld>
             <a:endParaRPr lang="en-US"/>
           </a:p>
@@ -2678,7 +3358,7 @@
           <a:p>
             <a:fld id="{428B5836-9C57-3648-B257-2FB375CBAE77}" type="datetimeFigureOut">
               <a:rPr lang="en-US" smtClean="0"/>
-              <a:t>5/17/24</a:t>
+              <a:t>5/19/24</a:t>
             </a:fld>
             <a:endParaRPr lang="en-US"/>
           </a:p>
@@ -2966,7 +3646,7 @@
           <a:p>
             <a:fld id="{428B5836-9C57-3648-B257-2FB375CBAE77}" type="datetimeFigureOut">
               <a:rPr lang="en-US" smtClean="0"/>
-              <a:t>5/17/24</a:t>
+              <a:t>5/19/24</a:t>
             </a:fld>
             <a:endParaRPr lang="en-US"/>
           </a:p>
@@ -3207,7 +3887,7 @@
           <a:p>
             <a:fld id="{428B5836-9C57-3648-B257-2FB375CBAE77}" type="datetimeFigureOut">
               <a:rPr lang="en-US" smtClean="0"/>
-              <a:t>5/17/24</a:t>
+              <a:t>5/19/24</a:t>
             </a:fld>
             <a:endParaRPr lang="en-US"/>
           </a:p>
@@ -3639,7 +4319,7 @@
         <p:spPr>
           <a:xfrm>
             <a:off x="380122" y="2849055"/>
-            <a:ext cx="4094134" cy="369332"/>
+            <a:ext cx="4950073" cy="369332"/>
           </a:xfrm>
           <a:prstGeom prst="rect">
             <a:avLst/>
@@ -3654,7 +4334,7 @@
           <a:p>
             <a:r>
               <a:rPr lang="en-US" dirty="0"/>
-              <a:t>1. Total features and all the compounds</a:t>
+              <a:t>2. Total number of features for different datasets</a:t>
             </a:r>
           </a:p>
         </p:txBody>
@@ -3949,8 +4629,8 @@
         </p:nvSpPr>
         <p:spPr>
           <a:xfrm>
-            <a:off x="2523745" y="1839638"/>
-            <a:ext cx="1417320" cy="923330"/>
+            <a:off x="975564" y="1729968"/>
+            <a:ext cx="1417320" cy="276999"/>
           </a:xfrm>
           <a:prstGeom prst="rect">
             <a:avLst/>
@@ -3964,12 +4644,8 @@
           <a:lstStyle/>
           <a:p>
             <a:r>
-              <a:rPr lang="en-US" dirty="0" err="1"/>
-              <a:t>Spearsman</a:t>
-            </a:r>
-            <a:r>
-              <a:rPr lang="en-US" dirty="0"/>
-              <a:t> and Pearson correlation</a:t>
+              <a:rPr lang="en-US" sz="1200" dirty="0"/>
+              <a:t>Feature filtering</a:t>
             </a:r>
           </a:p>
         </p:txBody>
@@ -3988,7 +4664,7 @@
         </p:nvSpPr>
         <p:spPr>
           <a:xfrm>
-            <a:off x="3232405" y="1010028"/>
+            <a:off x="3027024" y="991814"/>
             <a:ext cx="2778196" cy="369332"/>
           </a:xfrm>
           <a:prstGeom prst="rect">
@@ -4004,7 +4680,7 @@
           <a:p>
             <a:r>
               <a:rPr lang="en-US" dirty="0"/>
-              <a:t>2. Reduced set of features</a:t>
+              <a:t>3. Reduced set of features</a:t>
             </a:r>
           </a:p>
         </p:txBody>
@@ -4228,7 +4904,7 @@
         <p:spPr>
           <a:xfrm>
             <a:off x="6547104" y="466344"/>
-            <a:ext cx="4184864" cy="369332"/>
+            <a:ext cx="4482317" cy="369332"/>
           </a:xfrm>
           <a:prstGeom prst="rect">
             <a:avLst/>
@@ -4243,7 +4919,15 @@
           <a:p>
             <a:r>
               <a:rPr lang="en-US" dirty="0"/>
-              <a:t>3. Entire reduced feature set importance</a:t>
+              <a:t>4. Feature set </a:t>
+            </a:r>
+            <a:r>
+              <a:rPr lang="en-US" dirty="0" err="1"/>
+              <a:t>importances</a:t>
+            </a:r>
+            <a:r>
+              <a:rPr lang="en-US" dirty="0"/>
+              <a:t> across datasets</a:t>
             </a:r>
           </a:p>
         </p:txBody>
@@ -4270,7 +4954,7 @@
         </p:blipFill>
         <p:spPr>
           <a:xfrm>
-            <a:off x="8348452" y="1177259"/>
+            <a:off x="8297405" y="991814"/>
             <a:ext cx="2667000" cy="2425700"/>
           </a:xfrm>
           <a:prstGeom prst="rect">
@@ -4278,129 +4962,6 @@
           </a:prstGeom>
         </p:spPr>
       </p:pic>
-      <p:grpSp>
-        <p:nvGrpSpPr>
-          <p:cNvPr id="25" name="Group 24">
-            <a:extLst>
-              <a:ext uri="{FF2B5EF4-FFF2-40B4-BE49-F238E27FC236}">
-                <a16:creationId xmlns:a16="http://schemas.microsoft.com/office/drawing/2014/main" id="{B16BB5A5-AE07-8D1E-633A-650A51B8CA01}"/>
-              </a:ext>
-            </a:extLst>
-          </p:cNvPr>
-          <p:cNvGrpSpPr/>
-          <p:nvPr/>
-        </p:nvGrpSpPr>
-        <p:grpSpPr>
-          <a:xfrm>
-            <a:off x="9867024" y="3875400"/>
-            <a:ext cx="217440" cy="993960"/>
-            <a:chOff x="9867024" y="3875400"/>
-            <a:chExt cx="217440" cy="993960"/>
-          </a:xfrm>
-        </p:grpSpPr>
-        <mc:AlternateContent xmlns:mc="http://schemas.openxmlformats.org/markup-compatibility/2006" xmlns:p14="http://schemas.microsoft.com/office/powerpoint/2010/main">
-          <mc:Choice Requires="p14">
-            <p:contentPart p14:bwMode="auto" r:id="rId18">
-              <p14:nvContentPartPr>
-                <p14:cNvPr id="23" name="Ink 22">
-                  <a:extLst>
-                    <a:ext uri="{FF2B5EF4-FFF2-40B4-BE49-F238E27FC236}">
-                      <a16:creationId xmlns:a16="http://schemas.microsoft.com/office/drawing/2014/main" id="{D3816A05-E1B7-9195-8DC2-0909F92E9A43}"/>
-                    </a:ext>
-                  </a:extLst>
-                </p14:cNvPr>
-                <p14:cNvContentPartPr/>
-                <p14:nvPr/>
-              </p14:nvContentPartPr>
-              <p14:xfrm>
-                <a:off x="9867024" y="3875400"/>
-                <a:ext cx="186840" cy="943920"/>
-              </p14:xfrm>
-            </p:contentPart>
-          </mc:Choice>
-          <mc:Fallback xmlns="">
-            <p:pic>
-              <p:nvPicPr>
-                <p:cNvPr id="23" name="Ink 22">
-                  <a:extLst>
-                    <a:ext uri="{FF2B5EF4-FFF2-40B4-BE49-F238E27FC236}">
-                      <a16:creationId xmlns:a16="http://schemas.microsoft.com/office/drawing/2014/main" id="{D3816A05-E1B7-9195-8DC2-0909F92E9A43}"/>
-                    </a:ext>
-                  </a:extLst>
-                </p:cNvPr>
-                <p:cNvPicPr/>
-                <p:nvPr/>
-              </p:nvPicPr>
-              <p:blipFill>
-                <a:blip r:embed="rId19"/>
-                <a:stretch>
-                  <a:fillRect/>
-                </a:stretch>
-              </p:blipFill>
-              <p:spPr>
-                <a:xfrm>
-                  <a:off x="9860904" y="3869280"/>
-                  <a:ext cx="199080" cy="956160"/>
-                </a:xfrm>
-                <a:prstGeom prst="rect">
-                  <a:avLst/>
-                </a:prstGeom>
-              </p:spPr>
-            </p:pic>
-          </mc:Fallback>
-        </mc:AlternateContent>
-        <mc:AlternateContent xmlns:mc="http://schemas.openxmlformats.org/markup-compatibility/2006" xmlns:p14="http://schemas.microsoft.com/office/powerpoint/2010/main">
-          <mc:Choice Requires="p14">
-            <p:contentPart p14:bwMode="auto" r:id="rId20">
-              <p14:nvContentPartPr>
-                <p14:cNvPr id="24" name="Ink 23">
-                  <a:extLst>
-                    <a:ext uri="{FF2B5EF4-FFF2-40B4-BE49-F238E27FC236}">
-                      <a16:creationId xmlns:a16="http://schemas.microsoft.com/office/drawing/2014/main" id="{8F47C7BD-8B33-4020-8DDF-21FB25D0A404}"/>
-                    </a:ext>
-                  </a:extLst>
-                </p14:cNvPr>
-                <p14:cNvContentPartPr/>
-                <p14:nvPr/>
-              </p14:nvContentPartPr>
-              <p14:xfrm>
-                <a:off x="9873864" y="4679280"/>
-                <a:ext cx="210600" cy="190080"/>
-              </p14:xfrm>
-            </p:contentPart>
-          </mc:Choice>
-          <mc:Fallback xmlns="">
-            <p:pic>
-              <p:nvPicPr>
-                <p:cNvPr id="24" name="Ink 23">
-                  <a:extLst>
-                    <a:ext uri="{FF2B5EF4-FFF2-40B4-BE49-F238E27FC236}">
-                      <a16:creationId xmlns:a16="http://schemas.microsoft.com/office/drawing/2014/main" id="{8F47C7BD-8B33-4020-8DDF-21FB25D0A404}"/>
-                    </a:ext>
-                  </a:extLst>
-                </p:cNvPr>
-                <p:cNvPicPr/>
-                <p:nvPr/>
-              </p:nvPicPr>
-              <p:blipFill>
-                <a:blip r:embed="rId21"/>
-                <a:stretch>
-                  <a:fillRect/>
-                </a:stretch>
-              </p:blipFill>
-              <p:spPr>
-                <a:xfrm>
-                  <a:off x="9867744" y="4673160"/>
-                  <a:ext cx="222840" cy="202320"/>
-                </a:xfrm>
-                <a:prstGeom prst="rect">
-                  <a:avLst/>
-                </a:prstGeom>
-              </p:spPr>
-            </p:pic>
-          </mc:Fallback>
-        </mc:AlternateContent>
-      </p:grpSp>
       <p:sp>
         <p:nvSpPr>
           <p:cNvPr id="26" name="TextBox 25">
@@ -4415,8 +4976,8 @@
         </p:nvSpPr>
         <p:spPr>
           <a:xfrm>
-            <a:off x="9148150" y="3885695"/>
-            <a:ext cx="3043850" cy="923330"/>
+            <a:off x="7964424" y="6348826"/>
+            <a:ext cx="3043850" cy="461665"/>
           </a:xfrm>
           <a:prstGeom prst="rect">
             <a:avLst/>
@@ -4430,8 +4991,8 @@
           <a:lstStyle/>
           <a:p>
             <a:r>
-              <a:rPr lang="en-US" dirty="0"/>
-              <a:t>4. Features greater than 0.5 and selecting important ones across all the datasets</a:t>
+              <a:rPr lang="en-US" sz="1200" dirty="0"/>
+              <a:t>5 Features greater than 0.5 and selecting important ones across all the datasets</a:t>
             </a:r>
           </a:p>
         </p:txBody>
@@ -4451,14 +5012,14 @@
           <p:nvPr/>
         </p:nvPicPr>
         <p:blipFill>
-          <a:blip r:embed="rId22"/>
+          <a:blip r:embed="rId18"/>
           <a:stretch>
             <a:fillRect/>
           </a:stretch>
         </p:blipFill>
         <p:spPr>
           <a:xfrm>
-            <a:off x="7474692" y="4854233"/>
+            <a:off x="7921507" y="4410116"/>
             <a:ext cx="2207260" cy="1880625"/>
           </a:xfrm>
           <a:prstGeom prst="rect">
@@ -4481,7 +5042,7 @@
           <p:nvPr/>
         </p:nvPicPr>
         <p:blipFill>
-          <a:blip r:embed="rId23"/>
+          <a:blip r:embed="rId19"/>
           <a:stretch>
             <a:fillRect/>
           </a:stretch>
@@ -4510,7 +5071,7 @@
         </p:nvGrpSpPr>
         <p:grpSpPr>
           <a:xfrm>
-            <a:off x="6528744" y="5821560"/>
+            <a:off x="6653068" y="5451524"/>
             <a:ext cx="810000" cy="154080"/>
             <a:chOff x="6528744" y="5821560"/>
             <a:chExt cx="810000" cy="154080"/>
@@ -4518,7 +5079,7 @@
         </p:grpSpPr>
         <mc:AlternateContent xmlns:mc="http://schemas.openxmlformats.org/markup-compatibility/2006" xmlns:p14="http://schemas.microsoft.com/office/powerpoint/2010/main">
           <mc:Choice Requires="p14">
-            <p:contentPart p14:bwMode="auto" r:id="rId24">
+            <p:contentPart p14:bwMode="auto" r:id="rId20">
               <p14:nvContentPartPr>
                 <p14:cNvPr id="31" name="Ink 30">
                   <a:extLst>
@@ -4619,6 +5180,2045 @@
           </mc:Fallback>
         </mc:AlternateContent>
       </p:grpSp>
+      <p:sp>
+        <p:nvSpPr>
+          <p:cNvPr id="5" name="TextBox 4">
+            <a:extLst>
+              <a:ext uri="{FF2B5EF4-FFF2-40B4-BE49-F238E27FC236}">
+                <a16:creationId xmlns:a16="http://schemas.microsoft.com/office/drawing/2014/main" id="{A24A5ADA-7108-F88A-12E2-047B9980C2C6}"/>
+              </a:ext>
+            </a:extLst>
+          </p:cNvPr>
+          <p:cNvSpPr txBox="1"/>
+          <p:nvPr/>
+        </p:nvSpPr>
+        <p:spPr>
+          <a:xfrm>
+            <a:off x="2147115" y="1896364"/>
+            <a:ext cx="2115573" cy="830997"/>
+          </a:xfrm>
+          <a:prstGeom prst="rect">
+            <a:avLst/>
+          </a:prstGeom>
+          <a:noFill/>
+        </p:spPr>
+        <p:txBody>
+          <a:bodyPr wrap="square" rtlCol="0">
+            <a:spAutoFit/>
+          </a:bodyPr>
+          <a:lstStyle/>
+          <a:p>
+            <a:r>
+              <a:rPr lang="en-US" sz="1200" dirty="0"/>
+              <a:t>Thresholds on correlations coefficients</a:t>
+            </a:r>
+          </a:p>
+          <a:p>
+            <a:pPr marL="285750" indent="-285750">
+              <a:buFont typeface="Arial" panose="020B0604020202020204" pitchFamily="34" charset="0"/>
+              <a:buChar char="•"/>
+            </a:pPr>
+            <a:r>
+              <a:rPr lang="en-US" sz="1200" dirty="0"/>
+              <a:t>Spearman (0.275)</a:t>
+            </a:r>
+          </a:p>
+          <a:p>
+            <a:pPr marL="285750" indent="-285750">
+              <a:buFont typeface="Arial" panose="020B0604020202020204" pitchFamily="34" charset="0"/>
+              <a:buChar char="•"/>
+            </a:pPr>
+            <a:r>
+              <a:rPr lang="en-US" sz="1200" dirty="0"/>
+              <a:t>Pearson (0.3)</a:t>
+            </a:r>
+          </a:p>
+        </p:txBody>
+      </p:sp>
+      <mc:AlternateContent xmlns:mc="http://schemas.openxmlformats.org/markup-compatibility/2006">
+        <mc:Choice xmlns:p14="http://schemas.microsoft.com/office/powerpoint/2010/main" Requires="p14">
+          <p:contentPart p14:bwMode="auto" r:id="rId28">
+            <p14:nvContentPartPr>
+              <p14:cNvPr id="21" name="Ink 20">
+                <a:extLst>
+                  <a:ext uri="{FF2B5EF4-FFF2-40B4-BE49-F238E27FC236}">
+                    <a16:creationId xmlns:a16="http://schemas.microsoft.com/office/drawing/2014/main" id="{474145E4-7EDC-5DF6-0B24-3009AE5729E9}"/>
+                  </a:ext>
+                </a:extLst>
+              </p14:cNvPr>
+              <p14:cNvContentPartPr/>
+              <p14:nvPr/>
+            </p14:nvContentPartPr>
+            <p14:xfrm>
+              <a:off x="2031373" y="3321196"/>
+              <a:ext cx="318960" cy="60480"/>
+            </p14:xfrm>
+          </p:contentPart>
+        </mc:Choice>
+        <mc:Fallback>
+          <p:pic>
+            <p:nvPicPr>
+              <p:cNvPr id="21" name="Ink 20">
+                <a:extLst>
+                  <a:ext uri="{FF2B5EF4-FFF2-40B4-BE49-F238E27FC236}">
+                    <a16:creationId xmlns:a16="http://schemas.microsoft.com/office/drawing/2014/main" id="{474145E4-7EDC-5DF6-0B24-3009AE5729E9}"/>
+                  </a:ext>
+                </a:extLst>
+              </p:cNvPr>
+              <p:cNvPicPr/>
+              <p:nvPr/>
+            </p:nvPicPr>
+            <p:blipFill>
+              <a:blip r:embed="rId29"/>
+              <a:stretch>
+                <a:fillRect/>
+              </a:stretch>
+            </p:blipFill>
+            <p:spPr>
+              <a:xfrm>
+                <a:off x="2025253" y="3315076"/>
+                <a:ext cx="331200" cy="72720"/>
+              </a:xfrm>
+              <a:prstGeom prst="rect">
+                <a:avLst/>
+              </a:prstGeom>
+            </p:spPr>
+          </p:pic>
+        </mc:Fallback>
+      </mc:AlternateContent>
+      <mc:AlternateContent xmlns:mc="http://schemas.openxmlformats.org/markup-compatibility/2006">
+        <mc:Choice xmlns:p14="http://schemas.microsoft.com/office/powerpoint/2010/main" Requires="p14">
+          <p:contentPart p14:bwMode="auto" r:id="rId30">
+            <p14:nvContentPartPr>
+              <p14:cNvPr id="27" name="Ink 26">
+                <a:extLst>
+                  <a:ext uri="{FF2B5EF4-FFF2-40B4-BE49-F238E27FC236}">
+                    <a16:creationId xmlns:a16="http://schemas.microsoft.com/office/drawing/2014/main" id="{BF3189EA-6C0D-6E23-B023-AF70FBEBCBC7}"/>
+                  </a:ext>
+                </a:extLst>
+              </p14:cNvPr>
+              <p14:cNvContentPartPr/>
+              <p14:nvPr/>
+            </p14:nvContentPartPr>
+            <p14:xfrm>
+              <a:off x="5289373" y="1512916"/>
+              <a:ext cx="851040" cy="1403280"/>
+            </p14:xfrm>
+          </p:contentPart>
+        </mc:Choice>
+        <mc:Fallback>
+          <p:pic>
+            <p:nvPicPr>
+              <p:cNvPr id="27" name="Ink 26">
+                <a:extLst>
+                  <a:ext uri="{FF2B5EF4-FFF2-40B4-BE49-F238E27FC236}">
+                    <a16:creationId xmlns:a16="http://schemas.microsoft.com/office/drawing/2014/main" id="{BF3189EA-6C0D-6E23-B023-AF70FBEBCBC7}"/>
+                  </a:ext>
+                </a:extLst>
+              </p:cNvPr>
+              <p:cNvPicPr/>
+              <p:nvPr/>
+            </p:nvPicPr>
+            <p:blipFill>
+              <a:blip r:embed="rId31"/>
+              <a:stretch>
+                <a:fillRect/>
+              </a:stretch>
+            </p:blipFill>
+            <p:spPr>
+              <a:xfrm>
+                <a:off x="5283253" y="1506796"/>
+                <a:ext cx="863280" cy="1415520"/>
+              </a:xfrm>
+              <a:prstGeom prst="rect">
+                <a:avLst/>
+              </a:prstGeom>
+            </p:spPr>
+          </p:pic>
+        </mc:Fallback>
+      </mc:AlternateContent>
+      <mc:AlternateContent xmlns:mc="http://schemas.openxmlformats.org/markup-compatibility/2006">
+        <mc:Choice xmlns:p14="http://schemas.microsoft.com/office/powerpoint/2010/main" Requires="p14">
+          <p:contentPart p14:bwMode="auto" r:id="rId32">
+            <p14:nvContentPartPr>
+              <p14:cNvPr id="29" name="Ink 28">
+                <a:extLst>
+                  <a:ext uri="{FF2B5EF4-FFF2-40B4-BE49-F238E27FC236}">
+                    <a16:creationId xmlns:a16="http://schemas.microsoft.com/office/drawing/2014/main" id="{02824C3A-B021-3913-6A44-FF5425346499}"/>
+                  </a:ext>
+                </a:extLst>
+              </p14:cNvPr>
+              <p14:cNvContentPartPr/>
+              <p14:nvPr/>
+            </p14:nvContentPartPr>
+            <p14:xfrm>
+              <a:off x="2569573" y="3305716"/>
+              <a:ext cx="428400" cy="302760"/>
+            </p14:xfrm>
+          </p:contentPart>
+        </mc:Choice>
+        <mc:Fallback>
+          <p:pic>
+            <p:nvPicPr>
+              <p:cNvPr id="29" name="Ink 28">
+                <a:extLst>
+                  <a:ext uri="{FF2B5EF4-FFF2-40B4-BE49-F238E27FC236}">
+                    <a16:creationId xmlns:a16="http://schemas.microsoft.com/office/drawing/2014/main" id="{02824C3A-B021-3913-6A44-FF5425346499}"/>
+                  </a:ext>
+                </a:extLst>
+              </p:cNvPr>
+              <p:cNvPicPr/>
+              <p:nvPr/>
+            </p:nvPicPr>
+            <p:blipFill>
+              <a:blip r:embed="rId33"/>
+              <a:stretch>
+                <a:fillRect/>
+              </a:stretch>
+            </p:blipFill>
+            <p:spPr>
+              <a:xfrm>
+                <a:off x="2563453" y="3299596"/>
+                <a:ext cx="440640" cy="315000"/>
+              </a:xfrm>
+              <a:prstGeom prst="rect">
+                <a:avLst/>
+              </a:prstGeom>
+            </p:spPr>
+          </p:pic>
+        </mc:Fallback>
+      </mc:AlternateContent>
+      <p:sp>
+        <p:nvSpPr>
+          <p:cNvPr id="34" name="TextBox 33">
+            <a:extLst>
+              <a:ext uri="{FF2B5EF4-FFF2-40B4-BE49-F238E27FC236}">
+                <a16:creationId xmlns:a16="http://schemas.microsoft.com/office/drawing/2014/main" id="{D2D000FA-D31E-89F6-269A-4DA1A68FF2BF}"/>
+              </a:ext>
+            </a:extLst>
+          </p:cNvPr>
+          <p:cNvSpPr txBox="1"/>
+          <p:nvPr/>
+        </p:nvSpPr>
+        <p:spPr>
+          <a:xfrm>
+            <a:off x="435728" y="5496854"/>
+            <a:ext cx="2963953" cy="369332"/>
+          </a:xfrm>
+          <a:prstGeom prst="rect">
+            <a:avLst/>
+          </a:prstGeom>
+          <a:noFill/>
+        </p:spPr>
+        <p:txBody>
+          <a:bodyPr wrap="none" rtlCol="0">
+            <a:spAutoFit/>
+          </a:bodyPr>
+          <a:lstStyle/>
+          <a:p>
+            <a:r>
+              <a:rPr lang="en-US" dirty="0"/>
+              <a:t>1. Different dataset curation</a:t>
+            </a:r>
+          </a:p>
+        </p:txBody>
+      </p:sp>
+      <p:grpSp>
+        <p:nvGrpSpPr>
+          <p:cNvPr id="37" name="Group 36">
+            <a:extLst>
+              <a:ext uri="{FF2B5EF4-FFF2-40B4-BE49-F238E27FC236}">
+                <a16:creationId xmlns:a16="http://schemas.microsoft.com/office/drawing/2014/main" id="{CC3B57D6-6750-D40B-5603-E426AAD2DA18}"/>
+              </a:ext>
+            </a:extLst>
+          </p:cNvPr>
+          <p:cNvGrpSpPr/>
+          <p:nvPr/>
+        </p:nvGrpSpPr>
+        <p:grpSpPr>
+          <a:xfrm>
+            <a:off x="1709173" y="4850116"/>
+            <a:ext cx="145440" cy="559440"/>
+            <a:chOff x="1709173" y="4850116"/>
+            <a:chExt cx="145440" cy="559440"/>
+          </a:xfrm>
+        </p:grpSpPr>
+        <mc:AlternateContent xmlns:mc="http://schemas.openxmlformats.org/markup-compatibility/2006">
+          <mc:Choice xmlns:p14="http://schemas.microsoft.com/office/powerpoint/2010/main" Requires="p14">
+            <p:contentPart p14:bwMode="auto" r:id="rId34">
+              <p14:nvContentPartPr>
+                <p14:cNvPr id="35" name="Ink 34">
+                  <a:extLst>
+                    <a:ext uri="{FF2B5EF4-FFF2-40B4-BE49-F238E27FC236}">
+                      <a16:creationId xmlns:a16="http://schemas.microsoft.com/office/drawing/2014/main" id="{973E0F56-8D2D-5273-E56F-340AF0AE411D}"/>
+                    </a:ext>
+                  </a:extLst>
+                </p14:cNvPr>
+                <p14:cNvContentPartPr/>
+                <p14:nvPr/>
+              </p14:nvContentPartPr>
+              <p14:xfrm>
+                <a:off x="1763893" y="4866316"/>
+                <a:ext cx="66960" cy="543240"/>
+              </p14:xfrm>
+            </p:contentPart>
+          </mc:Choice>
+          <mc:Fallback>
+            <p:pic>
+              <p:nvPicPr>
+                <p:cNvPr id="35" name="Ink 34">
+                  <a:extLst>
+                    <a:ext uri="{FF2B5EF4-FFF2-40B4-BE49-F238E27FC236}">
+                      <a16:creationId xmlns:a16="http://schemas.microsoft.com/office/drawing/2014/main" id="{973E0F56-8D2D-5273-E56F-340AF0AE411D}"/>
+                    </a:ext>
+                  </a:extLst>
+                </p:cNvPr>
+                <p:cNvPicPr/>
+                <p:nvPr/>
+              </p:nvPicPr>
+              <p:blipFill>
+                <a:blip r:embed="rId35"/>
+                <a:stretch>
+                  <a:fillRect/>
+                </a:stretch>
+              </p:blipFill>
+              <p:spPr>
+                <a:xfrm>
+                  <a:off x="1757773" y="4860196"/>
+                  <a:ext cx="79200" cy="555480"/>
+                </a:xfrm>
+                <a:prstGeom prst="rect">
+                  <a:avLst/>
+                </a:prstGeom>
+              </p:spPr>
+            </p:pic>
+          </mc:Fallback>
+        </mc:AlternateContent>
+        <mc:AlternateContent xmlns:mc="http://schemas.openxmlformats.org/markup-compatibility/2006">
+          <mc:Choice xmlns:p14="http://schemas.microsoft.com/office/powerpoint/2010/main" Requires="p14">
+            <p:contentPart p14:bwMode="auto" r:id="rId36">
+              <p14:nvContentPartPr>
+                <p14:cNvPr id="36" name="Ink 35">
+                  <a:extLst>
+                    <a:ext uri="{FF2B5EF4-FFF2-40B4-BE49-F238E27FC236}">
+                      <a16:creationId xmlns:a16="http://schemas.microsoft.com/office/drawing/2014/main" id="{A868AE37-BC06-481D-59A4-35392C015A78}"/>
+                    </a:ext>
+                  </a:extLst>
+                </p14:cNvPr>
+                <p14:cNvContentPartPr/>
+                <p14:nvPr/>
+              </p14:nvContentPartPr>
+              <p14:xfrm>
+                <a:off x="1709173" y="4850116"/>
+                <a:ext cx="145440" cy="98640"/>
+              </p14:xfrm>
+            </p:contentPart>
+          </mc:Choice>
+          <mc:Fallback>
+            <p:pic>
+              <p:nvPicPr>
+                <p:cNvPr id="36" name="Ink 35">
+                  <a:extLst>
+                    <a:ext uri="{FF2B5EF4-FFF2-40B4-BE49-F238E27FC236}">
+                      <a16:creationId xmlns:a16="http://schemas.microsoft.com/office/drawing/2014/main" id="{A868AE37-BC06-481D-59A4-35392C015A78}"/>
+                    </a:ext>
+                  </a:extLst>
+                </p:cNvPr>
+                <p:cNvPicPr/>
+                <p:nvPr/>
+              </p:nvPicPr>
+              <p:blipFill>
+                <a:blip r:embed="rId37"/>
+                <a:stretch>
+                  <a:fillRect/>
+                </a:stretch>
+              </p:blipFill>
+              <p:spPr>
+                <a:xfrm>
+                  <a:off x="1703053" y="4843996"/>
+                  <a:ext cx="157680" cy="110880"/>
+                </a:xfrm>
+                <a:prstGeom prst="rect">
+                  <a:avLst/>
+                </a:prstGeom>
+              </p:spPr>
+            </p:pic>
+          </mc:Fallback>
+        </mc:AlternateContent>
+      </p:grpSp>
+      <p:grpSp>
+        <p:nvGrpSpPr>
+          <p:cNvPr id="40" name="Group 39">
+            <a:extLst>
+              <a:ext uri="{FF2B5EF4-FFF2-40B4-BE49-F238E27FC236}">
+                <a16:creationId xmlns:a16="http://schemas.microsoft.com/office/drawing/2014/main" id="{1FE046DE-28A5-E899-7757-73E3341ABC41}"/>
+              </a:ext>
+            </a:extLst>
+          </p:cNvPr>
+          <p:cNvGrpSpPr/>
+          <p:nvPr/>
+        </p:nvGrpSpPr>
+        <p:grpSpPr>
+          <a:xfrm>
+            <a:off x="10247211" y="3463036"/>
+            <a:ext cx="308880" cy="1436400"/>
+            <a:chOff x="9196453" y="3388156"/>
+            <a:chExt cx="308880" cy="1436400"/>
+          </a:xfrm>
+        </p:grpSpPr>
+        <mc:AlternateContent xmlns:mc="http://schemas.openxmlformats.org/markup-compatibility/2006">
+          <mc:Choice xmlns:p14="http://schemas.microsoft.com/office/powerpoint/2010/main" Requires="p14">
+            <p:contentPart p14:bwMode="auto" r:id="rId38">
+              <p14:nvContentPartPr>
+                <p14:cNvPr id="38" name="Ink 37">
+                  <a:extLst>
+                    <a:ext uri="{FF2B5EF4-FFF2-40B4-BE49-F238E27FC236}">
+                      <a16:creationId xmlns:a16="http://schemas.microsoft.com/office/drawing/2014/main" id="{9B914111-278E-50BB-123A-6EF3908EF446}"/>
+                    </a:ext>
+                  </a:extLst>
+                </p14:cNvPr>
+                <p14:cNvContentPartPr/>
+                <p14:nvPr/>
+              </p14:nvContentPartPr>
+              <p14:xfrm>
+                <a:off x="9225973" y="3388156"/>
+                <a:ext cx="279360" cy="1416960"/>
+              </p14:xfrm>
+            </p:contentPart>
+          </mc:Choice>
+          <mc:Fallback>
+            <p:pic>
+              <p:nvPicPr>
+                <p:cNvPr id="38" name="Ink 37">
+                  <a:extLst>
+                    <a:ext uri="{FF2B5EF4-FFF2-40B4-BE49-F238E27FC236}">
+                      <a16:creationId xmlns:a16="http://schemas.microsoft.com/office/drawing/2014/main" id="{9B914111-278E-50BB-123A-6EF3908EF446}"/>
+                    </a:ext>
+                  </a:extLst>
+                </p:cNvPr>
+                <p:cNvPicPr/>
+                <p:nvPr/>
+              </p:nvPicPr>
+              <p:blipFill>
+                <a:blip r:embed="rId39"/>
+                <a:stretch>
+                  <a:fillRect/>
+                </a:stretch>
+              </p:blipFill>
+              <p:spPr>
+                <a:xfrm>
+                  <a:off x="9219853" y="3382036"/>
+                  <a:ext cx="291600" cy="1429200"/>
+                </a:xfrm>
+                <a:prstGeom prst="rect">
+                  <a:avLst/>
+                </a:prstGeom>
+              </p:spPr>
+            </p:pic>
+          </mc:Fallback>
+        </mc:AlternateContent>
+        <mc:AlternateContent xmlns:mc="http://schemas.openxmlformats.org/markup-compatibility/2006">
+          <mc:Choice xmlns:p14="http://schemas.microsoft.com/office/powerpoint/2010/main" Requires="p14">
+            <p:contentPart p14:bwMode="auto" r:id="rId40">
+              <p14:nvContentPartPr>
+                <p14:cNvPr id="39" name="Ink 38">
+                  <a:extLst>
+                    <a:ext uri="{FF2B5EF4-FFF2-40B4-BE49-F238E27FC236}">
+                      <a16:creationId xmlns:a16="http://schemas.microsoft.com/office/drawing/2014/main" id="{95728924-C8A4-B4C1-28A5-8ECEE04F4858}"/>
+                    </a:ext>
+                  </a:extLst>
+                </p14:cNvPr>
+                <p14:cNvContentPartPr/>
+                <p14:nvPr/>
+              </p14:nvContentPartPr>
+              <p14:xfrm>
+                <a:off x="9196453" y="4691356"/>
+                <a:ext cx="159480" cy="133200"/>
+              </p14:xfrm>
+            </p:contentPart>
+          </mc:Choice>
+          <mc:Fallback>
+            <p:pic>
+              <p:nvPicPr>
+                <p:cNvPr id="39" name="Ink 38">
+                  <a:extLst>
+                    <a:ext uri="{FF2B5EF4-FFF2-40B4-BE49-F238E27FC236}">
+                      <a16:creationId xmlns:a16="http://schemas.microsoft.com/office/drawing/2014/main" id="{95728924-C8A4-B4C1-28A5-8ECEE04F4858}"/>
+                    </a:ext>
+                  </a:extLst>
+                </p:cNvPr>
+                <p:cNvPicPr/>
+                <p:nvPr/>
+              </p:nvPicPr>
+              <p:blipFill>
+                <a:blip r:embed="rId41"/>
+                <a:stretch>
+                  <a:fillRect/>
+                </a:stretch>
+              </p:blipFill>
+              <p:spPr>
+                <a:xfrm>
+                  <a:off x="9190333" y="4685236"/>
+                  <a:ext cx="171720" cy="145440"/>
+                </a:xfrm>
+                <a:prstGeom prst="rect">
+                  <a:avLst/>
+                </a:prstGeom>
+              </p:spPr>
+            </p:pic>
+          </mc:Fallback>
+        </mc:AlternateContent>
+      </p:grpSp>
+      <p:pic>
+        <p:nvPicPr>
+          <p:cNvPr id="41" name="Picture 2">
+            <a:extLst>
+              <a:ext uri="{FF2B5EF4-FFF2-40B4-BE49-F238E27FC236}">
+                <a16:creationId xmlns:a16="http://schemas.microsoft.com/office/drawing/2014/main" id="{4E03660D-7C73-DFCA-1CC7-3B884D79E417}"/>
+              </a:ext>
+            </a:extLst>
+          </p:cNvPr>
+          <p:cNvPicPr>
+            <a:picLocks noChangeAspect="1" noChangeArrowheads="1"/>
+          </p:cNvPicPr>
+          <p:nvPr/>
+        </p:nvPicPr>
+        <p:blipFill rotWithShape="1">
+          <a:blip r:embed="rId42">
+            <a:extLst>
+              <a:ext uri="{28A0092B-C50C-407E-A947-70E740481C1C}">
+                <a14:useLocalDpi xmlns:a14="http://schemas.microsoft.com/office/drawing/2010/main" val="0"/>
+              </a:ext>
+            </a:extLst>
+          </a:blip>
+          <a:srcRect l="13866" r="11943"/>
+          <a:stretch/>
+        </p:blipFill>
+        <p:spPr bwMode="auto">
+          <a:xfrm>
+            <a:off x="1127093" y="5866720"/>
+            <a:ext cx="1244776" cy="943771"/>
+          </a:xfrm>
+          <a:prstGeom prst="rect">
+            <a:avLst/>
+          </a:prstGeom>
+          <a:noFill/>
+          <a:extLst>
+            <a:ext uri="{909E8E84-426E-40DD-AFC4-6F175D3DCCD1}">
+              <a14:hiddenFill xmlns:a14="http://schemas.microsoft.com/office/drawing/2010/main">
+                <a:solidFill>
+                  <a:srgbClr val="FFFFFF"/>
+                </a:solidFill>
+              </a14:hiddenFill>
+            </a:ext>
+          </a:extLst>
+        </p:spPr>
+      </p:pic>
+      <p:sp>
+        <p:nvSpPr>
+          <p:cNvPr id="42" name="TextBox 41">
+            <a:extLst>
+              <a:ext uri="{FF2B5EF4-FFF2-40B4-BE49-F238E27FC236}">
+                <a16:creationId xmlns:a16="http://schemas.microsoft.com/office/drawing/2014/main" id="{3AA0F665-59E4-1A4F-D107-C6982C69726A}"/>
+              </a:ext>
+            </a:extLst>
+          </p:cNvPr>
+          <p:cNvSpPr txBox="1"/>
+          <p:nvPr/>
+        </p:nvSpPr>
+        <p:spPr>
+          <a:xfrm>
+            <a:off x="3617943" y="4109650"/>
+            <a:ext cx="4042161" cy="369332"/>
+          </a:xfrm>
+          <a:prstGeom prst="rect">
+            <a:avLst/>
+          </a:prstGeom>
+          <a:noFill/>
+        </p:spPr>
+        <p:txBody>
+          <a:bodyPr wrap="square" rtlCol="0">
+            <a:spAutoFit/>
+          </a:bodyPr>
+          <a:lstStyle/>
+          <a:p>
+            <a:r>
+              <a:rPr lang="en-US" dirty="0"/>
+              <a:t>6. Scaling laws for dominant features</a:t>
+            </a:r>
+          </a:p>
+        </p:txBody>
+      </p:sp>
+    </p:spTree>
+    <p:extLst>
+      <p:ext uri="{BB962C8B-B14F-4D97-AF65-F5344CB8AC3E}">
+        <p14:creationId xmlns:p14="http://schemas.microsoft.com/office/powerpoint/2010/main" val="2285776093"/>
+      </p:ext>
+    </p:extLst>
+  </p:cSld>
+  <p:clrMapOvr>
+    <a:masterClrMapping/>
+  </p:clrMapOvr>
+</p:sld>
+</file>
+
+<file path=ppt/slides/slide2.xml><?xml version="1.0" encoding="utf-8"?>
+<p:sld xmlns:a="http://schemas.openxmlformats.org/drawingml/2006/main" xmlns:r="http://schemas.openxmlformats.org/officeDocument/2006/relationships" xmlns:p="http://schemas.openxmlformats.org/presentationml/2006/main">
+  <p:cSld>
+    <p:spTree>
+      <p:nvGrpSpPr>
+        <p:cNvPr id="1" name=""/>
+        <p:cNvGrpSpPr/>
+        <p:nvPr/>
+      </p:nvGrpSpPr>
+      <p:grpSpPr>
+        <a:xfrm>
+          <a:off x="0" y="0"/>
+          <a:ext cx="0" cy="0"/>
+          <a:chOff x="0" y="0"/>
+          <a:chExt cx="0" cy="0"/>
+        </a:xfrm>
+      </p:grpSpPr>
+      <p:pic>
+        <p:nvPicPr>
+          <p:cNvPr id="3074" name="Picture 2">
+            <a:extLst>
+              <a:ext uri="{FF2B5EF4-FFF2-40B4-BE49-F238E27FC236}">
+                <a16:creationId xmlns:a16="http://schemas.microsoft.com/office/drawing/2014/main" id="{7F918444-60DD-8278-F9F9-CCF91CF5830E}"/>
+              </a:ext>
+            </a:extLst>
+          </p:cNvPr>
+          <p:cNvPicPr>
+            <a:picLocks noChangeAspect="1" noChangeArrowheads="1"/>
+          </p:cNvPicPr>
+          <p:nvPr/>
+        </p:nvPicPr>
+        <p:blipFill rotWithShape="1">
+          <a:blip r:embed="rId2">
+            <a:extLst>
+              <a:ext uri="{28A0092B-C50C-407E-A947-70E740481C1C}">
+                <a14:useLocalDpi xmlns:a14="http://schemas.microsoft.com/office/drawing/2010/main" val="0"/>
+              </a:ext>
+            </a:extLst>
+          </a:blip>
+          <a:srcRect l="13866" r="11943"/>
+          <a:stretch/>
+        </p:blipFill>
+        <p:spPr bwMode="auto">
+          <a:xfrm>
+            <a:off x="2514598" y="965032"/>
+            <a:ext cx="6499643" cy="4927935"/>
+          </a:xfrm>
+          <a:prstGeom prst="rect">
+            <a:avLst/>
+          </a:prstGeom>
+          <a:noFill/>
+          <a:extLst>
+            <a:ext uri="{909E8E84-426E-40DD-AFC4-6F175D3DCCD1}">
+              <a14:hiddenFill xmlns:a14="http://schemas.microsoft.com/office/drawing/2010/main">
+                <a:solidFill>
+                  <a:srgbClr val="FFFFFF"/>
+                </a:solidFill>
+              </a14:hiddenFill>
+            </a:ext>
+          </a:extLst>
+        </p:spPr>
+      </p:pic>
+    </p:spTree>
+    <p:extLst>
+      <p:ext uri="{BB962C8B-B14F-4D97-AF65-F5344CB8AC3E}">
+        <p14:creationId xmlns:p14="http://schemas.microsoft.com/office/powerpoint/2010/main" val="4169702370"/>
+      </p:ext>
+    </p:extLst>
+  </p:cSld>
+  <p:clrMapOvr>
+    <a:masterClrMapping/>
+  </p:clrMapOvr>
+</p:sld>
+</file>
+
+<file path=ppt/slides/slide3.xml><?xml version="1.0" encoding="utf-8"?>
+<p:sld xmlns:a="http://schemas.openxmlformats.org/drawingml/2006/main" xmlns:r="http://schemas.openxmlformats.org/officeDocument/2006/relationships" xmlns:p="http://schemas.openxmlformats.org/presentationml/2006/main">
+  <p:cSld>
+    <p:spTree>
+      <p:nvGrpSpPr>
+        <p:cNvPr id="1" name=""/>
+        <p:cNvGrpSpPr/>
+        <p:nvPr/>
+      </p:nvGrpSpPr>
+      <p:grpSpPr>
+        <a:xfrm>
+          <a:off x="0" y="0"/>
+          <a:ext cx="0" cy="0"/>
+          <a:chOff x="0" y="0"/>
+          <a:chExt cx="0" cy="0"/>
+        </a:xfrm>
+      </p:grpSpPr>
+      <p:pic>
+        <p:nvPicPr>
+          <p:cNvPr id="4" name="Picture 3" descr="A table with numbers and text&#10;&#10;Description automatically generated">
+            <a:extLst>
+              <a:ext uri="{FF2B5EF4-FFF2-40B4-BE49-F238E27FC236}">
+                <a16:creationId xmlns:a16="http://schemas.microsoft.com/office/drawing/2014/main" id="{57812120-5132-545A-9339-89BBCB8B92DB}"/>
+              </a:ext>
+            </a:extLst>
+          </p:cNvPr>
+          <p:cNvPicPr>
+            <a:picLocks noChangeAspect="1"/>
+          </p:cNvPicPr>
+          <p:nvPr/>
+        </p:nvPicPr>
+        <p:blipFill>
+          <a:blip r:embed="rId2"/>
+          <a:stretch>
+            <a:fillRect/>
+          </a:stretch>
+        </p:blipFill>
+        <p:spPr>
+          <a:xfrm>
+            <a:off x="1976224" y="705288"/>
+            <a:ext cx="7915115" cy="4564544"/>
+          </a:xfrm>
+          <a:prstGeom prst="rect">
+            <a:avLst/>
+          </a:prstGeom>
+        </p:spPr>
+      </p:pic>
+      <mc:AlternateContent xmlns:mc="http://schemas.openxmlformats.org/markup-compatibility/2006">
+        <mc:Choice xmlns:p14="http://schemas.microsoft.com/office/powerpoint/2010/main" Requires="p14">
+          <p:contentPart p14:bwMode="auto" r:id="rId3">
+            <p14:nvContentPartPr>
+              <p14:cNvPr id="6" name="Ink 5">
+                <a:extLst>
+                  <a:ext uri="{FF2B5EF4-FFF2-40B4-BE49-F238E27FC236}">
+                    <a16:creationId xmlns:a16="http://schemas.microsoft.com/office/drawing/2014/main" id="{14AEEFDA-B8EC-41F3-4A27-9533080D672B}"/>
+                  </a:ext>
+                </a:extLst>
+              </p14:cNvPr>
+              <p14:cNvContentPartPr/>
+              <p14:nvPr/>
+            </p14:nvContentPartPr>
+            <p14:xfrm>
+              <a:off x="1914013" y="5165476"/>
+              <a:ext cx="274680" cy="118800"/>
+            </p14:xfrm>
+          </p:contentPart>
+        </mc:Choice>
+        <mc:Fallback>
+          <p:pic>
+            <p:nvPicPr>
+              <p:cNvPr id="6" name="Ink 5">
+                <a:extLst>
+                  <a:ext uri="{FF2B5EF4-FFF2-40B4-BE49-F238E27FC236}">
+                    <a16:creationId xmlns:a16="http://schemas.microsoft.com/office/drawing/2014/main" id="{14AEEFDA-B8EC-41F3-4A27-9533080D672B}"/>
+                  </a:ext>
+                </a:extLst>
+              </p:cNvPr>
+              <p:cNvPicPr/>
+              <p:nvPr/>
+            </p:nvPicPr>
+            <p:blipFill>
+              <a:blip r:embed="rId4"/>
+              <a:stretch>
+                <a:fillRect/>
+              </a:stretch>
+            </p:blipFill>
+            <p:spPr>
+              <a:xfrm>
+                <a:off x="1907893" y="5159356"/>
+                <a:ext cx="286920" cy="131040"/>
+              </a:xfrm>
+              <a:prstGeom prst="rect">
+                <a:avLst/>
+              </a:prstGeom>
+            </p:spPr>
+          </p:pic>
+        </mc:Fallback>
+      </mc:AlternateContent>
+    </p:spTree>
+    <p:extLst>
+      <p:ext uri="{BB962C8B-B14F-4D97-AF65-F5344CB8AC3E}">
+        <p14:creationId xmlns:p14="http://schemas.microsoft.com/office/powerpoint/2010/main" val="2152507022"/>
+      </p:ext>
+    </p:extLst>
+  </p:cSld>
+  <p:clrMapOvr>
+    <a:masterClrMapping/>
+  </p:clrMapOvr>
+</p:sld>
+</file>
+
+<file path=ppt/slides/slide4.xml><?xml version="1.0" encoding="utf-8"?>
+<p:sld xmlns:a="http://schemas.openxmlformats.org/drawingml/2006/main" xmlns:r="http://schemas.openxmlformats.org/officeDocument/2006/relationships" xmlns:p="http://schemas.openxmlformats.org/presentationml/2006/main">
+  <p:cSld>
+    <p:spTree>
+      <p:nvGrpSpPr>
+        <p:cNvPr id="1" name=""/>
+        <p:cNvGrpSpPr/>
+        <p:nvPr/>
+      </p:nvGrpSpPr>
+      <p:grpSpPr>
+        <a:xfrm>
+          <a:off x="0" y="0"/>
+          <a:ext cx="0" cy="0"/>
+          <a:chOff x="0" y="0"/>
+          <a:chExt cx="0" cy="0"/>
+        </a:xfrm>
+      </p:grpSpPr>
+      <p:pic>
+        <p:nvPicPr>
+          <p:cNvPr id="1026" name="Picture 2">
+            <a:extLst>
+              <a:ext uri="{FF2B5EF4-FFF2-40B4-BE49-F238E27FC236}">
+                <a16:creationId xmlns:a16="http://schemas.microsoft.com/office/drawing/2014/main" id="{24F5CD99-1F9C-56F6-DF37-CAB42675922F}"/>
+              </a:ext>
+            </a:extLst>
+          </p:cNvPr>
+          <p:cNvPicPr>
+            <a:picLocks noChangeAspect="1" noChangeArrowheads="1"/>
+          </p:cNvPicPr>
+          <p:nvPr/>
+        </p:nvPicPr>
+        <p:blipFill rotWithShape="1">
+          <a:blip r:embed="rId2">
+            <a:extLst>
+              <a:ext uri="{28A0092B-C50C-407E-A947-70E740481C1C}">
+                <a14:useLocalDpi xmlns:a14="http://schemas.microsoft.com/office/drawing/2010/main" val="0"/>
+              </a:ext>
+            </a:extLst>
+          </a:blip>
+          <a:srcRect l="32219" t="15556" b="43391"/>
+          <a:stretch/>
+        </p:blipFill>
+        <p:spPr bwMode="auto">
+          <a:xfrm>
+            <a:off x="4708358" y="418679"/>
+            <a:ext cx="6368715" cy="5452731"/>
+          </a:xfrm>
+          <a:prstGeom prst="rect">
+            <a:avLst/>
+          </a:prstGeom>
+          <a:noFill/>
+          <a:extLst>
+            <a:ext uri="{909E8E84-426E-40DD-AFC4-6F175D3DCCD1}">
+              <a14:hiddenFill xmlns:a14="http://schemas.microsoft.com/office/drawing/2010/main">
+                <a:solidFill>
+                  <a:srgbClr val="FFFFFF"/>
+                </a:solidFill>
+              </a14:hiddenFill>
+            </a:ext>
+          </a:extLst>
+        </p:spPr>
+      </p:pic>
+      <mc:AlternateContent xmlns:mc="http://schemas.openxmlformats.org/markup-compatibility/2006">
+        <mc:Choice xmlns:p14="http://schemas.microsoft.com/office/powerpoint/2010/main" Requires="p14">
+          <p:contentPart p14:bwMode="auto" r:id="rId3">
+            <p14:nvContentPartPr>
+              <p14:cNvPr id="6" name="Ink 5">
+                <a:extLst>
+                  <a:ext uri="{FF2B5EF4-FFF2-40B4-BE49-F238E27FC236}">
+                    <a16:creationId xmlns:a16="http://schemas.microsoft.com/office/drawing/2014/main" id="{990F6CFE-404D-200A-E556-47C7AD25275C}"/>
+                  </a:ext>
+                </a:extLst>
+              </p14:cNvPr>
+              <p14:cNvContentPartPr/>
+              <p14:nvPr/>
+            </p14:nvContentPartPr>
+            <p14:xfrm>
+              <a:off x="5368573" y="476116"/>
+              <a:ext cx="151560" cy="126000"/>
+            </p14:xfrm>
+          </p:contentPart>
+        </mc:Choice>
+        <mc:Fallback>
+          <p:pic>
+            <p:nvPicPr>
+              <p:cNvPr id="6" name="Ink 5">
+                <a:extLst>
+                  <a:ext uri="{FF2B5EF4-FFF2-40B4-BE49-F238E27FC236}">
+                    <a16:creationId xmlns:a16="http://schemas.microsoft.com/office/drawing/2014/main" id="{990F6CFE-404D-200A-E556-47C7AD25275C}"/>
+                  </a:ext>
+                </a:extLst>
+              </p:cNvPr>
+              <p:cNvPicPr/>
+              <p:nvPr/>
+            </p:nvPicPr>
+            <p:blipFill>
+              <a:blip r:embed="rId4"/>
+              <a:stretch>
+                <a:fillRect/>
+              </a:stretch>
+            </p:blipFill>
+            <p:spPr>
+              <a:xfrm>
+                <a:off x="5362453" y="469996"/>
+                <a:ext cx="163800" cy="138240"/>
+              </a:xfrm>
+              <a:prstGeom prst="rect">
+                <a:avLst/>
+              </a:prstGeom>
+            </p:spPr>
+          </p:pic>
+        </mc:Fallback>
+      </mc:AlternateContent>
+    </p:spTree>
+    <p:extLst>
+      <p:ext uri="{BB962C8B-B14F-4D97-AF65-F5344CB8AC3E}">
+        <p14:creationId xmlns:p14="http://schemas.microsoft.com/office/powerpoint/2010/main" val="3428444032"/>
+      </p:ext>
+    </p:extLst>
+  </p:cSld>
+  <p:clrMapOvr>
+    <a:masterClrMapping/>
+  </p:clrMapOvr>
+</p:sld>
+</file>
+
+<file path=ppt/slides/slide5.xml><?xml version="1.0" encoding="utf-8"?>
+<p:sld xmlns:a="http://schemas.openxmlformats.org/drawingml/2006/main" xmlns:r="http://schemas.openxmlformats.org/officeDocument/2006/relationships" xmlns:p="http://schemas.openxmlformats.org/presentationml/2006/main">
+  <p:cSld>
+    <p:spTree>
+      <p:nvGrpSpPr>
+        <p:cNvPr id="1" name=""/>
+        <p:cNvGrpSpPr/>
+        <p:nvPr/>
+      </p:nvGrpSpPr>
+      <p:grpSpPr>
+        <a:xfrm>
+          <a:off x="0" y="0"/>
+          <a:ext cx="0" cy="0"/>
+          <a:chOff x="0" y="0"/>
+          <a:chExt cx="0" cy="0"/>
+        </a:xfrm>
+      </p:grpSpPr>
+      <p:pic>
+        <p:nvPicPr>
+          <p:cNvPr id="2050" name="Picture 2">
+            <a:extLst>
+              <a:ext uri="{FF2B5EF4-FFF2-40B4-BE49-F238E27FC236}">
+                <a16:creationId xmlns:a16="http://schemas.microsoft.com/office/drawing/2014/main" id="{5AB2FDE3-41B7-7DC9-84D3-289BDFA99CBF}"/>
+              </a:ext>
+            </a:extLst>
+          </p:cNvPr>
+          <p:cNvPicPr>
+            <a:picLocks noChangeAspect="1" noChangeArrowheads="1"/>
+          </p:cNvPicPr>
+          <p:nvPr/>
+        </p:nvPicPr>
+        <p:blipFill rotWithShape="1">
+          <a:blip r:embed="rId2">
+            <a:extLst>
+              <a:ext uri="{28A0092B-C50C-407E-A947-70E740481C1C}">
+                <a14:useLocalDpi xmlns:a14="http://schemas.microsoft.com/office/drawing/2010/main" val="0"/>
+              </a:ext>
+            </a:extLst>
+          </a:blip>
+          <a:srcRect l="46161" t="14380" b="16402"/>
+          <a:stretch/>
+        </p:blipFill>
+        <p:spPr bwMode="auto">
+          <a:xfrm>
+            <a:off x="3753852" y="625643"/>
+            <a:ext cx="5829626" cy="5342020"/>
+          </a:xfrm>
+          <a:prstGeom prst="rect">
+            <a:avLst/>
+          </a:prstGeom>
+          <a:noFill/>
+          <a:extLst>
+            <a:ext uri="{909E8E84-426E-40DD-AFC4-6F175D3DCCD1}">
+              <a14:hiddenFill xmlns:a14="http://schemas.microsoft.com/office/drawing/2010/main">
+                <a:solidFill>
+                  <a:srgbClr val="FFFFFF"/>
+                </a:solidFill>
+              </a14:hiddenFill>
+            </a:ext>
+          </a:extLst>
+        </p:spPr>
+      </p:pic>
+      <mc:AlternateContent xmlns:mc="http://schemas.openxmlformats.org/markup-compatibility/2006">
+        <mc:Choice xmlns:p14="http://schemas.microsoft.com/office/powerpoint/2010/main" Requires="p14">
+          <p:contentPart p14:bwMode="auto" r:id="rId3">
+            <p14:nvContentPartPr>
+              <p14:cNvPr id="5" name="Ink 4">
+                <a:extLst>
+                  <a:ext uri="{FF2B5EF4-FFF2-40B4-BE49-F238E27FC236}">
+                    <a16:creationId xmlns:a16="http://schemas.microsoft.com/office/drawing/2014/main" id="{27E076CF-F683-E813-32F8-29AA8E94EE84}"/>
+                  </a:ext>
+                </a:extLst>
+              </p14:cNvPr>
+              <p14:cNvContentPartPr/>
+              <p14:nvPr/>
+            </p14:nvContentPartPr>
+            <p14:xfrm>
+              <a:off x="3817693" y="964276"/>
+              <a:ext cx="157320" cy="173520"/>
+            </p14:xfrm>
+          </p:contentPart>
+        </mc:Choice>
+        <mc:Fallback>
+          <p:pic>
+            <p:nvPicPr>
+              <p:cNvPr id="5" name="Ink 4">
+                <a:extLst>
+                  <a:ext uri="{FF2B5EF4-FFF2-40B4-BE49-F238E27FC236}">
+                    <a16:creationId xmlns:a16="http://schemas.microsoft.com/office/drawing/2014/main" id="{27E076CF-F683-E813-32F8-29AA8E94EE84}"/>
+                  </a:ext>
+                </a:extLst>
+              </p:cNvPr>
+              <p:cNvPicPr/>
+              <p:nvPr/>
+            </p:nvPicPr>
+            <p:blipFill>
+              <a:blip r:embed="rId4"/>
+              <a:stretch>
+                <a:fillRect/>
+              </a:stretch>
+            </p:blipFill>
+            <p:spPr>
+              <a:xfrm>
+                <a:off x="3811573" y="958156"/>
+                <a:ext cx="169560" cy="185760"/>
+              </a:xfrm>
+              <a:prstGeom prst="rect">
+                <a:avLst/>
+              </a:prstGeom>
+            </p:spPr>
+          </p:pic>
+        </mc:Fallback>
+      </mc:AlternateContent>
+    </p:spTree>
+    <p:extLst>
+      <p:ext uri="{BB962C8B-B14F-4D97-AF65-F5344CB8AC3E}">
+        <p14:creationId xmlns:p14="http://schemas.microsoft.com/office/powerpoint/2010/main" val="2425029618"/>
+      </p:ext>
+    </p:extLst>
+  </p:cSld>
+  <p:clrMapOvr>
+    <a:masterClrMapping/>
+  </p:clrMapOvr>
+</p:sld>
+</file>
+
+<file path=ppt/slides/slide6.xml><?xml version="1.0" encoding="utf-8"?>
+<p:sld xmlns:a="http://schemas.openxmlformats.org/drawingml/2006/main" xmlns:r="http://schemas.openxmlformats.org/officeDocument/2006/relationships" xmlns:p="http://schemas.openxmlformats.org/presentationml/2006/main">
+  <p:cSld>
+    <p:spTree>
+      <p:nvGrpSpPr>
+        <p:cNvPr id="1" name=""/>
+        <p:cNvGrpSpPr/>
+        <p:nvPr/>
+      </p:nvGrpSpPr>
+      <p:grpSpPr>
+        <a:xfrm>
+          <a:off x="0" y="0"/>
+          <a:ext cx="0" cy="0"/>
+          <a:chOff x="0" y="0"/>
+          <a:chExt cx="0" cy="0"/>
+        </a:xfrm>
+      </p:grpSpPr>
+      <p:pic>
+        <p:nvPicPr>
+          <p:cNvPr id="6146" name="Picture 2">
+            <a:extLst>
+              <a:ext uri="{FF2B5EF4-FFF2-40B4-BE49-F238E27FC236}">
+                <a16:creationId xmlns:a16="http://schemas.microsoft.com/office/drawing/2014/main" id="{EAAF3EA3-6235-F8AA-0976-94A88072A937}"/>
+              </a:ext>
+            </a:extLst>
+          </p:cNvPr>
+          <p:cNvPicPr>
+            <a:picLocks noChangeAspect="1" noChangeArrowheads="1"/>
+          </p:cNvPicPr>
+          <p:nvPr/>
+        </p:nvPicPr>
+        <p:blipFill rotWithShape="1">
+          <a:blip r:embed="rId2">
+            <a:extLst>
+              <a:ext uri="{28A0092B-C50C-407E-A947-70E740481C1C}">
+                <a14:useLocalDpi xmlns:a14="http://schemas.microsoft.com/office/drawing/2010/main" val="0"/>
+              </a:ext>
+            </a:extLst>
+          </a:blip>
+          <a:srcRect t="7018" r="73026" b="44912"/>
+          <a:stretch/>
+        </p:blipFill>
+        <p:spPr bwMode="auto">
+          <a:xfrm>
+            <a:off x="3554747" y="248651"/>
+            <a:ext cx="5099969" cy="6413530"/>
+          </a:xfrm>
+          <a:prstGeom prst="rect">
+            <a:avLst/>
+          </a:prstGeom>
+          <a:noFill/>
+          <a:extLst>
+            <a:ext uri="{909E8E84-426E-40DD-AFC4-6F175D3DCCD1}">
+              <a14:hiddenFill xmlns:a14="http://schemas.microsoft.com/office/drawing/2010/main">
+                <a:solidFill>
+                  <a:srgbClr val="FFFFFF"/>
+                </a:solidFill>
+              </a14:hiddenFill>
+            </a:ext>
+          </a:extLst>
+        </p:spPr>
+      </p:pic>
+      <mc:AlternateContent xmlns:mc="http://schemas.openxmlformats.org/markup-compatibility/2006">
+        <mc:Choice xmlns:p14="http://schemas.microsoft.com/office/powerpoint/2010/main" Requires="p14">
+          <p:contentPart p14:bwMode="auto" r:id="rId3">
+            <p14:nvContentPartPr>
+              <p14:cNvPr id="4" name="Ink 3">
+                <a:extLst>
+                  <a:ext uri="{FF2B5EF4-FFF2-40B4-BE49-F238E27FC236}">
+                    <a16:creationId xmlns:a16="http://schemas.microsoft.com/office/drawing/2014/main" id="{9B1332C8-D63F-2B41-AB4F-79FBC4DBAD6B}"/>
+                  </a:ext>
+                </a:extLst>
+              </p14:cNvPr>
+              <p14:cNvContentPartPr/>
+              <p14:nvPr/>
+            </p14:nvContentPartPr>
+            <p14:xfrm>
+              <a:off x="3968893" y="452356"/>
+              <a:ext cx="203400" cy="205560"/>
+            </p14:xfrm>
+          </p:contentPart>
+        </mc:Choice>
+        <mc:Fallback>
+          <p:pic>
+            <p:nvPicPr>
+              <p:cNvPr id="4" name="Ink 3">
+                <a:extLst>
+                  <a:ext uri="{FF2B5EF4-FFF2-40B4-BE49-F238E27FC236}">
+                    <a16:creationId xmlns:a16="http://schemas.microsoft.com/office/drawing/2014/main" id="{9B1332C8-D63F-2B41-AB4F-79FBC4DBAD6B}"/>
+                  </a:ext>
+                </a:extLst>
+              </p:cNvPr>
+              <p:cNvPicPr/>
+              <p:nvPr/>
+            </p:nvPicPr>
+            <p:blipFill>
+              <a:blip r:embed="rId4"/>
+              <a:stretch>
+                <a:fillRect/>
+              </a:stretch>
+            </p:blipFill>
+            <p:spPr>
+              <a:xfrm>
+                <a:off x="3962773" y="446236"/>
+                <a:ext cx="215640" cy="217800"/>
+              </a:xfrm>
+              <a:prstGeom prst="rect">
+                <a:avLst/>
+              </a:prstGeom>
+            </p:spPr>
+          </p:pic>
+        </mc:Fallback>
+      </mc:AlternateContent>
+    </p:spTree>
+    <p:extLst>
+      <p:ext uri="{BB962C8B-B14F-4D97-AF65-F5344CB8AC3E}">
+        <p14:creationId xmlns:p14="http://schemas.microsoft.com/office/powerpoint/2010/main" val="2571967501"/>
+      </p:ext>
+    </p:extLst>
+  </p:cSld>
+  <p:clrMapOvr>
+    <a:masterClrMapping/>
+  </p:clrMapOvr>
+</p:sld>
+</file>
+
+<file path=ppt/slides/slide7.xml><?xml version="1.0" encoding="utf-8"?>
+<p:sld xmlns:a="http://schemas.openxmlformats.org/drawingml/2006/main" xmlns:r="http://schemas.openxmlformats.org/officeDocument/2006/relationships" xmlns:p="http://schemas.openxmlformats.org/presentationml/2006/main">
+  <p:cSld>
+    <p:spTree>
+      <p:nvGrpSpPr>
+        <p:cNvPr id="1" name=""/>
+        <p:cNvGrpSpPr/>
+        <p:nvPr/>
+      </p:nvGrpSpPr>
+      <p:grpSpPr>
+        <a:xfrm>
+          <a:off x="0" y="0"/>
+          <a:ext cx="0" cy="0"/>
+          <a:chOff x="0" y="0"/>
+          <a:chExt cx="0" cy="0"/>
+        </a:xfrm>
+      </p:grpSpPr>
+      <p:sp>
+        <p:nvSpPr>
+          <p:cNvPr id="4" name="TextBox 3">
+            <a:extLst>
+              <a:ext uri="{FF2B5EF4-FFF2-40B4-BE49-F238E27FC236}">
+                <a16:creationId xmlns:a16="http://schemas.microsoft.com/office/drawing/2014/main" id="{A9E487A0-C3B0-4AB7-4E57-57DAA74D7331}"/>
+              </a:ext>
+            </a:extLst>
+          </p:cNvPr>
+          <p:cNvSpPr txBox="1"/>
+          <p:nvPr/>
+        </p:nvSpPr>
+        <p:spPr>
+          <a:xfrm>
+            <a:off x="380122" y="2849055"/>
+            <a:ext cx="4950073" cy="369332"/>
+          </a:xfrm>
+          <a:prstGeom prst="rect">
+            <a:avLst/>
+          </a:prstGeom>
+          <a:noFill/>
+        </p:spPr>
+        <p:txBody>
+          <a:bodyPr wrap="none" rtlCol="0">
+            <a:spAutoFit/>
+          </a:bodyPr>
+          <a:lstStyle/>
+          <a:p>
+            <a:r>
+              <a:rPr lang="en-US" dirty="0"/>
+              <a:t>2. Total number of features for different datasets</a:t>
+            </a:r>
+          </a:p>
+        </p:txBody>
+      </p:sp>
+      <p:pic>
+        <p:nvPicPr>
+          <p:cNvPr id="6" name="Picture 5" descr="A table with numbers and text&#10;&#10;Description automatically generated">
+            <a:extLst>
+              <a:ext uri="{FF2B5EF4-FFF2-40B4-BE49-F238E27FC236}">
+                <a16:creationId xmlns:a16="http://schemas.microsoft.com/office/drawing/2014/main" id="{6B08F9F5-B2EB-6E96-32C7-19080A399E5C}"/>
+              </a:ext>
+            </a:extLst>
+          </p:cNvPr>
+          <p:cNvPicPr>
+            <a:picLocks noChangeAspect="1"/>
+          </p:cNvPicPr>
+          <p:nvPr/>
+        </p:nvPicPr>
+        <p:blipFill>
+          <a:blip r:embed="rId2"/>
+          <a:stretch>
+            <a:fillRect/>
+          </a:stretch>
+        </p:blipFill>
+        <p:spPr>
+          <a:xfrm>
+            <a:off x="588583" y="3207857"/>
+            <a:ext cx="2740660" cy="1580503"/>
+          </a:xfrm>
+          <a:prstGeom prst="rect">
+            <a:avLst/>
+          </a:prstGeom>
+        </p:spPr>
+      </p:pic>
+      <p:grpSp>
+        <p:nvGrpSpPr>
+          <p:cNvPr id="9" name="Group 8">
+            <a:extLst>
+              <a:ext uri="{FF2B5EF4-FFF2-40B4-BE49-F238E27FC236}">
+                <a16:creationId xmlns:a16="http://schemas.microsoft.com/office/drawing/2014/main" id="{0BE16057-957C-E642-5A70-FC215B9044C3}"/>
+              </a:ext>
+            </a:extLst>
+          </p:cNvPr>
+          <p:cNvGrpSpPr/>
+          <p:nvPr/>
+        </p:nvGrpSpPr>
+        <p:grpSpPr>
+          <a:xfrm>
+            <a:off x="2609064" y="3396960"/>
+            <a:ext cx="358920" cy="1391400"/>
+            <a:chOff x="2609064" y="3396960"/>
+            <a:chExt cx="358920" cy="1391400"/>
+          </a:xfrm>
+        </p:grpSpPr>
+        <mc:AlternateContent xmlns:mc="http://schemas.openxmlformats.org/markup-compatibility/2006">
+          <mc:Choice xmlns:p14="http://schemas.microsoft.com/office/powerpoint/2010/main" Requires="p14">
+            <p:contentPart p14:bwMode="auto" r:id="rId3">
+              <p14:nvContentPartPr>
+                <p14:cNvPr id="7" name="Ink 6">
+                  <a:extLst>
+                    <a:ext uri="{FF2B5EF4-FFF2-40B4-BE49-F238E27FC236}">
+                      <a16:creationId xmlns:a16="http://schemas.microsoft.com/office/drawing/2014/main" id="{2D6E33D5-3A4F-DF35-CFF2-39A87931B967}"/>
+                    </a:ext>
+                  </a:extLst>
+                </p14:cNvPr>
+                <p14:cNvContentPartPr/>
+                <p14:nvPr/>
+              </p14:nvContentPartPr>
+              <p14:xfrm>
+                <a:off x="2703744" y="3396960"/>
+                <a:ext cx="264240" cy="192960"/>
+              </p14:xfrm>
+            </p:contentPart>
+          </mc:Choice>
+          <mc:Fallback>
+            <p:pic>
+              <p:nvPicPr>
+                <p:cNvPr id="7" name="Ink 6">
+                  <a:extLst>
+                    <a:ext uri="{FF2B5EF4-FFF2-40B4-BE49-F238E27FC236}">
+                      <a16:creationId xmlns:a16="http://schemas.microsoft.com/office/drawing/2014/main" id="{2D6E33D5-3A4F-DF35-CFF2-39A87931B967}"/>
+                    </a:ext>
+                  </a:extLst>
+                </p:cNvPr>
+                <p:cNvPicPr/>
+                <p:nvPr/>
+              </p:nvPicPr>
+              <p:blipFill>
+                <a:blip r:embed="rId4"/>
+                <a:stretch>
+                  <a:fillRect/>
+                </a:stretch>
+              </p:blipFill>
+              <p:spPr>
+                <a:xfrm>
+                  <a:off x="2697624" y="3390840"/>
+                  <a:ext cx="276480" cy="205200"/>
+                </a:xfrm>
+                <a:prstGeom prst="rect">
+                  <a:avLst/>
+                </a:prstGeom>
+              </p:spPr>
+            </p:pic>
+          </mc:Fallback>
+        </mc:AlternateContent>
+        <mc:AlternateContent xmlns:mc="http://schemas.openxmlformats.org/markup-compatibility/2006">
+          <mc:Choice xmlns:p14="http://schemas.microsoft.com/office/powerpoint/2010/main" Requires="p14">
+            <p:contentPart p14:bwMode="auto" r:id="rId5">
+              <p14:nvContentPartPr>
+                <p14:cNvPr id="8" name="Ink 7">
+                  <a:extLst>
+                    <a:ext uri="{FF2B5EF4-FFF2-40B4-BE49-F238E27FC236}">
+                      <a16:creationId xmlns:a16="http://schemas.microsoft.com/office/drawing/2014/main" id="{EE921B20-CFBD-E0D7-C427-AAB54CDB9197}"/>
+                    </a:ext>
+                  </a:extLst>
+                </p14:cNvPr>
+                <p14:cNvContentPartPr/>
+                <p14:nvPr/>
+              </p14:nvContentPartPr>
+              <p14:xfrm>
+                <a:off x="2609064" y="3453480"/>
+                <a:ext cx="344880" cy="1334880"/>
+              </p14:xfrm>
+            </p:contentPart>
+          </mc:Choice>
+          <mc:Fallback>
+            <p:pic>
+              <p:nvPicPr>
+                <p:cNvPr id="8" name="Ink 7">
+                  <a:extLst>
+                    <a:ext uri="{FF2B5EF4-FFF2-40B4-BE49-F238E27FC236}">
+                      <a16:creationId xmlns:a16="http://schemas.microsoft.com/office/drawing/2014/main" id="{EE921B20-CFBD-E0D7-C427-AAB54CDB9197}"/>
+                    </a:ext>
+                  </a:extLst>
+                </p:cNvPr>
+                <p:cNvPicPr/>
+                <p:nvPr/>
+              </p:nvPicPr>
+              <p:blipFill>
+                <a:blip r:embed="rId6"/>
+                <a:stretch>
+                  <a:fillRect/>
+                </a:stretch>
+              </p:blipFill>
+              <p:spPr>
+                <a:xfrm>
+                  <a:off x="2602944" y="3447360"/>
+                  <a:ext cx="357120" cy="1347120"/>
+                </a:xfrm>
+                <a:prstGeom prst="rect">
+                  <a:avLst/>
+                </a:prstGeom>
+              </p:spPr>
+            </p:pic>
+          </mc:Fallback>
+        </mc:AlternateContent>
+      </p:grpSp>
+      <p:grpSp>
+        <p:nvGrpSpPr>
+          <p:cNvPr id="12" name="Group 11">
+            <a:extLst>
+              <a:ext uri="{FF2B5EF4-FFF2-40B4-BE49-F238E27FC236}">
+                <a16:creationId xmlns:a16="http://schemas.microsoft.com/office/drawing/2014/main" id="{1936612B-C623-5CD2-E447-F18A5A1703D6}"/>
+              </a:ext>
+            </a:extLst>
+          </p:cNvPr>
+          <p:cNvGrpSpPr/>
+          <p:nvPr/>
+        </p:nvGrpSpPr>
+        <p:grpSpPr>
+          <a:xfrm>
+            <a:off x="1813464" y="1455480"/>
+            <a:ext cx="1213560" cy="1224720"/>
+            <a:chOff x="1813464" y="1455480"/>
+            <a:chExt cx="1213560" cy="1224720"/>
+          </a:xfrm>
+        </p:grpSpPr>
+        <mc:AlternateContent xmlns:mc="http://schemas.openxmlformats.org/markup-compatibility/2006">
+          <mc:Choice xmlns:p14="http://schemas.microsoft.com/office/powerpoint/2010/main" Requires="p14">
+            <p:contentPart p14:bwMode="auto" r:id="rId7">
+              <p14:nvContentPartPr>
+                <p14:cNvPr id="10" name="Ink 9">
+                  <a:extLst>
+                    <a:ext uri="{FF2B5EF4-FFF2-40B4-BE49-F238E27FC236}">
+                      <a16:creationId xmlns:a16="http://schemas.microsoft.com/office/drawing/2014/main" id="{D42D6E52-530B-F782-5D60-924D1CE1E1D8}"/>
+                    </a:ext>
+                  </a:extLst>
+                </p14:cNvPr>
+                <p14:cNvContentPartPr/>
+                <p14:nvPr/>
+              </p14:nvContentPartPr>
+              <p14:xfrm>
+                <a:off x="1813464" y="1488960"/>
+                <a:ext cx="1158840" cy="1191240"/>
+              </p14:xfrm>
+            </p:contentPart>
+          </mc:Choice>
+          <mc:Fallback>
+            <p:pic>
+              <p:nvPicPr>
+                <p:cNvPr id="10" name="Ink 9">
+                  <a:extLst>
+                    <a:ext uri="{FF2B5EF4-FFF2-40B4-BE49-F238E27FC236}">
+                      <a16:creationId xmlns:a16="http://schemas.microsoft.com/office/drawing/2014/main" id="{D42D6E52-530B-F782-5D60-924D1CE1E1D8}"/>
+                    </a:ext>
+                  </a:extLst>
+                </p:cNvPr>
+                <p:cNvPicPr/>
+                <p:nvPr/>
+              </p:nvPicPr>
+              <p:blipFill>
+                <a:blip r:embed="rId8"/>
+                <a:stretch>
+                  <a:fillRect/>
+                </a:stretch>
+              </p:blipFill>
+              <p:spPr>
+                <a:xfrm>
+                  <a:off x="1807344" y="1482840"/>
+                  <a:ext cx="1171080" cy="1203480"/>
+                </a:xfrm>
+                <a:prstGeom prst="rect">
+                  <a:avLst/>
+                </a:prstGeom>
+              </p:spPr>
+            </p:pic>
+          </mc:Fallback>
+        </mc:AlternateContent>
+        <mc:AlternateContent xmlns:mc="http://schemas.openxmlformats.org/markup-compatibility/2006">
+          <mc:Choice xmlns:p14="http://schemas.microsoft.com/office/powerpoint/2010/main" Requires="p14">
+            <p:contentPart p14:bwMode="auto" r:id="rId9">
+              <p14:nvContentPartPr>
+                <p14:cNvPr id="11" name="Ink 10">
+                  <a:extLst>
+                    <a:ext uri="{FF2B5EF4-FFF2-40B4-BE49-F238E27FC236}">
+                      <a16:creationId xmlns:a16="http://schemas.microsoft.com/office/drawing/2014/main" id="{7ABF51AE-C990-159A-D65C-5BA3A77EF6F3}"/>
+                    </a:ext>
+                  </a:extLst>
+                </p14:cNvPr>
+                <p14:cNvContentPartPr/>
+                <p14:nvPr/>
+              </p14:nvContentPartPr>
+              <p14:xfrm>
+                <a:off x="2799864" y="1455480"/>
+                <a:ext cx="227160" cy="267480"/>
+              </p14:xfrm>
+            </p:contentPart>
+          </mc:Choice>
+          <mc:Fallback>
+            <p:pic>
+              <p:nvPicPr>
+                <p:cNvPr id="11" name="Ink 10">
+                  <a:extLst>
+                    <a:ext uri="{FF2B5EF4-FFF2-40B4-BE49-F238E27FC236}">
+                      <a16:creationId xmlns:a16="http://schemas.microsoft.com/office/drawing/2014/main" id="{7ABF51AE-C990-159A-D65C-5BA3A77EF6F3}"/>
+                    </a:ext>
+                  </a:extLst>
+                </p:cNvPr>
+                <p:cNvPicPr/>
+                <p:nvPr/>
+              </p:nvPicPr>
+              <p:blipFill>
+                <a:blip r:embed="rId10"/>
+                <a:stretch>
+                  <a:fillRect/>
+                </a:stretch>
+              </p:blipFill>
+              <p:spPr>
+                <a:xfrm>
+                  <a:off x="2793744" y="1449368"/>
+                  <a:ext cx="239400" cy="279704"/>
+                </a:xfrm>
+                <a:prstGeom prst="rect">
+                  <a:avLst/>
+                </a:prstGeom>
+              </p:spPr>
+            </p:pic>
+          </mc:Fallback>
+        </mc:AlternateContent>
+      </p:grpSp>
+      <p:sp>
+        <p:nvSpPr>
+          <p:cNvPr id="13" name="TextBox 12">
+            <a:extLst>
+              <a:ext uri="{FF2B5EF4-FFF2-40B4-BE49-F238E27FC236}">
+                <a16:creationId xmlns:a16="http://schemas.microsoft.com/office/drawing/2014/main" id="{03804AD5-C4D3-9C81-5A8D-9A546E03104E}"/>
+              </a:ext>
+            </a:extLst>
+          </p:cNvPr>
+          <p:cNvSpPr txBox="1"/>
+          <p:nvPr/>
+        </p:nvSpPr>
+        <p:spPr>
+          <a:xfrm>
+            <a:off x="975564" y="1729968"/>
+            <a:ext cx="1417320" cy="276999"/>
+          </a:xfrm>
+          <a:prstGeom prst="rect">
+            <a:avLst/>
+          </a:prstGeom>
+          <a:noFill/>
+        </p:spPr>
+        <p:txBody>
+          <a:bodyPr wrap="square" rtlCol="0">
+            <a:spAutoFit/>
+          </a:bodyPr>
+          <a:lstStyle/>
+          <a:p>
+            <a:r>
+              <a:rPr lang="en-US" sz="1200" dirty="0"/>
+              <a:t>Feature filtering</a:t>
+            </a:r>
+          </a:p>
+        </p:txBody>
+      </p:sp>
+      <p:sp>
+        <p:nvSpPr>
+          <p:cNvPr id="14" name="TextBox 13">
+            <a:extLst>
+              <a:ext uri="{FF2B5EF4-FFF2-40B4-BE49-F238E27FC236}">
+                <a16:creationId xmlns:a16="http://schemas.microsoft.com/office/drawing/2014/main" id="{5DDC6BC4-438F-9312-975A-CFB25452A6DB}"/>
+              </a:ext>
+            </a:extLst>
+          </p:cNvPr>
+          <p:cNvSpPr txBox="1"/>
+          <p:nvPr/>
+        </p:nvSpPr>
+        <p:spPr>
+          <a:xfrm>
+            <a:off x="3027024" y="991814"/>
+            <a:ext cx="2778196" cy="369332"/>
+          </a:xfrm>
+          <a:prstGeom prst="rect">
+            <a:avLst/>
+          </a:prstGeom>
+          <a:noFill/>
+        </p:spPr>
+        <p:txBody>
+          <a:bodyPr wrap="none" rtlCol="0">
+            <a:spAutoFit/>
+          </a:bodyPr>
+          <a:lstStyle/>
+          <a:p>
+            <a:r>
+              <a:rPr lang="en-US" dirty="0"/>
+              <a:t>3. Reduced set of features</a:t>
+            </a:r>
+          </a:p>
+        </p:txBody>
+      </p:sp>
+      <p:pic>
+        <p:nvPicPr>
+          <p:cNvPr id="15" name="Picture 14" descr="A table with numbers and text&#10;&#10;Description automatically generated">
+            <a:extLst>
+              <a:ext uri="{FF2B5EF4-FFF2-40B4-BE49-F238E27FC236}">
+                <a16:creationId xmlns:a16="http://schemas.microsoft.com/office/drawing/2014/main" id="{CEB9603C-9362-FE39-496D-F1716C16A47A}"/>
+              </a:ext>
+            </a:extLst>
+          </p:cNvPr>
+          <p:cNvPicPr>
+            <a:picLocks noChangeAspect="1"/>
+          </p:cNvPicPr>
+          <p:nvPr/>
+        </p:nvPicPr>
+        <p:blipFill>
+          <a:blip r:embed="rId2"/>
+          <a:stretch>
+            <a:fillRect/>
+          </a:stretch>
+        </p:blipFill>
+        <p:spPr>
+          <a:xfrm>
+            <a:off x="4317408" y="1379360"/>
+            <a:ext cx="2740660" cy="1580503"/>
+          </a:xfrm>
+          <a:prstGeom prst="rect">
+            <a:avLst/>
+          </a:prstGeom>
+        </p:spPr>
+      </p:pic>
+      <mc:AlternateContent xmlns:mc="http://schemas.openxmlformats.org/markup-compatibility/2006">
+        <mc:Choice xmlns:p14="http://schemas.microsoft.com/office/powerpoint/2010/main" Requires="p14">
+          <p:contentPart p14:bwMode="auto" r:id="rId11">
+            <p14:nvContentPartPr>
+              <p14:cNvPr id="16" name="Ink 15">
+                <a:extLst>
+                  <a:ext uri="{FF2B5EF4-FFF2-40B4-BE49-F238E27FC236}">
+                    <a16:creationId xmlns:a16="http://schemas.microsoft.com/office/drawing/2014/main" id="{1F1ABCA3-9AE5-9614-B5C6-C7179ACCC3B4}"/>
+                  </a:ext>
+                </a:extLst>
+              </p14:cNvPr>
+              <p14:cNvContentPartPr/>
+              <p14:nvPr/>
+            </p14:nvContentPartPr>
+            <p14:xfrm>
+              <a:off x="5354064" y="1520640"/>
+              <a:ext cx="510480" cy="1276200"/>
+            </p14:xfrm>
+          </p:contentPart>
+        </mc:Choice>
+        <mc:Fallback>
+          <p:pic>
+            <p:nvPicPr>
+              <p:cNvPr id="16" name="Ink 15">
+                <a:extLst>
+                  <a:ext uri="{FF2B5EF4-FFF2-40B4-BE49-F238E27FC236}">
+                    <a16:creationId xmlns:a16="http://schemas.microsoft.com/office/drawing/2014/main" id="{1F1ABCA3-9AE5-9614-B5C6-C7179ACCC3B4}"/>
+                  </a:ext>
+                </a:extLst>
+              </p:cNvPr>
+              <p:cNvPicPr/>
+              <p:nvPr/>
+            </p:nvPicPr>
+            <p:blipFill>
+              <a:blip r:embed="rId12"/>
+              <a:stretch>
+                <a:fillRect/>
+              </a:stretch>
+            </p:blipFill>
+            <p:spPr>
+              <a:xfrm>
+                <a:off x="5347944" y="1514520"/>
+                <a:ext cx="522720" cy="1288440"/>
+              </a:xfrm>
+              <a:prstGeom prst="rect">
+                <a:avLst/>
+              </a:prstGeom>
+            </p:spPr>
+          </p:pic>
+        </mc:Fallback>
+      </mc:AlternateContent>
+      <p:grpSp>
+        <p:nvGrpSpPr>
+          <p:cNvPr id="19" name="Group 18">
+            <a:extLst>
+              <a:ext uri="{FF2B5EF4-FFF2-40B4-BE49-F238E27FC236}">
+                <a16:creationId xmlns:a16="http://schemas.microsoft.com/office/drawing/2014/main" id="{C100FD2C-1D55-E4A9-9701-793C421B381E}"/>
+              </a:ext>
+            </a:extLst>
+          </p:cNvPr>
+          <p:cNvGrpSpPr/>
+          <p:nvPr/>
+        </p:nvGrpSpPr>
+        <p:grpSpPr>
+          <a:xfrm>
+            <a:off x="5738184" y="896040"/>
+            <a:ext cx="2452680" cy="306720"/>
+            <a:chOff x="5738184" y="896040"/>
+            <a:chExt cx="2452680" cy="306720"/>
+          </a:xfrm>
+        </p:grpSpPr>
+        <mc:AlternateContent xmlns:mc="http://schemas.openxmlformats.org/markup-compatibility/2006">
+          <mc:Choice xmlns:p14="http://schemas.microsoft.com/office/powerpoint/2010/main" Requires="p14">
+            <p:contentPart p14:bwMode="auto" r:id="rId13">
+              <p14:nvContentPartPr>
+                <p14:cNvPr id="17" name="Ink 16">
+                  <a:extLst>
+                    <a:ext uri="{FF2B5EF4-FFF2-40B4-BE49-F238E27FC236}">
+                      <a16:creationId xmlns:a16="http://schemas.microsoft.com/office/drawing/2014/main" id="{3BD9EB2C-15AF-01F0-880E-C121A888C676}"/>
+                    </a:ext>
+                  </a:extLst>
+                </p14:cNvPr>
+                <p14:cNvContentPartPr/>
+                <p14:nvPr/>
+              </p14:nvContentPartPr>
+              <p14:xfrm>
+                <a:off x="5738184" y="896040"/>
+                <a:ext cx="2372400" cy="280440"/>
+              </p14:xfrm>
+            </p:contentPart>
+          </mc:Choice>
+          <mc:Fallback>
+            <p:pic>
+              <p:nvPicPr>
+                <p:cNvPr id="17" name="Ink 16">
+                  <a:extLst>
+                    <a:ext uri="{FF2B5EF4-FFF2-40B4-BE49-F238E27FC236}">
+                      <a16:creationId xmlns:a16="http://schemas.microsoft.com/office/drawing/2014/main" id="{3BD9EB2C-15AF-01F0-880E-C121A888C676}"/>
+                    </a:ext>
+                  </a:extLst>
+                </p:cNvPr>
+                <p:cNvPicPr/>
+                <p:nvPr/>
+              </p:nvPicPr>
+              <p:blipFill>
+                <a:blip r:embed="rId14"/>
+                <a:stretch>
+                  <a:fillRect/>
+                </a:stretch>
+              </p:blipFill>
+              <p:spPr>
+                <a:xfrm>
+                  <a:off x="5732065" y="889920"/>
+                  <a:ext cx="2384638" cy="292680"/>
+                </a:xfrm>
+                <a:prstGeom prst="rect">
+                  <a:avLst/>
+                </a:prstGeom>
+              </p:spPr>
+            </p:pic>
+          </mc:Fallback>
+        </mc:AlternateContent>
+        <mc:AlternateContent xmlns:mc="http://schemas.openxmlformats.org/markup-compatibility/2006">
+          <mc:Choice xmlns:p14="http://schemas.microsoft.com/office/powerpoint/2010/main" Requires="p14">
+            <p:contentPart p14:bwMode="auto" r:id="rId15">
+              <p14:nvContentPartPr>
+                <p14:cNvPr id="18" name="Ink 17">
+                  <a:extLst>
+                    <a:ext uri="{FF2B5EF4-FFF2-40B4-BE49-F238E27FC236}">
+                      <a16:creationId xmlns:a16="http://schemas.microsoft.com/office/drawing/2014/main" id="{8F3A2A39-6B95-94D9-1699-AAA94C330653}"/>
+                    </a:ext>
+                  </a:extLst>
+                </p14:cNvPr>
+                <p14:cNvContentPartPr/>
+                <p14:nvPr/>
+              </p14:nvContentPartPr>
+              <p14:xfrm>
+                <a:off x="7964424" y="940680"/>
+                <a:ext cx="226440" cy="262080"/>
+              </p14:xfrm>
+            </p:contentPart>
+          </mc:Choice>
+          <mc:Fallback>
+            <p:pic>
+              <p:nvPicPr>
+                <p:cNvPr id="18" name="Ink 17">
+                  <a:extLst>
+                    <a:ext uri="{FF2B5EF4-FFF2-40B4-BE49-F238E27FC236}">
+                      <a16:creationId xmlns:a16="http://schemas.microsoft.com/office/drawing/2014/main" id="{8F3A2A39-6B95-94D9-1699-AAA94C330653}"/>
+                    </a:ext>
+                  </a:extLst>
+                </p:cNvPr>
+                <p:cNvPicPr/>
+                <p:nvPr/>
+              </p:nvPicPr>
+              <p:blipFill>
+                <a:blip r:embed="rId16"/>
+                <a:stretch>
+                  <a:fillRect/>
+                </a:stretch>
+              </p:blipFill>
+              <p:spPr>
+                <a:xfrm>
+                  <a:off x="7958304" y="934560"/>
+                  <a:ext cx="238680" cy="274320"/>
+                </a:xfrm>
+                <a:prstGeom prst="rect">
+                  <a:avLst/>
+                </a:prstGeom>
+              </p:spPr>
+            </p:pic>
+          </mc:Fallback>
+        </mc:AlternateContent>
+      </p:grpSp>
+      <p:sp>
+        <p:nvSpPr>
+          <p:cNvPr id="20" name="TextBox 19">
+            <a:extLst>
+              <a:ext uri="{FF2B5EF4-FFF2-40B4-BE49-F238E27FC236}">
+                <a16:creationId xmlns:a16="http://schemas.microsoft.com/office/drawing/2014/main" id="{BBE68907-4A4A-FAC0-1D58-838A5F47B1CB}"/>
+              </a:ext>
+            </a:extLst>
+          </p:cNvPr>
+          <p:cNvSpPr txBox="1"/>
+          <p:nvPr/>
+        </p:nvSpPr>
+        <p:spPr>
+          <a:xfrm>
+            <a:off x="6547104" y="466344"/>
+            <a:ext cx="4482317" cy="369332"/>
+          </a:xfrm>
+          <a:prstGeom prst="rect">
+            <a:avLst/>
+          </a:prstGeom>
+          <a:noFill/>
+        </p:spPr>
+        <p:txBody>
+          <a:bodyPr wrap="none" rtlCol="0">
+            <a:spAutoFit/>
+          </a:bodyPr>
+          <a:lstStyle/>
+          <a:p>
+            <a:r>
+              <a:rPr lang="en-US" dirty="0"/>
+              <a:t>4. Feature set </a:t>
+            </a:r>
+            <a:r>
+              <a:rPr lang="en-US" dirty="0" err="1"/>
+              <a:t>importances</a:t>
+            </a:r>
+            <a:r>
+              <a:rPr lang="en-US" dirty="0"/>
+              <a:t> across datasets</a:t>
+            </a:r>
+          </a:p>
+        </p:txBody>
+      </p:sp>
+      <p:pic>
+        <p:nvPicPr>
+          <p:cNvPr id="22" name="Picture 21" descr="A screenshot of a graph&#10;&#10;Description automatically generated">
+            <a:extLst>
+              <a:ext uri="{FF2B5EF4-FFF2-40B4-BE49-F238E27FC236}">
+                <a16:creationId xmlns:a16="http://schemas.microsoft.com/office/drawing/2014/main" id="{3153C8EA-C8C5-6050-BA1F-D680EBE5939C}"/>
+              </a:ext>
+            </a:extLst>
+          </p:cNvPr>
+          <p:cNvPicPr>
+            <a:picLocks noChangeAspect="1"/>
+          </p:cNvPicPr>
+          <p:nvPr/>
+        </p:nvPicPr>
+        <p:blipFill>
+          <a:blip r:embed="rId17"/>
+          <a:stretch>
+            <a:fillRect/>
+          </a:stretch>
+        </p:blipFill>
+        <p:spPr>
+          <a:xfrm>
+            <a:off x="8297405" y="991814"/>
+            <a:ext cx="2667000" cy="2425700"/>
+          </a:xfrm>
+          <a:prstGeom prst="rect">
+            <a:avLst/>
+          </a:prstGeom>
+        </p:spPr>
+      </p:pic>
+      <p:sp>
+        <p:nvSpPr>
+          <p:cNvPr id="26" name="TextBox 25">
+            <a:extLst>
+              <a:ext uri="{FF2B5EF4-FFF2-40B4-BE49-F238E27FC236}">
+                <a16:creationId xmlns:a16="http://schemas.microsoft.com/office/drawing/2014/main" id="{4A98828C-955C-33A4-7556-2D9C6FEA3617}"/>
+              </a:ext>
+            </a:extLst>
+          </p:cNvPr>
+          <p:cNvSpPr txBox="1"/>
+          <p:nvPr/>
+        </p:nvSpPr>
+        <p:spPr>
+          <a:xfrm>
+            <a:off x="9784471" y="4120920"/>
+            <a:ext cx="3043850" cy="461665"/>
+          </a:xfrm>
+          <a:prstGeom prst="rect">
+            <a:avLst/>
+          </a:prstGeom>
+          <a:noFill/>
+        </p:spPr>
+        <p:txBody>
+          <a:bodyPr wrap="square" rtlCol="0">
+            <a:spAutoFit/>
+          </a:bodyPr>
+          <a:lstStyle/>
+          <a:p>
+            <a:r>
+              <a:rPr lang="en-US" sz="1200" dirty="0"/>
+              <a:t>4. Features greater than 0.5 and selecting important ones across all the datasets</a:t>
+            </a:r>
+          </a:p>
+        </p:txBody>
+      </p:sp>
+      <p:pic>
+        <p:nvPicPr>
+          <p:cNvPr id="28" name="Picture 27" descr="A diagram of a compound scaling&#10;&#10;Description automatically generated">
+            <a:extLst>
+              <a:ext uri="{FF2B5EF4-FFF2-40B4-BE49-F238E27FC236}">
+                <a16:creationId xmlns:a16="http://schemas.microsoft.com/office/drawing/2014/main" id="{EE046BB6-0C3E-25F9-366B-2211DBC58AB4}"/>
+              </a:ext>
+            </a:extLst>
+          </p:cNvPr>
+          <p:cNvPicPr>
+            <a:picLocks noChangeAspect="1"/>
+          </p:cNvPicPr>
+          <p:nvPr/>
+        </p:nvPicPr>
+        <p:blipFill>
+          <a:blip r:embed="rId18"/>
+          <a:stretch>
+            <a:fillRect/>
+          </a:stretch>
+        </p:blipFill>
+        <p:spPr>
+          <a:xfrm>
+            <a:off x="7474692" y="4854233"/>
+            <a:ext cx="2207260" cy="1880625"/>
+          </a:xfrm>
+          <a:prstGeom prst="rect">
+            <a:avLst/>
+          </a:prstGeom>
+        </p:spPr>
+      </p:pic>
+      <p:pic>
+        <p:nvPicPr>
+          <p:cNvPr id="30" name="Picture 29" descr="A graph of different colored lines&#10;&#10;Description automatically generated with medium confidence">
+            <a:extLst>
+              <a:ext uri="{FF2B5EF4-FFF2-40B4-BE49-F238E27FC236}">
+                <a16:creationId xmlns:a16="http://schemas.microsoft.com/office/drawing/2014/main" id="{FA4B62B3-F23A-3E8A-859D-FE1B19F1D67A}"/>
+              </a:ext>
+            </a:extLst>
+          </p:cNvPr>
+          <p:cNvPicPr>
+            <a:picLocks noChangeAspect="1"/>
+          </p:cNvPicPr>
+          <p:nvPr/>
+        </p:nvPicPr>
+        <p:blipFill>
+          <a:blip r:embed="rId19"/>
+          <a:stretch>
+            <a:fillRect/>
+          </a:stretch>
+        </p:blipFill>
+        <p:spPr>
+          <a:xfrm>
+            <a:off x="4270225" y="4411840"/>
+            <a:ext cx="1955800" cy="2133600"/>
+          </a:xfrm>
+          <a:prstGeom prst="rect">
+            <a:avLst/>
+          </a:prstGeom>
+        </p:spPr>
+      </p:pic>
+      <p:grpSp>
+        <p:nvGrpSpPr>
+          <p:cNvPr id="33" name="Group 32">
+            <a:extLst>
+              <a:ext uri="{FF2B5EF4-FFF2-40B4-BE49-F238E27FC236}">
+                <a16:creationId xmlns:a16="http://schemas.microsoft.com/office/drawing/2014/main" id="{6E5545FA-B233-9E46-8FE6-CF8184FE1766}"/>
+              </a:ext>
+            </a:extLst>
+          </p:cNvPr>
+          <p:cNvGrpSpPr/>
+          <p:nvPr/>
+        </p:nvGrpSpPr>
+        <p:grpSpPr>
+          <a:xfrm>
+            <a:off x="6528744" y="5821560"/>
+            <a:ext cx="810000" cy="154080"/>
+            <a:chOff x="6528744" y="5821560"/>
+            <a:chExt cx="810000" cy="154080"/>
+          </a:xfrm>
+        </p:grpSpPr>
+        <mc:AlternateContent xmlns:mc="http://schemas.openxmlformats.org/markup-compatibility/2006">
+          <mc:Choice xmlns:p14="http://schemas.microsoft.com/office/powerpoint/2010/main" Requires="p14">
+            <p:contentPart p14:bwMode="auto" r:id="rId20">
+              <p14:nvContentPartPr>
+                <p14:cNvPr id="31" name="Ink 30">
+                  <a:extLst>
+                    <a:ext uri="{FF2B5EF4-FFF2-40B4-BE49-F238E27FC236}">
+                      <a16:creationId xmlns:a16="http://schemas.microsoft.com/office/drawing/2014/main" id="{F4491251-EC16-97A8-CB9B-3A0D87F0C04E}"/>
+                    </a:ext>
+                  </a:extLst>
+                </p14:cNvPr>
+                <p14:cNvContentPartPr/>
+                <p14:nvPr/>
+              </p14:nvContentPartPr>
+              <p14:xfrm>
+                <a:off x="6552504" y="5874480"/>
+                <a:ext cx="786240" cy="101160"/>
+              </p14:xfrm>
+            </p:contentPart>
+          </mc:Choice>
+          <mc:Fallback>
+            <p:pic>
+              <p:nvPicPr>
+                <p:cNvPr id="31" name="Ink 30">
+                  <a:extLst>
+                    <a:ext uri="{FF2B5EF4-FFF2-40B4-BE49-F238E27FC236}">
+                      <a16:creationId xmlns:a16="http://schemas.microsoft.com/office/drawing/2014/main" id="{F4491251-EC16-97A8-CB9B-3A0D87F0C04E}"/>
+                    </a:ext>
+                  </a:extLst>
+                </p:cNvPr>
+                <p:cNvPicPr/>
+                <p:nvPr/>
+              </p:nvPicPr>
+              <p:blipFill>
+                <a:blip r:embed="rId21"/>
+                <a:stretch>
+                  <a:fillRect/>
+                </a:stretch>
+              </p:blipFill>
+              <p:spPr>
+                <a:xfrm>
+                  <a:off x="6546384" y="5868360"/>
+                  <a:ext cx="798480" cy="113400"/>
+                </a:xfrm>
+                <a:prstGeom prst="rect">
+                  <a:avLst/>
+                </a:prstGeom>
+              </p:spPr>
+            </p:pic>
+          </mc:Fallback>
+        </mc:AlternateContent>
+        <mc:AlternateContent xmlns:mc="http://schemas.openxmlformats.org/markup-compatibility/2006">
+          <mc:Choice xmlns:p14="http://schemas.microsoft.com/office/powerpoint/2010/main" Requires="p14">
+            <p:contentPart p14:bwMode="auto" r:id="rId22">
+              <p14:nvContentPartPr>
+                <p14:cNvPr id="32" name="Ink 31">
+                  <a:extLst>
+                    <a:ext uri="{FF2B5EF4-FFF2-40B4-BE49-F238E27FC236}">
+                      <a16:creationId xmlns:a16="http://schemas.microsoft.com/office/drawing/2014/main" id="{24963651-1F4B-67FF-AF89-0ABF59A0D89C}"/>
+                    </a:ext>
+                  </a:extLst>
+                </p14:cNvPr>
+                <p14:cNvContentPartPr/>
+                <p14:nvPr/>
+              </p14:nvContentPartPr>
+              <p14:xfrm>
+                <a:off x="6528744" y="5821560"/>
+                <a:ext cx="108720" cy="153360"/>
+              </p14:xfrm>
+            </p:contentPart>
+          </mc:Choice>
+          <mc:Fallback>
+            <p:pic>
+              <p:nvPicPr>
+                <p:cNvPr id="32" name="Ink 31">
+                  <a:extLst>
+                    <a:ext uri="{FF2B5EF4-FFF2-40B4-BE49-F238E27FC236}">
+                      <a16:creationId xmlns:a16="http://schemas.microsoft.com/office/drawing/2014/main" id="{24963651-1F4B-67FF-AF89-0ABF59A0D89C}"/>
+                    </a:ext>
+                  </a:extLst>
+                </p:cNvPr>
+                <p:cNvPicPr/>
+                <p:nvPr/>
+              </p:nvPicPr>
+              <p:blipFill>
+                <a:blip r:embed="rId23"/>
+                <a:stretch>
+                  <a:fillRect/>
+                </a:stretch>
+              </p:blipFill>
+              <p:spPr>
+                <a:xfrm>
+                  <a:off x="6522624" y="5815440"/>
+                  <a:ext cx="120960" cy="165600"/>
+                </a:xfrm>
+                <a:prstGeom prst="rect">
+                  <a:avLst/>
+                </a:prstGeom>
+              </p:spPr>
+            </p:pic>
+          </mc:Fallback>
+        </mc:AlternateContent>
+      </p:grpSp>
       <p:graphicFrame>
         <p:nvGraphicFramePr>
           <p:cNvPr id="3" name="Table 2">
@@ -4631,16 +7231,10 @@
           <p:cNvGraphicFramePr>
             <a:graphicFrameLocks noGrp="1"/>
           </p:cNvGraphicFramePr>
-          <p:nvPr>
-            <p:extLst>
-              <p:ext uri="{D42A27DB-BD31-4B8C-83A1-F6EECF244321}">
-                <p14:modId xmlns:p14="http://schemas.microsoft.com/office/powerpoint/2010/main" val="2588331419"/>
-              </p:ext>
-            </p:extLst>
-          </p:nvPr>
+          <p:nvPr/>
         </p:nvGraphicFramePr>
         <p:xfrm>
-          <a:off x="10883753" y="2006967"/>
+          <a:off x="9897164" y="3417514"/>
           <a:ext cx="2818464" cy="548640"/>
         </p:xfrm>
         <a:graphic>
@@ -4722,42 +7316,501 @@
           </a:graphicData>
         </a:graphic>
       </p:graphicFrame>
-    </p:spTree>
-    <p:extLst>
-      <p:ext uri="{BB962C8B-B14F-4D97-AF65-F5344CB8AC3E}">
-        <p14:creationId xmlns:p14="http://schemas.microsoft.com/office/powerpoint/2010/main" val="2285776093"/>
-      </p:ext>
-    </p:extLst>
-  </p:cSld>
-  <p:clrMapOvr>
-    <a:masterClrMapping/>
-  </p:clrMapOvr>
-</p:sld>
-</file>
-
-<file path=ppt/slides/slide2.xml><?xml version="1.0" encoding="utf-8"?>
-<p:sld xmlns:a="http://schemas.openxmlformats.org/drawingml/2006/main" xmlns:r="http://schemas.openxmlformats.org/officeDocument/2006/relationships" xmlns:p="http://schemas.openxmlformats.org/presentationml/2006/main">
-  <p:cSld>
-    <p:spTree>
-      <p:nvGrpSpPr>
-        <p:cNvPr id="1" name=""/>
-        <p:cNvGrpSpPr/>
-        <p:nvPr/>
-      </p:nvGrpSpPr>
-      <p:grpSpPr>
-        <a:xfrm>
-          <a:off x="0" y="0"/>
-          <a:ext cx="0" cy="0"/>
-          <a:chOff x="0" y="0"/>
-          <a:chExt cx="0" cy="0"/>
-        </a:xfrm>
-      </p:grpSpPr>
+      <p:sp>
+        <p:nvSpPr>
+          <p:cNvPr id="5" name="TextBox 4">
+            <a:extLst>
+              <a:ext uri="{FF2B5EF4-FFF2-40B4-BE49-F238E27FC236}">
+                <a16:creationId xmlns:a16="http://schemas.microsoft.com/office/drawing/2014/main" id="{A24A5ADA-7108-F88A-12E2-047B9980C2C6}"/>
+              </a:ext>
+            </a:extLst>
+          </p:cNvPr>
+          <p:cNvSpPr txBox="1"/>
+          <p:nvPr/>
+        </p:nvSpPr>
+        <p:spPr>
+          <a:xfrm>
+            <a:off x="2147115" y="1896364"/>
+            <a:ext cx="2115573" cy="830997"/>
+          </a:xfrm>
+          <a:prstGeom prst="rect">
+            <a:avLst/>
+          </a:prstGeom>
+          <a:noFill/>
+        </p:spPr>
+        <p:txBody>
+          <a:bodyPr wrap="square" rtlCol="0">
+            <a:spAutoFit/>
+          </a:bodyPr>
+          <a:lstStyle/>
+          <a:p>
+            <a:r>
+              <a:rPr lang="en-US" sz="1200" dirty="0"/>
+              <a:t>Thresholds on correlations coefficients</a:t>
+            </a:r>
+          </a:p>
+          <a:p>
+            <a:pPr marL="285750" indent="-285750">
+              <a:buFont typeface="Arial" panose="020B0604020202020204" pitchFamily="34" charset="0"/>
+              <a:buChar char="•"/>
+            </a:pPr>
+            <a:r>
+              <a:rPr lang="en-US" sz="1200" dirty="0"/>
+              <a:t>Spearman (0.275)</a:t>
+            </a:r>
+          </a:p>
+          <a:p>
+            <a:pPr marL="285750" indent="-285750">
+              <a:buFont typeface="Arial" panose="020B0604020202020204" pitchFamily="34" charset="0"/>
+              <a:buChar char="•"/>
+            </a:pPr>
+            <a:r>
+              <a:rPr lang="en-US" sz="1200" dirty="0"/>
+              <a:t>Pearson (0.3)</a:t>
+            </a:r>
+          </a:p>
+        </p:txBody>
+      </p:sp>
+      <mc:AlternateContent xmlns:mc="http://schemas.openxmlformats.org/markup-compatibility/2006">
+        <mc:Choice xmlns:p14="http://schemas.microsoft.com/office/powerpoint/2010/main" Requires="p14">
+          <p:contentPart p14:bwMode="auto" r:id="rId24">
+            <p14:nvContentPartPr>
+              <p14:cNvPr id="21" name="Ink 20">
+                <a:extLst>
+                  <a:ext uri="{FF2B5EF4-FFF2-40B4-BE49-F238E27FC236}">
+                    <a16:creationId xmlns:a16="http://schemas.microsoft.com/office/drawing/2014/main" id="{474145E4-7EDC-5DF6-0B24-3009AE5729E9}"/>
+                  </a:ext>
+                </a:extLst>
+              </p14:cNvPr>
+              <p14:cNvContentPartPr/>
+              <p14:nvPr/>
+            </p14:nvContentPartPr>
+            <p14:xfrm>
+              <a:off x="2031373" y="3321196"/>
+              <a:ext cx="318960" cy="60480"/>
+            </p14:xfrm>
+          </p:contentPart>
+        </mc:Choice>
+        <mc:Fallback>
+          <p:pic>
+            <p:nvPicPr>
+              <p:cNvPr id="21" name="Ink 20">
+                <a:extLst>
+                  <a:ext uri="{FF2B5EF4-FFF2-40B4-BE49-F238E27FC236}">
+                    <a16:creationId xmlns:a16="http://schemas.microsoft.com/office/drawing/2014/main" id="{474145E4-7EDC-5DF6-0B24-3009AE5729E9}"/>
+                  </a:ext>
+                </a:extLst>
+              </p:cNvPr>
+              <p:cNvPicPr/>
+              <p:nvPr/>
+            </p:nvPicPr>
+            <p:blipFill>
+              <a:blip r:embed="rId25"/>
+              <a:stretch>
+                <a:fillRect/>
+              </a:stretch>
+            </p:blipFill>
+            <p:spPr>
+              <a:xfrm>
+                <a:off x="2025253" y="3315076"/>
+                <a:ext cx="331200" cy="72720"/>
+              </a:xfrm>
+              <a:prstGeom prst="rect">
+                <a:avLst/>
+              </a:prstGeom>
+            </p:spPr>
+          </p:pic>
+        </mc:Fallback>
+      </mc:AlternateContent>
+      <mc:AlternateContent xmlns:mc="http://schemas.openxmlformats.org/markup-compatibility/2006">
+        <mc:Choice xmlns:p14="http://schemas.microsoft.com/office/powerpoint/2010/main" Requires="p14">
+          <p:contentPart p14:bwMode="auto" r:id="rId26">
+            <p14:nvContentPartPr>
+              <p14:cNvPr id="27" name="Ink 26">
+                <a:extLst>
+                  <a:ext uri="{FF2B5EF4-FFF2-40B4-BE49-F238E27FC236}">
+                    <a16:creationId xmlns:a16="http://schemas.microsoft.com/office/drawing/2014/main" id="{BF3189EA-6C0D-6E23-B023-AF70FBEBCBC7}"/>
+                  </a:ext>
+                </a:extLst>
+              </p14:cNvPr>
+              <p14:cNvContentPartPr/>
+              <p14:nvPr/>
+            </p14:nvContentPartPr>
+            <p14:xfrm>
+              <a:off x="5289373" y="1512916"/>
+              <a:ext cx="851040" cy="1403280"/>
+            </p14:xfrm>
+          </p:contentPart>
+        </mc:Choice>
+        <mc:Fallback>
+          <p:pic>
+            <p:nvPicPr>
+              <p:cNvPr id="27" name="Ink 26">
+                <a:extLst>
+                  <a:ext uri="{FF2B5EF4-FFF2-40B4-BE49-F238E27FC236}">
+                    <a16:creationId xmlns:a16="http://schemas.microsoft.com/office/drawing/2014/main" id="{BF3189EA-6C0D-6E23-B023-AF70FBEBCBC7}"/>
+                  </a:ext>
+                </a:extLst>
+              </p:cNvPr>
+              <p:cNvPicPr/>
+              <p:nvPr/>
+            </p:nvPicPr>
+            <p:blipFill>
+              <a:blip r:embed="rId27"/>
+              <a:stretch>
+                <a:fillRect/>
+              </a:stretch>
+            </p:blipFill>
+            <p:spPr>
+              <a:xfrm>
+                <a:off x="5283253" y="1506796"/>
+                <a:ext cx="863280" cy="1415520"/>
+              </a:xfrm>
+              <a:prstGeom prst="rect">
+                <a:avLst/>
+              </a:prstGeom>
+            </p:spPr>
+          </p:pic>
+        </mc:Fallback>
+      </mc:AlternateContent>
+      <mc:AlternateContent xmlns:mc="http://schemas.openxmlformats.org/markup-compatibility/2006">
+        <mc:Choice xmlns:p14="http://schemas.microsoft.com/office/powerpoint/2010/main" Requires="p14">
+          <p:contentPart p14:bwMode="auto" r:id="rId28">
+            <p14:nvContentPartPr>
+              <p14:cNvPr id="29" name="Ink 28">
+                <a:extLst>
+                  <a:ext uri="{FF2B5EF4-FFF2-40B4-BE49-F238E27FC236}">
+                    <a16:creationId xmlns:a16="http://schemas.microsoft.com/office/drawing/2014/main" id="{02824C3A-B021-3913-6A44-FF5425346499}"/>
+                  </a:ext>
+                </a:extLst>
+              </p14:cNvPr>
+              <p14:cNvContentPartPr/>
+              <p14:nvPr/>
+            </p14:nvContentPartPr>
+            <p14:xfrm>
+              <a:off x="2569573" y="3305716"/>
+              <a:ext cx="428400" cy="302760"/>
+            </p14:xfrm>
+          </p:contentPart>
+        </mc:Choice>
+        <mc:Fallback>
+          <p:pic>
+            <p:nvPicPr>
+              <p:cNvPr id="29" name="Ink 28">
+                <a:extLst>
+                  <a:ext uri="{FF2B5EF4-FFF2-40B4-BE49-F238E27FC236}">
+                    <a16:creationId xmlns:a16="http://schemas.microsoft.com/office/drawing/2014/main" id="{02824C3A-B021-3913-6A44-FF5425346499}"/>
+                  </a:ext>
+                </a:extLst>
+              </p:cNvPr>
+              <p:cNvPicPr/>
+              <p:nvPr/>
+            </p:nvPicPr>
+            <p:blipFill>
+              <a:blip r:embed="rId29"/>
+              <a:stretch>
+                <a:fillRect/>
+              </a:stretch>
+            </p:blipFill>
+            <p:spPr>
+              <a:xfrm>
+                <a:off x="2563453" y="3299596"/>
+                <a:ext cx="440640" cy="315000"/>
+              </a:xfrm>
+              <a:prstGeom prst="rect">
+                <a:avLst/>
+              </a:prstGeom>
+            </p:spPr>
+          </p:pic>
+        </mc:Fallback>
+      </mc:AlternateContent>
+      <p:sp>
+        <p:nvSpPr>
+          <p:cNvPr id="34" name="TextBox 33">
+            <a:extLst>
+              <a:ext uri="{FF2B5EF4-FFF2-40B4-BE49-F238E27FC236}">
+                <a16:creationId xmlns:a16="http://schemas.microsoft.com/office/drawing/2014/main" id="{D2D000FA-D31E-89F6-269A-4DA1A68FF2BF}"/>
+              </a:ext>
+            </a:extLst>
+          </p:cNvPr>
+          <p:cNvSpPr txBox="1"/>
+          <p:nvPr/>
+        </p:nvSpPr>
+        <p:spPr>
+          <a:xfrm>
+            <a:off x="435728" y="5496854"/>
+            <a:ext cx="2963953" cy="369332"/>
+          </a:xfrm>
+          <a:prstGeom prst="rect">
+            <a:avLst/>
+          </a:prstGeom>
+          <a:noFill/>
+        </p:spPr>
+        <p:txBody>
+          <a:bodyPr wrap="none" rtlCol="0">
+            <a:spAutoFit/>
+          </a:bodyPr>
+          <a:lstStyle/>
+          <a:p>
+            <a:r>
+              <a:rPr lang="en-US" dirty="0"/>
+              <a:t>1. Different dataset curation</a:t>
+            </a:r>
+          </a:p>
+        </p:txBody>
+      </p:sp>
+      <p:grpSp>
+        <p:nvGrpSpPr>
+          <p:cNvPr id="37" name="Group 36">
+            <a:extLst>
+              <a:ext uri="{FF2B5EF4-FFF2-40B4-BE49-F238E27FC236}">
+                <a16:creationId xmlns:a16="http://schemas.microsoft.com/office/drawing/2014/main" id="{CC3B57D6-6750-D40B-5603-E426AAD2DA18}"/>
+              </a:ext>
+            </a:extLst>
+          </p:cNvPr>
+          <p:cNvGrpSpPr/>
+          <p:nvPr/>
+        </p:nvGrpSpPr>
+        <p:grpSpPr>
+          <a:xfrm>
+            <a:off x="1709173" y="4850116"/>
+            <a:ext cx="145440" cy="559440"/>
+            <a:chOff x="1709173" y="4850116"/>
+            <a:chExt cx="145440" cy="559440"/>
+          </a:xfrm>
+        </p:grpSpPr>
+        <mc:AlternateContent xmlns:mc="http://schemas.openxmlformats.org/markup-compatibility/2006">
+          <mc:Choice xmlns:p14="http://schemas.microsoft.com/office/powerpoint/2010/main" Requires="p14">
+            <p:contentPart p14:bwMode="auto" r:id="rId30">
+              <p14:nvContentPartPr>
+                <p14:cNvPr id="35" name="Ink 34">
+                  <a:extLst>
+                    <a:ext uri="{FF2B5EF4-FFF2-40B4-BE49-F238E27FC236}">
+                      <a16:creationId xmlns:a16="http://schemas.microsoft.com/office/drawing/2014/main" id="{973E0F56-8D2D-5273-E56F-340AF0AE411D}"/>
+                    </a:ext>
+                  </a:extLst>
+                </p14:cNvPr>
+                <p14:cNvContentPartPr/>
+                <p14:nvPr/>
+              </p14:nvContentPartPr>
+              <p14:xfrm>
+                <a:off x="1763893" y="4866316"/>
+                <a:ext cx="66960" cy="543240"/>
+              </p14:xfrm>
+            </p:contentPart>
+          </mc:Choice>
+          <mc:Fallback>
+            <p:pic>
+              <p:nvPicPr>
+                <p:cNvPr id="35" name="Ink 34">
+                  <a:extLst>
+                    <a:ext uri="{FF2B5EF4-FFF2-40B4-BE49-F238E27FC236}">
+                      <a16:creationId xmlns:a16="http://schemas.microsoft.com/office/drawing/2014/main" id="{973E0F56-8D2D-5273-E56F-340AF0AE411D}"/>
+                    </a:ext>
+                  </a:extLst>
+                </p:cNvPr>
+                <p:cNvPicPr/>
+                <p:nvPr/>
+              </p:nvPicPr>
+              <p:blipFill>
+                <a:blip r:embed="rId31"/>
+                <a:stretch>
+                  <a:fillRect/>
+                </a:stretch>
+              </p:blipFill>
+              <p:spPr>
+                <a:xfrm>
+                  <a:off x="1757773" y="4860196"/>
+                  <a:ext cx="79200" cy="555480"/>
+                </a:xfrm>
+                <a:prstGeom prst="rect">
+                  <a:avLst/>
+                </a:prstGeom>
+              </p:spPr>
+            </p:pic>
+          </mc:Fallback>
+        </mc:AlternateContent>
+        <mc:AlternateContent xmlns:mc="http://schemas.openxmlformats.org/markup-compatibility/2006">
+          <mc:Choice xmlns:p14="http://schemas.microsoft.com/office/powerpoint/2010/main" Requires="p14">
+            <p:contentPart p14:bwMode="auto" r:id="rId32">
+              <p14:nvContentPartPr>
+                <p14:cNvPr id="36" name="Ink 35">
+                  <a:extLst>
+                    <a:ext uri="{FF2B5EF4-FFF2-40B4-BE49-F238E27FC236}">
+                      <a16:creationId xmlns:a16="http://schemas.microsoft.com/office/drawing/2014/main" id="{A868AE37-BC06-481D-59A4-35392C015A78}"/>
+                    </a:ext>
+                  </a:extLst>
+                </p14:cNvPr>
+                <p14:cNvContentPartPr/>
+                <p14:nvPr/>
+              </p14:nvContentPartPr>
+              <p14:xfrm>
+                <a:off x="1709173" y="4850116"/>
+                <a:ext cx="145440" cy="98640"/>
+              </p14:xfrm>
+            </p:contentPart>
+          </mc:Choice>
+          <mc:Fallback>
+            <p:pic>
+              <p:nvPicPr>
+                <p:cNvPr id="36" name="Ink 35">
+                  <a:extLst>
+                    <a:ext uri="{FF2B5EF4-FFF2-40B4-BE49-F238E27FC236}">
+                      <a16:creationId xmlns:a16="http://schemas.microsoft.com/office/drawing/2014/main" id="{A868AE37-BC06-481D-59A4-35392C015A78}"/>
+                    </a:ext>
+                  </a:extLst>
+                </p:cNvPr>
+                <p:cNvPicPr/>
+                <p:nvPr/>
+              </p:nvPicPr>
+              <p:blipFill>
+                <a:blip r:embed="rId33"/>
+                <a:stretch>
+                  <a:fillRect/>
+                </a:stretch>
+              </p:blipFill>
+              <p:spPr>
+                <a:xfrm>
+                  <a:off x="1703053" y="4843996"/>
+                  <a:ext cx="157680" cy="110880"/>
+                </a:xfrm>
+                <a:prstGeom prst="rect">
+                  <a:avLst/>
+                </a:prstGeom>
+              </p:spPr>
+            </p:pic>
+          </mc:Fallback>
+        </mc:AlternateContent>
+      </p:grpSp>
+      <p:grpSp>
+        <p:nvGrpSpPr>
+          <p:cNvPr id="40" name="Group 39">
+            <a:extLst>
+              <a:ext uri="{FF2B5EF4-FFF2-40B4-BE49-F238E27FC236}">
+                <a16:creationId xmlns:a16="http://schemas.microsoft.com/office/drawing/2014/main" id="{1FE046DE-28A5-E899-7757-73E3341ABC41}"/>
+              </a:ext>
+            </a:extLst>
+          </p:cNvPr>
+          <p:cNvGrpSpPr/>
+          <p:nvPr/>
+        </p:nvGrpSpPr>
+        <p:grpSpPr>
+          <a:xfrm>
+            <a:off x="9196453" y="3388156"/>
+            <a:ext cx="308880" cy="1436400"/>
+            <a:chOff x="9196453" y="3388156"/>
+            <a:chExt cx="308880" cy="1436400"/>
+          </a:xfrm>
+        </p:grpSpPr>
+        <mc:AlternateContent xmlns:mc="http://schemas.openxmlformats.org/markup-compatibility/2006">
+          <mc:Choice xmlns:p14="http://schemas.microsoft.com/office/powerpoint/2010/main" Requires="p14">
+            <p:contentPart p14:bwMode="auto" r:id="rId34">
+              <p14:nvContentPartPr>
+                <p14:cNvPr id="38" name="Ink 37">
+                  <a:extLst>
+                    <a:ext uri="{FF2B5EF4-FFF2-40B4-BE49-F238E27FC236}">
+                      <a16:creationId xmlns:a16="http://schemas.microsoft.com/office/drawing/2014/main" id="{9B914111-278E-50BB-123A-6EF3908EF446}"/>
+                    </a:ext>
+                  </a:extLst>
+                </p14:cNvPr>
+                <p14:cNvContentPartPr/>
+                <p14:nvPr/>
+              </p14:nvContentPartPr>
+              <p14:xfrm>
+                <a:off x="9225973" y="3388156"/>
+                <a:ext cx="279360" cy="1416960"/>
+              </p14:xfrm>
+            </p:contentPart>
+          </mc:Choice>
+          <mc:Fallback>
+            <p:pic>
+              <p:nvPicPr>
+                <p:cNvPr id="38" name="Ink 37">
+                  <a:extLst>
+                    <a:ext uri="{FF2B5EF4-FFF2-40B4-BE49-F238E27FC236}">
+                      <a16:creationId xmlns:a16="http://schemas.microsoft.com/office/drawing/2014/main" id="{9B914111-278E-50BB-123A-6EF3908EF446}"/>
+                    </a:ext>
+                  </a:extLst>
+                </p:cNvPr>
+                <p:cNvPicPr/>
+                <p:nvPr/>
+              </p:nvPicPr>
+              <p:blipFill>
+                <a:blip r:embed="rId35"/>
+                <a:stretch>
+                  <a:fillRect/>
+                </a:stretch>
+              </p:blipFill>
+              <p:spPr>
+                <a:xfrm>
+                  <a:off x="9219853" y="3382038"/>
+                  <a:ext cx="291600" cy="1429197"/>
+                </a:xfrm>
+                <a:prstGeom prst="rect">
+                  <a:avLst/>
+                </a:prstGeom>
+              </p:spPr>
+            </p:pic>
+          </mc:Fallback>
+        </mc:AlternateContent>
+        <mc:AlternateContent xmlns:mc="http://schemas.openxmlformats.org/markup-compatibility/2006">
+          <mc:Choice xmlns:p14="http://schemas.microsoft.com/office/powerpoint/2010/main" Requires="p14">
+            <p:contentPart p14:bwMode="auto" r:id="rId36">
+              <p14:nvContentPartPr>
+                <p14:cNvPr id="39" name="Ink 38">
+                  <a:extLst>
+                    <a:ext uri="{FF2B5EF4-FFF2-40B4-BE49-F238E27FC236}">
+                      <a16:creationId xmlns:a16="http://schemas.microsoft.com/office/drawing/2014/main" id="{95728924-C8A4-B4C1-28A5-8ECEE04F4858}"/>
+                    </a:ext>
+                  </a:extLst>
+                </p14:cNvPr>
+                <p14:cNvContentPartPr/>
+                <p14:nvPr/>
+              </p14:nvContentPartPr>
+              <p14:xfrm>
+                <a:off x="9196453" y="4691356"/>
+                <a:ext cx="159480" cy="133200"/>
+              </p14:xfrm>
+            </p:contentPart>
+          </mc:Choice>
+          <mc:Fallback>
+            <p:pic>
+              <p:nvPicPr>
+                <p:cNvPr id="39" name="Ink 38">
+                  <a:extLst>
+                    <a:ext uri="{FF2B5EF4-FFF2-40B4-BE49-F238E27FC236}">
+                      <a16:creationId xmlns:a16="http://schemas.microsoft.com/office/drawing/2014/main" id="{95728924-C8A4-B4C1-28A5-8ECEE04F4858}"/>
+                    </a:ext>
+                  </a:extLst>
+                </p:cNvPr>
+                <p:cNvPicPr/>
+                <p:nvPr/>
+              </p:nvPicPr>
+              <p:blipFill>
+                <a:blip r:embed="rId37"/>
+                <a:stretch>
+                  <a:fillRect/>
+                </a:stretch>
+              </p:blipFill>
+              <p:spPr>
+                <a:xfrm>
+                  <a:off x="9190333" y="4685236"/>
+                  <a:ext cx="171720" cy="145440"/>
+                </a:xfrm>
+                <a:prstGeom prst="rect">
+                  <a:avLst/>
+                </a:prstGeom>
+              </p:spPr>
+            </p:pic>
+          </mc:Fallback>
+        </mc:AlternateContent>
+      </p:grpSp>
       <p:pic>
         <p:nvPicPr>
-          <p:cNvPr id="1026" name="Picture 2">
-            <a:extLst>
-              <a:ext uri="{FF2B5EF4-FFF2-40B4-BE49-F238E27FC236}">
-                <a16:creationId xmlns:a16="http://schemas.microsoft.com/office/drawing/2014/main" id="{23426C5A-E4F5-61A1-B5C4-16887CC035F5}"/>
+          <p:cNvPr id="41" name="Picture 2">
+            <a:extLst>
+              <a:ext uri="{FF2B5EF4-FFF2-40B4-BE49-F238E27FC236}">
+                <a16:creationId xmlns:a16="http://schemas.microsoft.com/office/drawing/2014/main" id="{4E03660D-7C73-DFCA-1CC7-3B884D79E417}"/>
               </a:ext>
             </a:extLst>
           </p:cNvPr>
@@ -4766,23 +7819,21 @@
           </p:cNvPicPr>
           <p:nvPr/>
         </p:nvPicPr>
-        <p:blipFill>
-          <a:blip r:embed="rId2">
+        <p:blipFill rotWithShape="1">
+          <a:blip r:embed="rId38">
             <a:extLst>
               <a:ext uri="{28A0092B-C50C-407E-A947-70E740481C1C}">
                 <a14:useLocalDpi xmlns:a14="http://schemas.microsoft.com/office/drawing/2010/main" val="0"/>
               </a:ext>
             </a:extLst>
           </a:blip>
-          <a:srcRect/>
-          <a:stretch>
-            <a:fillRect/>
-          </a:stretch>
+          <a:srcRect l="13866" r="11943"/>
+          <a:stretch/>
         </p:blipFill>
         <p:spPr bwMode="auto">
           <a:xfrm>
-            <a:off x="252248" y="508109"/>
-            <a:ext cx="10385388" cy="5841781"/>
+            <a:off x="1127093" y="5866720"/>
+            <a:ext cx="1244776" cy="943771"/>
           </a:xfrm>
           <a:prstGeom prst="rect">
             <a:avLst/>
@@ -4802,7 +7853,7 @@
     </p:spTree>
     <p:extLst>
       <p:ext uri="{BB962C8B-B14F-4D97-AF65-F5344CB8AC3E}">
-        <p14:creationId xmlns:p14="http://schemas.microsoft.com/office/powerpoint/2010/main" val="4169702370"/>
+        <p14:creationId xmlns:p14="http://schemas.microsoft.com/office/powerpoint/2010/main" val="3994580119"/>
       </p:ext>
     </p:extLst>
   </p:cSld>

</xml_diff>